<commit_message>
docs: Provide overview of scenario
Signed-off-by: Tom Kerkhove <kerkhove.tom@gmail.com>
</commit_message>
<xml_diff>
--- a/images/schematics.pptx
+++ b/images/schematics.pptx
@@ -5,7 +5,8 @@
     <p:sldMasterId id="2147483648" r:id="rId1"/>
   </p:sldMasterIdLst>
   <p:sldIdLst>
-    <p:sldId id="258" r:id="rId2"/>
+    <p:sldId id="259" r:id="rId2"/>
+    <p:sldId id="258" r:id="rId3"/>
   </p:sldIdLst>
   <p:sldSz cx="12192000" cy="6858000"/>
   <p:notesSz cx="6858000" cy="9144000"/>
@@ -261,7 +262,7 @@
           <a:p>
             <a:fld id="{371346F4-35EC-4130-B4CC-0DFD34D5B213}" type="datetimeFigureOut">
               <a:rPr lang="LID4096" smtClean="0"/>
-              <a:t>11/13/2020</a:t>
+              <a:t>08/23/2021</a:t>
             </a:fld>
             <a:endParaRPr lang="LID4096"/>
           </a:p>
@@ -461,7 +462,7 @@
           <a:p>
             <a:fld id="{371346F4-35EC-4130-B4CC-0DFD34D5B213}" type="datetimeFigureOut">
               <a:rPr lang="LID4096" smtClean="0"/>
-              <a:t>11/13/2020</a:t>
+              <a:t>08/23/2021</a:t>
             </a:fld>
             <a:endParaRPr lang="LID4096"/>
           </a:p>
@@ -671,7 +672,7 @@
           <a:p>
             <a:fld id="{371346F4-35EC-4130-B4CC-0DFD34D5B213}" type="datetimeFigureOut">
               <a:rPr lang="LID4096" smtClean="0"/>
-              <a:t>11/13/2020</a:t>
+              <a:t>08/23/2021</a:t>
             </a:fld>
             <a:endParaRPr lang="LID4096"/>
           </a:p>
@@ -871,7 +872,7 @@
           <a:p>
             <a:fld id="{371346F4-35EC-4130-B4CC-0DFD34D5B213}" type="datetimeFigureOut">
               <a:rPr lang="LID4096" smtClean="0"/>
-              <a:t>11/13/2020</a:t>
+              <a:t>08/23/2021</a:t>
             </a:fld>
             <a:endParaRPr lang="LID4096"/>
           </a:p>
@@ -1147,7 +1148,7 @@
           <a:p>
             <a:fld id="{371346F4-35EC-4130-B4CC-0DFD34D5B213}" type="datetimeFigureOut">
               <a:rPr lang="LID4096" smtClean="0"/>
-              <a:t>11/13/2020</a:t>
+              <a:t>08/23/2021</a:t>
             </a:fld>
             <a:endParaRPr lang="LID4096"/>
           </a:p>
@@ -1415,7 +1416,7 @@
           <a:p>
             <a:fld id="{371346F4-35EC-4130-B4CC-0DFD34D5B213}" type="datetimeFigureOut">
               <a:rPr lang="LID4096" smtClean="0"/>
-              <a:t>11/13/2020</a:t>
+              <a:t>08/23/2021</a:t>
             </a:fld>
             <a:endParaRPr lang="LID4096"/>
           </a:p>
@@ -1830,7 +1831,7 @@
           <a:p>
             <a:fld id="{371346F4-35EC-4130-B4CC-0DFD34D5B213}" type="datetimeFigureOut">
               <a:rPr lang="LID4096" smtClean="0"/>
-              <a:t>11/13/2020</a:t>
+              <a:t>08/23/2021</a:t>
             </a:fld>
             <a:endParaRPr lang="LID4096"/>
           </a:p>
@@ -1972,7 +1973,7 @@
           <a:p>
             <a:fld id="{371346F4-35EC-4130-B4CC-0DFD34D5B213}" type="datetimeFigureOut">
               <a:rPr lang="LID4096" smtClean="0"/>
-              <a:t>11/13/2020</a:t>
+              <a:t>08/23/2021</a:t>
             </a:fld>
             <a:endParaRPr lang="LID4096"/>
           </a:p>
@@ -2085,7 +2086,7 @@
           <a:p>
             <a:fld id="{371346F4-35EC-4130-B4CC-0DFD34D5B213}" type="datetimeFigureOut">
               <a:rPr lang="LID4096" smtClean="0"/>
-              <a:t>11/13/2020</a:t>
+              <a:t>08/23/2021</a:t>
             </a:fld>
             <a:endParaRPr lang="LID4096"/>
           </a:p>
@@ -2398,7 +2399,7 @@
           <a:p>
             <a:fld id="{371346F4-35EC-4130-B4CC-0DFD34D5B213}" type="datetimeFigureOut">
               <a:rPr lang="LID4096" smtClean="0"/>
-              <a:t>11/13/2020</a:t>
+              <a:t>08/23/2021</a:t>
             </a:fld>
             <a:endParaRPr lang="LID4096"/>
           </a:p>
@@ -2687,7 +2688,7 @@
           <a:p>
             <a:fld id="{371346F4-35EC-4130-B4CC-0DFD34D5B213}" type="datetimeFigureOut">
               <a:rPr lang="LID4096" smtClean="0"/>
-              <a:t>11/13/2020</a:t>
+              <a:t>08/23/2021</a:t>
             </a:fld>
             <a:endParaRPr lang="LID4096"/>
           </a:p>
@@ -2930,7 +2931,7 @@
           <a:p>
             <a:fld id="{371346F4-35EC-4130-B4CC-0DFD34D5B213}" type="datetimeFigureOut">
               <a:rPr lang="LID4096" smtClean="0"/>
-              <a:t>11/13/2020</a:t>
+              <a:t>08/23/2021</a:t>
             </a:fld>
             <a:endParaRPr lang="LID4096"/>
           </a:p>
@@ -3331,6 +3332,1272 @@
 </file>
 
 <file path=ppt/slides/slide1.xml><?xml version="1.0" encoding="utf-8"?>
+<p:sld xmlns:a="http://schemas.openxmlformats.org/drawingml/2006/main" xmlns:r="http://schemas.openxmlformats.org/officeDocument/2006/relationships" xmlns:p="http://schemas.openxmlformats.org/presentationml/2006/main">
+  <p:cSld>
+    <p:spTree>
+      <p:nvGrpSpPr>
+        <p:cNvPr id="1" name=""/>
+        <p:cNvGrpSpPr/>
+        <p:nvPr/>
+      </p:nvGrpSpPr>
+      <p:grpSpPr>
+        <a:xfrm>
+          <a:off x="0" y="0"/>
+          <a:ext cx="0" cy="0"/>
+          <a:chOff x="0" y="0"/>
+          <a:chExt cx="0" cy="0"/>
+        </a:xfrm>
+      </p:grpSpPr>
+      <p:sp>
+        <p:nvSpPr>
+          <p:cNvPr id="3" name="Rectangle 2">
+            <a:extLst>
+              <a:ext uri="{FF2B5EF4-FFF2-40B4-BE49-F238E27FC236}">
+                <a16:creationId xmlns:a16="http://schemas.microsoft.com/office/drawing/2014/main" id="{1E28F949-1A45-410F-89EB-E8EC1901614F}"/>
+              </a:ext>
+            </a:extLst>
+          </p:cNvPr>
+          <p:cNvSpPr/>
+          <p:nvPr/>
+        </p:nvSpPr>
+        <p:spPr>
+          <a:xfrm>
+            <a:off x="1069675" y="656578"/>
+            <a:ext cx="7712016" cy="1747824"/>
+          </a:xfrm>
+          <a:prstGeom prst="rect">
+            <a:avLst/>
+          </a:prstGeom>
+          <a:ln w="28575"/>
+        </p:spPr>
+        <p:style>
+          <a:lnRef idx="2">
+            <a:schemeClr val="accent5"/>
+          </a:lnRef>
+          <a:fillRef idx="1">
+            <a:schemeClr val="lt1"/>
+          </a:fillRef>
+          <a:effectRef idx="0">
+            <a:schemeClr val="accent5"/>
+          </a:effectRef>
+          <a:fontRef idx="minor">
+            <a:schemeClr val="dk1"/>
+          </a:fontRef>
+        </p:style>
+        <p:txBody>
+          <a:bodyPr rtlCol="0" anchor="ctr"/>
+          <a:lstStyle/>
+          <a:p>
+            <a:pPr algn="ctr"/>
+            <a:endParaRPr lang="LID4096"/>
+          </a:p>
+        </p:txBody>
+      </p:sp>
+      <p:grpSp>
+        <p:nvGrpSpPr>
+          <p:cNvPr id="4" name="Group 3">
+            <a:extLst>
+              <a:ext uri="{FF2B5EF4-FFF2-40B4-BE49-F238E27FC236}">
+                <a16:creationId xmlns:a16="http://schemas.microsoft.com/office/drawing/2014/main" id="{02706037-1E8D-490D-B160-81905FDDDF09}"/>
+              </a:ext>
+            </a:extLst>
+          </p:cNvPr>
+          <p:cNvGrpSpPr/>
+          <p:nvPr/>
+        </p:nvGrpSpPr>
+        <p:grpSpPr>
+          <a:xfrm>
+            <a:off x="1339207" y="960992"/>
+            <a:ext cx="2769080" cy="1137083"/>
+            <a:chOff x="1742536" y="1718260"/>
+            <a:chExt cx="2769080" cy="1137083"/>
+          </a:xfrm>
+        </p:grpSpPr>
+        <p:sp>
+          <p:nvSpPr>
+            <p:cNvPr id="5" name="Rectangle 4">
+              <a:extLst>
+                <a:ext uri="{FF2B5EF4-FFF2-40B4-BE49-F238E27FC236}">
+                  <a16:creationId xmlns:a16="http://schemas.microsoft.com/office/drawing/2014/main" id="{3593F34C-1F4E-4AA1-8F11-8005307F6411}"/>
+                </a:ext>
+              </a:extLst>
+            </p:cNvPr>
+            <p:cNvSpPr/>
+            <p:nvPr/>
+          </p:nvSpPr>
+          <p:spPr>
+            <a:xfrm>
+              <a:off x="1742537" y="2087592"/>
+              <a:ext cx="2769079" cy="767751"/>
+            </a:xfrm>
+            <a:prstGeom prst="rect">
+              <a:avLst/>
+            </a:prstGeom>
+          </p:spPr>
+          <p:style>
+            <a:lnRef idx="2">
+              <a:schemeClr val="dk1"/>
+            </a:lnRef>
+            <a:fillRef idx="1">
+              <a:schemeClr val="lt1"/>
+            </a:fillRef>
+            <a:effectRef idx="0">
+              <a:schemeClr val="dk1"/>
+            </a:effectRef>
+            <a:fontRef idx="minor">
+              <a:schemeClr val="dk1"/>
+            </a:fontRef>
+          </p:style>
+          <p:txBody>
+            <a:bodyPr rtlCol="0" anchor="ctr"/>
+            <a:lstStyle/>
+            <a:p>
+              <a:r>
+                <a:rPr lang="en-US" dirty="0">
+                  <a:latin typeface="Segoe UI" panose="020B0502040204020203" pitchFamily="34" charset="0"/>
+                  <a:cs typeface="Segoe UI" panose="020B0502040204020203" pitchFamily="34" charset="0"/>
+                </a:rPr>
+                <a:t>  ASP.NET Core</a:t>
+              </a:r>
+              <a:br>
+                <a:rPr lang="en-US" dirty="0">
+                  <a:latin typeface="Segoe UI" panose="020B0502040204020203" pitchFamily="34" charset="0"/>
+                  <a:cs typeface="Segoe UI" panose="020B0502040204020203" pitchFamily="34" charset="0"/>
+                </a:rPr>
+              </a:br>
+              <a:r>
+                <a:rPr lang="en-US" dirty="0">
+                  <a:latin typeface="Segoe UI" panose="020B0502040204020203" pitchFamily="34" charset="0"/>
+                  <a:cs typeface="Segoe UI" panose="020B0502040204020203" pitchFamily="34" charset="0"/>
+                </a:rPr>
+                <a:t>  Website</a:t>
+              </a:r>
+              <a:endParaRPr lang="LID4096" dirty="0">
+                <a:latin typeface="Segoe UI" panose="020B0502040204020203" pitchFamily="34" charset="0"/>
+                <a:cs typeface="Segoe UI" panose="020B0502040204020203" pitchFamily="34" charset="0"/>
+              </a:endParaRPr>
+            </a:p>
+          </p:txBody>
+        </p:sp>
+        <p:sp>
+          <p:nvSpPr>
+            <p:cNvPr id="6" name="TextBox 5">
+              <a:extLst>
+                <a:ext uri="{FF2B5EF4-FFF2-40B4-BE49-F238E27FC236}">
+                  <a16:creationId xmlns:a16="http://schemas.microsoft.com/office/drawing/2014/main" id="{18BA2EC9-0CE0-49EB-835F-B0B092365A52}"/>
+                </a:ext>
+              </a:extLst>
+            </p:cNvPr>
+            <p:cNvSpPr txBox="1"/>
+            <p:nvPr/>
+          </p:nvSpPr>
+          <p:spPr>
+            <a:xfrm>
+              <a:off x="1742536" y="1718260"/>
+              <a:ext cx="2769079" cy="369332"/>
+            </a:xfrm>
+            <a:prstGeom prst="rect">
+              <a:avLst/>
+            </a:prstGeom>
+            <a:noFill/>
+          </p:spPr>
+          <p:txBody>
+            <a:bodyPr wrap="square" rtlCol="0">
+              <a:spAutoFit/>
+            </a:bodyPr>
+            <a:lstStyle/>
+            <a:p>
+              <a:pPr algn="ctr"/>
+              <a:r>
+                <a:rPr lang="en-US" b="1" dirty="0">
+                  <a:latin typeface="Segoe UI Bold" panose="020B0802040204020203" pitchFamily="34" charset="0"/>
+                  <a:cs typeface="Segoe UI Bold" panose="020B0802040204020203" pitchFamily="34" charset="0"/>
+                </a:rPr>
+                <a:t>Order Portal</a:t>
+              </a:r>
+              <a:r>
+                <a:rPr lang="en-US" b="1" dirty="0">
+                  <a:latin typeface="Segoe UI Semibold" panose="020B0702040204020203" pitchFamily="34" charset="0"/>
+                  <a:cs typeface="Segoe UI Semibold" panose="020B0702040204020203" pitchFamily="34" charset="0"/>
+                </a:rPr>
+                <a:t> </a:t>
+              </a:r>
+              <a:r>
+                <a:rPr lang="en-US" dirty="0">
+                  <a:latin typeface="Segoe UI Light" panose="020B0502040204020203" pitchFamily="34" charset="0"/>
+                  <a:cs typeface="Segoe UI Light" panose="020B0502040204020203" pitchFamily="34" charset="0"/>
+                </a:rPr>
+                <a:t>container</a:t>
+              </a:r>
+              <a:endParaRPr lang="LID4096" b="1" dirty="0">
+                <a:latin typeface="Segoe UI Light" panose="020B0502040204020203" pitchFamily="34" charset="0"/>
+                <a:cs typeface="Segoe UI Light" panose="020B0502040204020203" pitchFamily="34" charset="0"/>
+              </a:endParaRPr>
+            </a:p>
+          </p:txBody>
+        </p:sp>
+        <p:pic>
+          <p:nvPicPr>
+            <p:cNvPr id="7" name="Picture 2">
+              <a:extLst>
+                <a:ext uri="{FF2B5EF4-FFF2-40B4-BE49-F238E27FC236}">
+                  <a16:creationId xmlns:a16="http://schemas.microsoft.com/office/drawing/2014/main" id="{F20B3CFC-1BF6-4F82-92D8-03DFB4D1F4A2}"/>
+                </a:ext>
+              </a:extLst>
+            </p:cNvPr>
+            <p:cNvPicPr>
+              <a:picLocks noChangeAspect="1" noChangeArrowheads="1"/>
+            </p:cNvPicPr>
+            <p:nvPr/>
+          </p:nvPicPr>
+          <p:blipFill>
+            <a:blip r:embed="rId2">
+              <a:extLst>
+                <a:ext uri="{28A0092B-C50C-407E-A947-70E740481C1C}">
+                  <a14:useLocalDpi xmlns:a14="http://schemas.microsoft.com/office/drawing/2010/main" val="0"/>
+                </a:ext>
+              </a:extLst>
+            </a:blip>
+            <a:srcRect/>
+            <a:stretch>
+              <a:fillRect/>
+            </a:stretch>
+          </p:blipFill>
+          <p:spPr bwMode="auto">
+            <a:xfrm>
+              <a:off x="3847381" y="2225614"/>
+              <a:ext cx="491706" cy="491706"/>
+            </a:xfrm>
+            <a:prstGeom prst="rect">
+              <a:avLst/>
+            </a:prstGeom>
+            <a:noFill/>
+            <a:extLst>
+              <a:ext uri="{909E8E84-426E-40DD-AFC4-6F175D3DCCD1}">
+                <a14:hiddenFill xmlns:a14="http://schemas.microsoft.com/office/drawing/2010/main">
+                  <a:solidFill>
+                    <a:srgbClr val="FFFFFF"/>
+                  </a:solidFill>
+                </a14:hiddenFill>
+              </a:ext>
+            </a:extLst>
+          </p:spPr>
+        </p:pic>
+      </p:grpSp>
+      <p:sp>
+        <p:nvSpPr>
+          <p:cNvPr id="8" name="Rectangle 7">
+            <a:extLst>
+              <a:ext uri="{FF2B5EF4-FFF2-40B4-BE49-F238E27FC236}">
+                <a16:creationId xmlns:a16="http://schemas.microsoft.com/office/drawing/2014/main" id="{C1697494-A6C4-4C74-B677-DA25502C5FED}"/>
+              </a:ext>
+            </a:extLst>
+          </p:cNvPr>
+          <p:cNvSpPr/>
+          <p:nvPr/>
+        </p:nvSpPr>
+        <p:spPr>
+          <a:xfrm>
+            <a:off x="3045966" y="3503765"/>
+            <a:ext cx="5301529" cy="1270959"/>
+          </a:xfrm>
+          <a:prstGeom prst="rect">
+            <a:avLst/>
+          </a:prstGeom>
+        </p:spPr>
+        <p:style>
+          <a:lnRef idx="2">
+            <a:schemeClr val="dk1"/>
+          </a:lnRef>
+          <a:fillRef idx="1">
+            <a:schemeClr val="lt1"/>
+          </a:fillRef>
+          <a:effectRef idx="0">
+            <a:schemeClr val="dk1"/>
+          </a:effectRef>
+          <a:fontRef idx="minor">
+            <a:schemeClr val="dk1"/>
+          </a:fontRef>
+        </p:style>
+        <p:txBody>
+          <a:bodyPr rtlCol="0" anchor="ctr"/>
+          <a:lstStyle/>
+          <a:p>
+            <a:endParaRPr lang="LID4096" dirty="0"/>
+          </a:p>
+        </p:txBody>
+      </p:sp>
+      <p:grpSp>
+        <p:nvGrpSpPr>
+          <p:cNvPr id="9" name="Group 8">
+            <a:extLst>
+              <a:ext uri="{FF2B5EF4-FFF2-40B4-BE49-F238E27FC236}">
+                <a16:creationId xmlns:a16="http://schemas.microsoft.com/office/drawing/2014/main" id="{02BB986B-77EA-43B9-8A4D-EB7D0442B0E9}"/>
+              </a:ext>
+            </a:extLst>
+          </p:cNvPr>
+          <p:cNvGrpSpPr/>
+          <p:nvPr/>
+        </p:nvGrpSpPr>
+        <p:grpSpPr>
+          <a:xfrm>
+            <a:off x="3045966" y="2980545"/>
+            <a:ext cx="2124118" cy="523220"/>
+            <a:chOff x="3045966" y="4036026"/>
+            <a:chExt cx="2124118" cy="523220"/>
+          </a:xfrm>
+        </p:grpSpPr>
+        <p:pic>
+          <p:nvPicPr>
+            <p:cNvPr id="10" name="Picture 9">
+              <a:extLst>
+                <a:ext uri="{FF2B5EF4-FFF2-40B4-BE49-F238E27FC236}">
+                  <a16:creationId xmlns:a16="http://schemas.microsoft.com/office/drawing/2014/main" id="{A8659946-4772-4A6A-A3CE-F4D644FB0641}"/>
+                </a:ext>
+              </a:extLst>
+            </p:cNvPr>
+            <p:cNvPicPr>
+              <a:picLocks noChangeAspect="1"/>
+            </p:cNvPicPr>
+            <p:nvPr/>
+          </p:nvPicPr>
+          <p:blipFill>
+            <a:blip r:embed="rId3"/>
+            <a:stretch>
+              <a:fillRect/>
+            </a:stretch>
+          </p:blipFill>
+          <p:spPr>
+            <a:xfrm>
+              <a:off x="3045966" y="4084089"/>
+              <a:ext cx="427094" cy="427094"/>
+            </a:xfrm>
+            <a:prstGeom prst="rect">
+              <a:avLst/>
+            </a:prstGeom>
+          </p:spPr>
+        </p:pic>
+        <p:sp>
+          <p:nvSpPr>
+            <p:cNvPr id="11" name="TextBox 10">
+              <a:extLst>
+                <a:ext uri="{FF2B5EF4-FFF2-40B4-BE49-F238E27FC236}">
+                  <a16:creationId xmlns:a16="http://schemas.microsoft.com/office/drawing/2014/main" id="{A3F08E6F-4DC1-45E9-BAF5-9D25D4934CC3}"/>
+                </a:ext>
+              </a:extLst>
+            </p:cNvPr>
+            <p:cNvSpPr txBox="1"/>
+            <p:nvPr/>
+          </p:nvSpPr>
+          <p:spPr>
+            <a:xfrm>
+              <a:off x="3480134" y="4036026"/>
+              <a:ext cx="1689950" cy="523220"/>
+            </a:xfrm>
+            <a:prstGeom prst="rect">
+              <a:avLst/>
+            </a:prstGeom>
+            <a:noFill/>
+          </p:spPr>
+          <p:txBody>
+            <a:bodyPr wrap="none" rtlCol="0">
+              <a:spAutoFit/>
+            </a:bodyPr>
+            <a:lstStyle/>
+            <a:p>
+              <a:r>
+                <a:rPr lang="en-US" sz="1400" b="1" dirty="0">
+                  <a:latin typeface="Segoe UI Bold" panose="020B0802040204020203" pitchFamily="34" charset="0"/>
+                  <a:cs typeface="Segoe UI Bold" panose="020B0802040204020203" pitchFamily="34" charset="0"/>
+                </a:rPr>
+                <a:t>Azure Service Bus</a:t>
+              </a:r>
+              <a:br>
+                <a:rPr lang="en-US" sz="1400" b="1" dirty="0">
+                  <a:latin typeface="Segoe UI Bold" panose="020B0802040204020203" pitchFamily="34" charset="0"/>
+                  <a:cs typeface="Segoe UI Bold" panose="020B0802040204020203" pitchFamily="34" charset="0"/>
+                </a:rPr>
+              </a:br>
+              <a:r>
+                <a:rPr lang="en-US" sz="1400" dirty="0">
+                  <a:latin typeface="Segoe UI Light" panose="020B0502040204020203" pitchFamily="34" charset="0"/>
+                  <a:cs typeface="Segoe UI Light" panose="020B0502040204020203" pitchFamily="34" charset="0"/>
+                </a:rPr>
+                <a:t>Namespace</a:t>
+              </a:r>
+              <a:endParaRPr lang="LID4096" sz="1400" dirty="0">
+                <a:latin typeface="Segoe UI Light" panose="020B0502040204020203" pitchFamily="34" charset="0"/>
+                <a:cs typeface="Segoe UI Light" panose="020B0502040204020203" pitchFamily="34" charset="0"/>
+              </a:endParaRPr>
+            </a:p>
+          </p:txBody>
+        </p:sp>
+      </p:grpSp>
+      <p:grpSp>
+        <p:nvGrpSpPr>
+          <p:cNvPr id="12" name="Group 11">
+            <a:extLst>
+              <a:ext uri="{FF2B5EF4-FFF2-40B4-BE49-F238E27FC236}">
+                <a16:creationId xmlns:a16="http://schemas.microsoft.com/office/drawing/2014/main" id="{12724643-CF1A-4432-9437-6D3BF533C2DA}"/>
+              </a:ext>
+            </a:extLst>
+          </p:cNvPr>
+          <p:cNvGrpSpPr/>
+          <p:nvPr/>
+        </p:nvGrpSpPr>
+        <p:grpSpPr>
+          <a:xfrm>
+            <a:off x="6367054" y="3765433"/>
+            <a:ext cx="1268617" cy="770092"/>
+            <a:chOff x="5500099" y="4908430"/>
+            <a:chExt cx="1268617" cy="770092"/>
+          </a:xfrm>
+        </p:grpSpPr>
+        <p:pic>
+          <p:nvPicPr>
+            <p:cNvPr id="13" name="Picture 12">
+              <a:extLst>
+                <a:ext uri="{FF2B5EF4-FFF2-40B4-BE49-F238E27FC236}">
+                  <a16:creationId xmlns:a16="http://schemas.microsoft.com/office/drawing/2014/main" id="{76F8CECB-D6EA-4A62-A860-A73C66BB1577}"/>
+                </a:ext>
+              </a:extLst>
+            </p:cNvPr>
+            <p:cNvPicPr>
+              <a:picLocks noChangeAspect="1"/>
+            </p:cNvPicPr>
+            <p:nvPr/>
+          </p:nvPicPr>
+          <p:blipFill>
+            <a:blip r:embed="rId4"/>
+            <a:stretch>
+              <a:fillRect/>
+            </a:stretch>
+          </p:blipFill>
+          <p:spPr>
+            <a:xfrm>
+              <a:off x="5867400" y="4908430"/>
+              <a:ext cx="457200" cy="457200"/>
+            </a:xfrm>
+            <a:prstGeom prst="rect">
+              <a:avLst/>
+            </a:prstGeom>
+          </p:spPr>
+        </p:pic>
+        <p:sp>
+          <p:nvSpPr>
+            <p:cNvPr id="14" name="TextBox 13">
+              <a:extLst>
+                <a:ext uri="{FF2B5EF4-FFF2-40B4-BE49-F238E27FC236}">
+                  <a16:creationId xmlns:a16="http://schemas.microsoft.com/office/drawing/2014/main" id="{6BCA753C-FFC5-43C8-8F7E-04FB3CF88EEF}"/>
+                </a:ext>
+              </a:extLst>
+            </p:cNvPr>
+            <p:cNvSpPr txBox="1"/>
+            <p:nvPr/>
+          </p:nvSpPr>
+          <p:spPr>
+            <a:xfrm>
+              <a:off x="5500099" y="5370745"/>
+              <a:ext cx="1268617" cy="307777"/>
+            </a:xfrm>
+            <a:prstGeom prst="rect">
+              <a:avLst/>
+            </a:prstGeom>
+            <a:noFill/>
+          </p:spPr>
+          <p:txBody>
+            <a:bodyPr wrap="none" rtlCol="0">
+              <a:spAutoFit/>
+            </a:bodyPr>
+            <a:lstStyle/>
+            <a:p>
+              <a:r>
+                <a:rPr lang="en-US" sz="1400" b="1" dirty="0">
+                  <a:latin typeface="Segoe UI Bold" panose="020B0802040204020203" pitchFamily="34" charset="0"/>
+                  <a:cs typeface="Segoe UI Bold" panose="020B0802040204020203" pitchFamily="34" charset="0"/>
+                </a:rPr>
+                <a:t>Orders</a:t>
+              </a:r>
+              <a:r>
+                <a:rPr lang="en-US" sz="1400" b="1" dirty="0"/>
+                <a:t> </a:t>
+              </a:r>
+              <a:r>
+                <a:rPr lang="en-US" sz="1400" dirty="0">
+                  <a:latin typeface="Segoe UI Light" panose="020B0502040204020203" pitchFamily="34" charset="0"/>
+                  <a:cs typeface="Segoe UI Light" panose="020B0502040204020203" pitchFamily="34" charset="0"/>
+                </a:rPr>
+                <a:t>queue</a:t>
+              </a:r>
+              <a:endParaRPr lang="LID4096" sz="1400" dirty="0">
+                <a:latin typeface="Segoe UI Light" panose="020B0502040204020203" pitchFamily="34" charset="0"/>
+                <a:cs typeface="Segoe UI Light" panose="020B0502040204020203" pitchFamily="34" charset="0"/>
+              </a:endParaRPr>
+            </a:p>
+          </p:txBody>
+        </p:sp>
+      </p:grpSp>
+      <p:grpSp>
+        <p:nvGrpSpPr>
+          <p:cNvPr id="15" name="Group 14">
+            <a:extLst>
+              <a:ext uri="{FF2B5EF4-FFF2-40B4-BE49-F238E27FC236}">
+                <a16:creationId xmlns:a16="http://schemas.microsoft.com/office/drawing/2014/main" id="{3ADD424D-D4BA-4A1C-953E-811D55A6ABE9}"/>
+              </a:ext>
+            </a:extLst>
+          </p:cNvPr>
+          <p:cNvGrpSpPr/>
+          <p:nvPr/>
+        </p:nvGrpSpPr>
+        <p:grpSpPr>
+          <a:xfrm>
+            <a:off x="5512289" y="960992"/>
+            <a:ext cx="2901334" cy="1137083"/>
+            <a:chOff x="1676409" y="1718260"/>
+            <a:chExt cx="2901334" cy="1137083"/>
+          </a:xfrm>
+        </p:grpSpPr>
+        <p:sp>
+          <p:nvSpPr>
+            <p:cNvPr id="16" name="Rectangle 15">
+              <a:extLst>
+                <a:ext uri="{FF2B5EF4-FFF2-40B4-BE49-F238E27FC236}">
+                  <a16:creationId xmlns:a16="http://schemas.microsoft.com/office/drawing/2014/main" id="{8AD0DAE6-0E3C-4E6C-882D-0D015781F20F}"/>
+                </a:ext>
+              </a:extLst>
+            </p:cNvPr>
+            <p:cNvSpPr/>
+            <p:nvPr/>
+          </p:nvSpPr>
+          <p:spPr>
+            <a:xfrm>
+              <a:off x="1742537" y="2087592"/>
+              <a:ext cx="2769079" cy="767751"/>
+            </a:xfrm>
+            <a:prstGeom prst="rect">
+              <a:avLst/>
+            </a:prstGeom>
+          </p:spPr>
+          <p:style>
+            <a:lnRef idx="2">
+              <a:schemeClr val="dk1"/>
+            </a:lnRef>
+            <a:fillRef idx="1">
+              <a:schemeClr val="lt1"/>
+            </a:fillRef>
+            <a:effectRef idx="0">
+              <a:schemeClr val="dk1"/>
+            </a:effectRef>
+            <a:fontRef idx="minor">
+              <a:schemeClr val="dk1"/>
+            </a:fontRef>
+          </p:style>
+          <p:txBody>
+            <a:bodyPr rtlCol="0" anchor="ctr"/>
+            <a:lstStyle/>
+            <a:p>
+              <a:r>
+                <a:rPr lang="en-US" dirty="0">
+                  <a:latin typeface="Segoe UI" panose="020B0502040204020203" pitchFamily="34" charset="0"/>
+                  <a:cs typeface="Segoe UI" panose="020B0502040204020203" pitchFamily="34" charset="0"/>
+                </a:rPr>
+                <a:t>  .NET Core Worker</a:t>
+              </a:r>
+              <a:endParaRPr lang="LID4096" dirty="0">
+                <a:latin typeface="Segoe UI" panose="020B0502040204020203" pitchFamily="34" charset="0"/>
+                <a:cs typeface="Segoe UI" panose="020B0502040204020203" pitchFamily="34" charset="0"/>
+              </a:endParaRPr>
+            </a:p>
+          </p:txBody>
+        </p:sp>
+        <p:sp>
+          <p:nvSpPr>
+            <p:cNvPr id="17" name="TextBox 16">
+              <a:extLst>
+                <a:ext uri="{FF2B5EF4-FFF2-40B4-BE49-F238E27FC236}">
+                  <a16:creationId xmlns:a16="http://schemas.microsoft.com/office/drawing/2014/main" id="{004DA272-BB38-46EC-A7D8-EF2F3ED09C31}"/>
+                </a:ext>
+              </a:extLst>
+            </p:cNvPr>
+            <p:cNvSpPr txBox="1"/>
+            <p:nvPr/>
+          </p:nvSpPr>
+          <p:spPr>
+            <a:xfrm>
+              <a:off x="1676409" y="1718260"/>
+              <a:ext cx="2901334" cy="369332"/>
+            </a:xfrm>
+            <a:prstGeom prst="rect">
+              <a:avLst/>
+            </a:prstGeom>
+            <a:noFill/>
+          </p:spPr>
+          <p:txBody>
+            <a:bodyPr wrap="square" rtlCol="0">
+              <a:spAutoFit/>
+            </a:bodyPr>
+            <a:lstStyle/>
+            <a:p>
+              <a:pPr algn="ctr"/>
+              <a:r>
+                <a:rPr lang="en-US" b="1" dirty="0">
+                  <a:latin typeface="Segoe UI Bold" panose="020B0802040204020203" pitchFamily="34" charset="0"/>
+                  <a:cs typeface="Segoe UI Bold" panose="020B0802040204020203" pitchFamily="34" charset="0"/>
+                </a:rPr>
+                <a:t>Order Processor </a:t>
+              </a:r>
+              <a:r>
+                <a:rPr lang="en-US" dirty="0">
+                  <a:latin typeface="Segoe UI Light" panose="020B0502040204020203" pitchFamily="34" charset="0"/>
+                  <a:cs typeface="Segoe UI Light" panose="020B0502040204020203" pitchFamily="34" charset="0"/>
+                </a:rPr>
+                <a:t>container</a:t>
+              </a:r>
+              <a:endParaRPr lang="LID4096" dirty="0">
+                <a:latin typeface="Segoe UI Light" panose="020B0502040204020203" pitchFamily="34" charset="0"/>
+                <a:cs typeface="Segoe UI Light" panose="020B0502040204020203" pitchFamily="34" charset="0"/>
+              </a:endParaRPr>
+            </a:p>
+          </p:txBody>
+        </p:sp>
+        <p:pic>
+          <p:nvPicPr>
+            <p:cNvPr id="18" name="Picture 2">
+              <a:extLst>
+                <a:ext uri="{FF2B5EF4-FFF2-40B4-BE49-F238E27FC236}">
+                  <a16:creationId xmlns:a16="http://schemas.microsoft.com/office/drawing/2014/main" id="{55CC26A9-3A02-422E-AA04-1847A41EAA94}"/>
+                </a:ext>
+              </a:extLst>
+            </p:cNvPr>
+            <p:cNvPicPr>
+              <a:picLocks noChangeAspect="1" noChangeArrowheads="1"/>
+            </p:cNvPicPr>
+            <p:nvPr/>
+          </p:nvPicPr>
+          <p:blipFill>
+            <a:blip r:embed="rId2">
+              <a:extLst>
+                <a:ext uri="{28A0092B-C50C-407E-A947-70E740481C1C}">
+                  <a14:useLocalDpi xmlns:a14="http://schemas.microsoft.com/office/drawing/2010/main" val="0"/>
+                </a:ext>
+              </a:extLst>
+            </a:blip>
+            <a:srcRect/>
+            <a:stretch>
+              <a:fillRect/>
+            </a:stretch>
+          </p:blipFill>
+          <p:spPr bwMode="auto">
+            <a:xfrm>
+              <a:off x="3847381" y="2225614"/>
+              <a:ext cx="491706" cy="491706"/>
+            </a:xfrm>
+            <a:prstGeom prst="rect">
+              <a:avLst/>
+            </a:prstGeom>
+            <a:noFill/>
+            <a:extLst>
+              <a:ext uri="{909E8E84-426E-40DD-AFC4-6F175D3DCCD1}">
+                <a14:hiddenFill xmlns:a14="http://schemas.microsoft.com/office/drawing/2010/main">
+                  <a:solidFill>
+                    <a:srgbClr val="FFFFFF"/>
+                  </a:solidFill>
+                </a14:hiddenFill>
+              </a:ext>
+            </a:extLst>
+          </p:spPr>
+        </p:pic>
+      </p:grpSp>
+      <p:cxnSp>
+        <p:nvCxnSpPr>
+          <p:cNvPr id="19" name="Connector: Elbow 18">
+            <a:extLst>
+              <a:ext uri="{FF2B5EF4-FFF2-40B4-BE49-F238E27FC236}">
+                <a16:creationId xmlns:a16="http://schemas.microsoft.com/office/drawing/2014/main" id="{CC993DF2-CC6C-43B9-9559-634D2648418D}"/>
+              </a:ext>
+            </a:extLst>
+          </p:cNvPr>
+          <p:cNvCxnSpPr>
+            <a:cxnSpLocks/>
+            <a:stCxn id="5" idx="2"/>
+            <a:endCxn id="8" idx="1"/>
+          </p:cNvCxnSpPr>
+          <p:nvPr/>
+        </p:nvCxnSpPr>
+        <p:spPr>
+          <a:xfrm rot="16200000" flipH="1">
+            <a:off x="1864272" y="2957551"/>
+            <a:ext cx="2041170" cy="322218"/>
+          </a:xfrm>
+          <a:prstGeom prst="bentConnector2">
+            <a:avLst/>
+          </a:prstGeom>
+          <a:ln>
+            <a:prstDash val="lgDash"/>
+            <a:tailEnd type="triangle"/>
+          </a:ln>
+        </p:spPr>
+        <p:style>
+          <a:lnRef idx="1">
+            <a:schemeClr val="dk1"/>
+          </a:lnRef>
+          <a:fillRef idx="0">
+            <a:schemeClr val="dk1"/>
+          </a:fillRef>
+          <a:effectRef idx="0">
+            <a:schemeClr val="dk1"/>
+          </a:effectRef>
+          <a:fontRef idx="minor">
+            <a:schemeClr val="tx1"/>
+          </a:fontRef>
+        </p:style>
+      </p:cxnSp>
+      <p:cxnSp>
+        <p:nvCxnSpPr>
+          <p:cNvPr id="20" name="Connector: Elbow 19">
+            <a:extLst>
+              <a:ext uri="{FF2B5EF4-FFF2-40B4-BE49-F238E27FC236}">
+                <a16:creationId xmlns:a16="http://schemas.microsoft.com/office/drawing/2014/main" id="{CF42C2EF-F241-441F-AEB1-439E009D6802}"/>
+              </a:ext>
+            </a:extLst>
+          </p:cNvPr>
+          <p:cNvCxnSpPr>
+            <a:cxnSpLocks/>
+            <a:stCxn id="16" idx="2"/>
+            <a:endCxn id="13" idx="0"/>
+          </p:cNvCxnSpPr>
+          <p:nvPr/>
+        </p:nvCxnSpPr>
+        <p:spPr>
+          <a:xfrm rot="5400000">
+            <a:off x="6129277" y="2931753"/>
+            <a:ext cx="1667358" cy="2"/>
+          </a:xfrm>
+          <a:prstGeom prst="bentConnector3">
+            <a:avLst>
+              <a:gd name="adj1" fmla="val 50000"/>
+            </a:avLst>
+          </a:prstGeom>
+          <a:ln>
+            <a:headEnd type="triangle" w="med" len="med"/>
+            <a:tailEnd type="triangle" w="med" len="med"/>
+          </a:ln>
+        </p:spPr>
+        <p:style>
+          <a:lnRef idx="1">
+            <a:schemeClr val="dk1"/>
+          </a:lnRef>
+          <a:fillRef idx="0">
+            <a:schemeClr val="dk1"/>
+          </a:fillRef>
+          <a:effectRef idx="0">
+            <a:schemeClr val="dk1"/>
+          </a:effectRef>
+          <a:fontRef idx="minor">
+            <a:schemeClr val="tx1"/>
+          </a:fontRef>
+        </p:style>
+      </p:cxnSp>
+      <p:grpSp>
+        <p:nvGrpSpPr>
+          <p:cNvPr id="21" name="Group 20">
+            <a:extLst>
+              <a:ext uri="{FF2B5EF4-FFF2-40B4-BE49-F238E27FC236}">
+                <a16:creationId xmlns:a16="http://schemas.microsoft.com/office/drawing/2014/main" id="{7F911EAF-1040-4400-8BE7-F093D91CC88B}"/>
+              </a:ext>
+            </a:extLst>
+          </p:cNvPr>
+          <p:cNvGrpSpPr/>
+          <p:nvPr/>
+        </p:nvGrpSpPr>
+        <p:grpSpPr>
+          <a:xfrm>
+            <a:off x="5578414" y="5682570"/>
+            <a:ext cx="2769080" cy="1137083"/>
+            <a:chOff x="1742536" y="1718260"/>
+            <a:chExt cx="2769080" cy="1137083"/>
+          </a:xfrm>
+        </p:grpSpPr>
+        <p:sp>
+          <p:nvSpPr>
+            <p:cNvPr id="22" name="Rectangle 21">
+              <a:extLst>
+                <a:ext uri="{FF2B5EF4-FFF2-40B4-BE49-F238E27FC236}">
+                  <a16:creationId xmlns:a16="http://schemas.microsoft.com/office/drawing/2014/main" id="{0672AB20-85EC-46ED-BC1F-A6F8147128F2}"/>
+                </a:ext>
+              </a:extLst>
+            </p:cNvPr>
+            <p:cNvSpPr/>
+            <p:nvPr/>
+          </p:nvSpPr>
+          <p:spPr>
+            <a:xfrm>
+              <a:off x="1742537" y="2087592"/>
+              <a:ext cx="2769079" cy="767751"/>
+            </a:xfrm>
+            <a:prstGeom prst="rect">
+              <a:avLst/>
+            </a:prstGeom>
+          </p:spPr>
+          <p:style>
+            <a:lnRef idx="2">
+              <a:schemeClr val="dk1"/>
+            </a:lnRef>
+            <a:fillRef idx="1">
+              <a:schemeClr val="lt1"/>
+            </a:fillRef>
+            <a:effectRef idx="0">
+              <a:schemeClr val="dk1"/>
+            </a:effectRef>
+            <a:fontRef idx="minor">
+              <a:schemeClr val="dk1"/>
+            </a:fontRef>
+          </p:style>
+          <p:txBody>
+            <a:bodyPr rtlCol="0" anchor="ctr"/>
+            <a:lstStyle/>
+            <a:p>
+              <a:r>
+                <a:rPr lang="en-US" dirty="0">
+                  <a:solidFill>
+                    <a:schemeClr val="accent3">
+                      <a:lumMod val="75000"/>
+                    </a:schemeClr>
+                  </a:solidFill>
+                  <a:latin typeface="Segoe UI" panose="020B0502040204020203" pitchFamily="34" charset="0"/>
+                  <a:cs typeface="Segoe UI" panose="020B0502040204020203" pitchFamily="34" charset="0"/>
+                </a:rPr>
+                <a:t>   .NET Core</a:t>
+              </a:r>
+              <a:br>
+                <a:rPr lang="en-US" dirty="0">
+                  <a:solidFill>
+                    <a:schemeClr val="accent3">
+                      <a:lumMod val="75000"/>
+                    </a:schemeClr>
+                  </a:solidFill>
+                  <a:latin typeface="Segoe UI" panose="020B0502040204020203" pitchFamily="34" charset="0"/>
+                  <a:cs typeface="Segoe UI" panose="020B0502040204020203" pitchFamily="34" charset="0"/>
+                </a:rPr>
+              </a:br>
+              <a:r>
+                <a:rPr lang="en-US" dirty="0">
+                  <a:solidFill>
+                    <a:schemeClr val="accent3">
+                      <a:lumMod val="75000"/>
+                    </a:schemeClr>
+                  </a:solidFill>
+                  <a:latin typeface="Segoe UI" panose="020B0502040204020203" pitchFamily="34" charset="0"/>
+                  <a:cs typeface="Segoe UI" panose="020B0502040204020203" pitchFamily="34" charset="0"/>
+                </a:rPr>
+                <a:t>   Console</a:t>
+              </a:r>
+              <a:endParaRPr lang="LID4096" dirty="0">
+                <a:solidFill>
+                  <a:schemeClr val="accent3">
+                    <a:lumMod val="75000"/>
+                  </a:schemeClr>
+                </a:solidFill>
+                <a:latin typeface="Segoe UI" panose="020B0502040204020203" pitchFamily="34" charset="0"/>
+                <a:cs typeface="Segoe UI" panose="020B0502040204020203" pitchFamily="34" charset="0"/>
+              </a:endParaRPr>
+            </a:p>
+          </p:txBody>
+        </p:sp>
+        <p:sp>
+          <p:nvSpPr>
+            <p:cNvPr id="23" name="TextBox 22">
+              <a:extLst>
+                <a:ext uri="{FF2B5EF4-FFF2-40B4-BE49-F238E27FC236}">
+                  <a16:creationId xmlns:a16="http://schemas.microsoft.com/office/drawing/2014/main" id="{C76153B1-E65E-4A38-BC79-C26ACA738E11}"/>
+                </a:ext>
+              </a:extLst>
+            </p:cNvPr>
+            <p:cNvSpPr txBox="1"/>
+            <p:nvPr/>
+          </p:nvSpPr>
+          <p:spPr>
+            <a:xfrm>
+              <a:off x="1742536" y="1718260"/>
+              <a:ext cx="2769079" cy="369332"/>
+            </a:xfrm>
+            <a:prstGeom prst="rect">
+              <a:avLst/>
+            </a:prstGeom>
+            <a:noFill/>
+          </p:spPr>
+          <p:txBody>
+            <a:bodyPr wrap="square" rtlCol="0">
+              <a:spAutoFit/>
+            </a:bodyPr>
+            <a:lstStyle/>
+            <a:p>
+              <a:pPr algn="ctr"/>
+              <a:r>
+                <a:rPr lang="en-US" b="1" dirty="0">
+                  <a:solidFill>
+                    <a:schemeClr val="accent3">
+                      <a:lumMod val="75000"/>
+                    </a:schemeClr>
+                  </a:solidFill>
+                  <a:latin typeface="Segoe UI Bold" panose="020B0802040204020203" pitchFamily="34" charset="0"/>
+                  <a:cs typeface="Segoe UI Bold" panose="020B0802040204020203" pitchFamily="34" charset="0"/>
+                </a:rPr>
+                <a:t>Order Generator </a:t>
+              </a:r>
+              <a:r>
+                <a:rPr lang="en-US" dirty="0">
+                  <a:solidFill>
+                    <a:schemeClr val="accent3">
+                      <a:lumMod val="75000"/>
+                    </a:schemeClr>
+                  </a:solidFill>
+                  <a:latin typeface="Segoe UI Light" panose="020B0502040204020203" pitchFamily="34" charset="0"/>
+                  <a:cs typeface="Segoe UI Light" panose="020B0502040204020203" pitchFamily="34" charset="0"/>
+                </a:rPr>
+                <a:t>CLI</a:t>
+              </a:r>
+              <a:endParaRPr lang="LID4096" dirty="0">
+                <a:solidFill>
+                  <a:schemeClr val="accent3">
+                    <a:lumMod val="75000"/>
+                  </a:schemeClr>
+                </a:solidFill>
+                <a:latin typeface="Segoe UI Light" panose="020B0502040204020203" pitchFamily="34" charset="0"/>
+                <a:cs typeface="Segoe UI Light" panose="020B0502040204020203" pitchFamily="34" charset="0"/>
+              </a:endParaRPr>
+            </a:p>
+          </p:txBody>
+        </p:sp>
+        <p:pic>
+          <p:nvPicPr>
+            <p:cNvPr id="24" name="Picture 2">
+              <a:extLst>
+                <a:ext uri="{FF2B5EF4-FFF2-40B4-BE49-F238E27FC236}">
+                  <a16:creationId xmlns:a16="http://schemas.microsoft.com/office/drawing/2014/main" id="{BFF7FFD4-C275-483E-8992-53EB4B02D65A}"/>
+                </a:ext>
+              </a:extLst>
+            </p:cNvPr>
+            <p:cNvPicPr>
+              <a:picLocks noChangeAspect="1" noChangeArrowheads="1"/>
+            </p:cNvPicPr>
+            <p:nvPr/>
+          </p:nvPicPr>
+          <p:blipFill>
+            <a:blip r:embed="rId2">
+              <a:extLst>
+                <a:ext uri="{28A0092B-C50C-407E-A947-70E740481C1C}">
+                  <a14:useLocalDpi xmlns:a14="http://schemas.microsoft.com/office/drawing/2010/main" val="0"/>
+                </a:ext>
+              </a:extLst>
+            </a:blip>
+            <a:srcRect/>
+            <a:stretch>
+              <a:fillRect/>
+            </a:stretch>
+          </p:blipFill>
+          <p:spPr bwMode="auto">
+            <a:xfrm>
+              <a:off x="3847381" y="2225614"/>
+              <a:ext cx="491706" cy="491706"/>
+            </a:xfrm>
+            <a:prstGeom prst="rect">
+              <a:avLst/>
+            </a:prstGeom>
+            <a:noFill/>
+            <a:extLst>
+              <a:ext uri="{909E8E84-426E-40DD-AFC4-6F175D3DCCD1}">
+                <a14:hiddenFill xmlns:a14="http://schemas.microsoft.com/office/drawing/2010/main">
+                  <a:solidFill>
+                    <a:srgbClr val="FFFFFF"/>
+                  </a:solidFill>
+                </a14:hiddenFill>
+              </a:ext>
+            </a:extLst>
+          </p:spPr>
+        </p:pic>
+      </p:grpSp>
+      <p:sp>
+        <p:nvSpPr>
+          <p:cNvPr id="25" name="TextBox 24">
+            <a:extLst>
+              <a:ext uri="{FF2B5EF4-FFF2-40B4-BE49-F238E27FC236}">
+                <a16:creationId xmlns:a16="http://schemas.microsoft.com/office/drawing/2014/main" id="{191BB794-10DC-464E-99A0-9D5E999FB01E}"/>
+              </a:ext>
+            </a:extLst>
+          </p:cNvPr>
+          <p:cNvSpPr txBox="1"/>
+          <p:nvPr/>
+        </p:nvSpPr>
+        <p:spPr>
+          <a:xfrm>
+            <a:off x="2751920" y="2419663"/>
+            <a:ext cx="1456427" cy="338554"/>
+          </a:xfrm>
+          <a:prstGeom prst="rect">
+            <a:avLst/>
+          </a:prstGeom>
+          <a:noFill/>
+        </p:spPr>
+        <p:txBody>
+          <a:bodyPr wrap="square" rtlCol="0">
+            <a:spAutoFit/>
+          </a:bodyPr>
+          <a:lstStyle/>
+          <a:p>
+            <a:r>
+              <a:rPr lang="en-US" sz="1600" i="1" dirty="0">
+                <a:latin typeface="Segoe UI Light" panose="020B0502040204020203" pitchFamily="34" charset="0"/>
+                <a:cs typeface="Segoe UI Light" panose="020B0502040204020203" pitchFamily="34" charset="0"/>
+              </a:rPr>
+              <a:t>Get Metrics</a:t>
+            </a:r>
+            <a:endParaRPr lang="LID4096" sz="1600" i="1" dirty="0">
+              <a:latin typeface="Segoe UI Light" panose="020B0502040204020203" pitchFamily="34" charset="0"/>
+              <a:cs typeface="Segoe UI Light" panose="020B0502040204020203" pitchFamily="34" charset="0"/>
+            </a:endParaRPr>
+          </a:p>
+        </p:txBody>
+      </p:sp>
+      <p:sp>
+        <p:nvSpPr>
+          <p:cNvPr id="26" name="TextBox 25">
+            <a:extLst>
+              <a:ext uri="{FF2B5EF4-FFF2-40B4-BE49-F238E27FC236}">
+                <a16:creationId xmlns:a16="http://schemas.microsoft.com/office/drawing/2014/main" id="{6B6F3ACC-F244-4B19-B8EA-72868AE64C4E}"/>
+              </a:ext>
+            </a:extLst>
+          </p:cNvPr>
+          <p:cNvSpPr txBox="1"/>
+          <p:nvPr/>
+        </p:nvSpPr>
+        <p:spPr>
+          <a:xfrm>
+            <a:off x="7063015" y="2624670"/>
+            <a:ext cx="1456427" cy="584775"/>
+          </a:xfrm>
+          <a:prstGeom prst="rect">
+            <a:avLst/>
+          </a:prstGeom>
+          <a:noFill/>
+        </p:spPr>
+        <p:txBody>
+          <a:bodyPr wrap="square" rtlCol="0">
+            <a:spAutoFit/>
+          </a:bodyPr>
+          <a:lstStyle/>
+          <a:p>
+            <a:r>
+              <a:rPr lang="en-US" sz="1600" i="1" dirty="0">
+                <a:latin typeface="Segoe UI Light" panose="020B0502040204020203" pitchFamily="34" charset="0"/>
+                <a:cs typeface="Segoe UI Light" panose="020B0502040204020203" pitchFamily="34" charset="0"/>
+              </a:rPr>
+              <a:t>Process</a:t>
+            </a:r>
+            <a:br>
+              <a:rPr lang="en-US" sz="1600" i="1" dirty="0">
+                <a:latin typeface="Segoe UI Light" panose="020B0502040204020203" pitchFamily="34" charset="0"/>
+                <a:cs typeface="Segoe UI Light" panose="020B0502040204020203" pitchFamily="34" charset="0"/>
+              </a:rPr>
+            </a:br>
+            <a:r>
+              <a:rPr lang="en-US" sz="1600" i="1" dirty="0">
+                <a:latin typeface="Segoe UI Light" panose="020B0502040204020203" pitchFamily="34" charset="0"/>
+                <a:cs typeface="Segoe UI Light" panose="020B0502040204020203" pitchFamily="34" charset="0"/>
+              </a:rPr>
+              <a:t>Messages</a:t>
+            </a:r>
+            <a:endParaRPr lang="LID4096" sz="1600" i="1" dirty="0">
+              <a:latin typeface="Segoe UI Light" panose="020B0502040204020203" pitchFamily="34" charset="0"/>
+              <a:cs typeface="Segoe UI Light" panose="020B0502040204020203" pitchFamily="34" charset="0"/>
+            </a:endParaRPr>
+          </a:p>
+        </p:txBody>
+      </p:sp>
+      <p:cxnSp>
+        <p:nvCxnSpPr>
+          <p:cNvPr id="27" name="Connector: Elbow 26">
+            <a:extLst>
+              <a:ext uri="{FF2B5EF4-FFF2-40B4-BE49-F238E27FC236}">
+                <a16:creationId xmlns:a16="http://schemas.microsoft.com/office/drawing/2014/main" id="{56684E54-7404-44DA-B0E0-2B7BEC968840}"/>
+              </a:ext>
+            </a:extLst>
+          </p:cNvPr>
+          <p:cNvCxnSpPr>
+            <a:cxnSpLocks/>
+          </p:cNvCxnSpPr>
+          <p:nvPr/>
+        </p:nvCxnSpPr>
+        <p:spPr>
+          <a:xfrm rot="5400000">
+            <a:off x="6389430" y="5109047"/>
+            <a:ext cx="1147045" cy="1"/>
+          </a:xfrm>
+          <a:prstGeom prst="bentConnector3">
+            <a:avLst>
+              <a:gd name="adj1" fmla="val 50000"/>
+            </a:avLst>
+          </a:prstGeom>
+          <a:ln>
+            <a:solidFill>
+              <a:schemeClr val="accent3"/>
+            </a:solidFill>
+            <a:prstDash val="lgDash"/>
+            <a:headEnd type="triangle" w="med" len="med"/>
+            <a:tailEnd type="none" w="med" len="med"/>
+          </a:ln>
+        </p:spPr>
+        <p:style>
+          <a:lnRef idx="1">
+            <a:schemeClr val="dk1"/>
+          </a:lnRef>
+          <a:fillRef idx="0">
+            <a:schemeClr val="dk1"/>
+          </a:fillRef>
+          <a:effectRef idx="0">
+            <a:schemeClr val="dk1"/>
+          </a:effectRef>
+          <a:fontRef idx="minor">
+            <a:schemeClr val="tx1"/>
+          </a:fontRef>
+        </p:style>
+      </p:cxnSp>
+      <p:sp>
+        <p:nvSpPr>
+          <p:cNvPr id="28" name="TextBox 27">
+            <a:extLst>
+              <a:ext uri="{FF2B5EF4-FFF2-40B4-BE49-F238E27FC236}">
+                <a16:creationId xmlns:a16="http://schemas.microsoft.com/office/drawing/2014/main" id="{8789B42B-1061-4C42-8603-B1BD46A39A38}"/>
+              </a:ext>
+            </a:extLst>
+          </p:cNvPr>
+          <p:cNvSpPr txBox="1"/>
+          <p:nvPr/>
+        </p:nvSpPr>
+        <p:spPr>
+          <a:xfrm>
+            <a:off x="6962953" y="4851668"/>
+            <a:ext cx="1456427" cy="584775"/>
+          </a:xfrm>
+          <a:prstGeom prst="rect">
+            <a:avLst/>
+          </a:prstGeom>
+          <a:noFill/>
+        </p:spPr>
+        <p:txBody>
+          <a:bodyPr wrap="square" rtlCol="0">
+            <a:spAutoFit/>
+          </a:bodyPr>
+          <a:lstStyle/>
+          <a:p>
+            <a:r>
+              <a:rPr lang="en-US" sz="1600" i="1" dirty="0">
+                <a:solidFill>
+                  <a:schemeClr val="accent3">
+                    <a:lumMod val="75000"/>
+                  </a:schemeClr>
+                </a:solidFill>
+                <a:latin typeface="Segoe UI Light" panose="020B0502040204020203" pitchFamily="34" charset="0"/>
+                <a:cs typeface="Segoe UI Light" panose="020B0502040204020203" pitchFamily="34" charset="0"/>
+              </a:rPr>
+              <a:t>Generate</a:t>
+            </a:r>
+            <a:br>
+              <a:rPr lang="en-US" sz="1600" i="1" dirty="0">
+                <a:solidFill>
+                  <a:schemeClr val="accent3">
+                    <a:lumMod val="75000"/>
+                  </a:schemeClr>
+                </a:solidFill>
+                <a:latin typeface="Segoe UI Light" panose="020B0502040204020203" pitchFamily="34" charset="0"/>
+                <a:cs typeface="Segoe UI Light" panose="020B0502040204020203" pitchFamily="34" charset="0"/>
+              </a:rPr>
+            </a:br>
+            <a:r>
+              <a:rPr lang="en-US" sz="1600" i="1" dirty="0">
+                <a:solidFill>
+                  <a:schemeClr val="accent3">
+                    <a:lumMod val="75000"/>
+                  </a:schemeClr>
+                </a:solidFill>
+                <a:latin typeface="Segoe UI Light" panose="020B0502040204020203" pitchFamily="34" charset="0"/>
+                <a:cs typeface="Segoe UI Light" panose="020B0502040204020203" pitchFamily="34" charset="0"/>
+              </a:rPr>
+              <a:t>Messages</a:t>
+            </a:r>
+            <a:endParaRPr lang="LID4096" sz="1600" i="1" dirty="0">
+              <a:solidFill>
+                <a:schemeClr val="accent3">
+                  <a:lumMod val="75000"/>
+                </a:schemeClr>
+              </a:solidFill>
+              <a:latin typeface="Segoe UI Light" panose="020B0502040204020203" pitchFamily="34" charset="0"/>
+              <a:cs typeface="Segoe UI Light" panose="020B0502040204020203" pitchFamily="34" charset="0"/>
+            </a:endParaRPr>
+          </a:p>
+        </p:txBody>
+      </p:sp>
+      <p:pic>
+        <p:nvPicPr>
+          <p:cNvPr id="29" name="Picture 2" descr="Kubernetes">
+            <a:extLst>
+              <a:ext uri="{FF2B5EF4-FFF2-40B4-BE49-F238E27FC236}">
+                <a16:creationId xmlns:a16="http://schemas.microsoft.com/office/drawing/2014/main" id="{FF16D4A8-BBD5-46F2-89B7-8B5998271197}"/>
+              </a:ext>
+            </a:extLst>
+          </p:cNvPr>
+          <p:cNvPicPr>
+            <a:picLocks noChangeAspect="1" noChangeArrowheads="1"/>
+          </p:cNvPicPr>
+          <p:nvPr/>
+        </p:nvPicPr>
+        <p:blipFill>
+          <a:blip r:embed="rId5">
+            <a:extLst>
+              <a:ext uri="{28A0092B-C50C-407E-A947-70E740481C1C}">
+                <a14:useLocalDpi xmlns:a14="http://schemas.microsoft.com/office/drawing/2010/main" val="0"/>
+              </a:ext>
+            </a:extLst>
+          </a:blip>
+          <a:srcRect/>
+          <a:stretch>
+            <a:fillRect/>
+          </a:stretch>
+        </p:blipFill>
+        <p:spPr bwMode="auto">
+          <a:xfrm>
+            <a:off x="1069675" y="169841"/>
+            <a:ext cx="1965137" cy="424500"/>
+          </a:xfrm>
+          <a:prstGeom prst="rect">
+            <a:avLst/>
+          </a:prstGeom>
+          <a:noFill/>
+          <a:extLst>
+            <a:ext uri="{909E8E84-426E-40DD-AFC4-6F175D3DCCD1}">
+              <a14:hiddenFill xmlns:a14="http://schemas.microsoft.com/office/drawing/2010/main">
+                <a:solidFill>
+                  <a:srgbClr val="FFFFFF"/>
+                </a:solidFill>
+              </a14:hiddenFill>
+            </a:ext>
+          </a:extLst>
+        </p:spPr>
+      </p:pic>
+    </p:spTree>
+    <p:extLst>
+      <p:ext uri="{BB962C8B-B14F-4D97-AF65-F5344CB8AC3E}">
+        <p14:creationId xmlns:p14="http://schemas.microsoft.com/office/powerpoint/2010/main" val="2695233683"/>
+      </p:ext>
+    </p:extLst>
+  </p:cSld>
+  <p:clrMapOvr>
+    <a:masterClrMapping/>
+  </p:clrMapOvr>
+</p:sld>
+</file>
+
+<file path=ppt/slides/slide2.xml><?xml version="1.0" encoding="utf-8"?>
 <p:sld xmlns:a="http://schemas.openxmlformats.org/drawingml/2006/main" xmlns:r="http://schemas.openxmlformats.org/officeDocument/2006/relationships" xmlns:p="http://schemas.openxmlformats.org/presentationml/2006/main">
   <p:cSld>
     <p:spTree>

</xml_diff>

<commit_message>
docs: Provide overview of scenario (#24)
* docs: Provide overview of scenario

Signed-off-by: Tom Kerkhove <kerkhove.tom@gmail.com>

* Optimize image

Signed-off-by: Tom Kerkhove <kerkhove.tom@gmail.com>
</commit_message>
<xml_diff>
--- a/images/schematics.pptx
+++ b/images/schematics.pptx
@@ -5,7 +5,8 @@
     <p:sldMasterId id="2147483648" r:id="rId1"/>
   </p:sldMasterIdLst>
   <p:sldIdLst>
-    <p:sldId id="258" r:id="rId2"/>
+    <p:sldId id="259" r:id="rId2"/>
+    <p:sldId id="258" r:id="rId3"/>
   </p:sldIdLst>
   <p:sldSz cx="12192000" cy="6858000"/>
   <p:notesSz cx="6858000" cy="9144000"/>
@@ -261,7 +262,7 @@
           <a:p>
             <a:fld id="{371346F4-35EC-4130-B4CC-0DFD34D5B213}" type="datetimeFigureOut">
               <a:rPr lang="LID4096" smtClean="0"/>
-              <a:t>11/13/2020</a:t>
+              <a:t>08/23/2021</a:t>
             </a:fld>
             <a:endParaRPr lang="LID4096"/>
           </a:p>
@@ -461,7 +462,7 @@
           <a:p>
             <a:fld id="{371346F4-35EC-4130-B4CC-0DFD34D5B213}" type="datetimeFigureOut">
               <a:rPr lang="LID4096" smtClean="0"/>
-              <a:t>11/13/2020</a:t>
+              <a:t>08/23/2021</a:t>
             </a:fld>
             <a:endParaRPr lang="LID4096"/>
           </a:p>
@@ -671,7 +672,7 @@
           <a:p>
             <a:fld id="{371346F4-35EC-4130-B4CC-0DFD34D5B213}" type="datetimeFigureOut">
               <a:rPr lang="LID4096" smtClean="0"/>
-              <a:t>11/13/2020</a:t>
+              <a:t>08/23/2021</a:t>
             </a:fld>
             <a:endParaRPr lang="LID4096"/>
           </a:p>
@@ -871,7 +872,7 @@
           <a:p>
             <a:fld id="{371346F4-35EC-4130-B4CC-0DFD34D5B213}" type="datetimeFigureOut">
               <a:rPr lang="LID4096" smtClean="0"/>
-              <a:t>11/13/2020</a:t>
+              <a:t>08/23/2021</a:t>
             </a:fld>
             <a:endParaRPr lang="LID4096"/>
           </a:p>
@@ -1147,7 +1148,7 @@
           <a:p>
             <a:fld id="{371346F4-35EC-4130-B4CC-0DFD34D5B213}" type="datetimeFigureOut">
               <a:rPr lang="LID4096" smtClean="0"/>
-              <a:t>11/13/2020</a:t>
+              <a:t>08/23/2021</a:t>
             </a:fld>
             <a:endParaRPr lang="LID4096"/>
           </a:p>
@@ -1415,7 +1416,7 @@
           <a:p>
             <a:fld id="{371346F4-35EC-4130-B4CC-0DFD34D5B213}" type="datetimeFigureOut">
               <a:rPr lang="LID4096" smtClean="0"/>
-              <a:t>11/13/2020</a:t>
+              <a:t>08/23/2021</a:t>
             </a:fld>
             <a:endParaRPr lang="LID4096"/>
           </a:p>
@@ -1830,7 +1831,7 @@
           <a:p>
             <a:fld id="{371346F4-35EC-4130-B4CC-0DFD34D5B213}" type="datetimeFigureOut">
               <a:rPr lang="LID4096" smtClean="0"/>
-              <a:t>11/13/2020</a:t>
+              <a:t>08/23/2021</a:t>
             </a:fld>
             <a:endParaRPr lang="LID4096"/>
           </a:p>
@@ -1972,7 +1973,7 @@
           <a:p>
             <a:fld id="{371346F4-35EC-4130-B4CC-0DFD34D5B213}" type="datetimeFigureOut">
               <a:rPr lang="LID4096" smtClean="0"/>
-              <a:t>11/13/2020</a:t>
+              <a:t>08/23/2021</a:t>
             </a:fld>
             <a:endParaRPr lang="LID4096"/>
           </a:p>
@@ -2085,7 +2086,7 @@
           <a:p>
             <a:fld id="{371346F4-35EC-4130-B4CC-0DFD34D5B213}" type="datetimeFigureOut">
               <a:rPr lang="LID4096" smtClean="0"/>
-              <a:t>11/13/2020</a:t>
+              <a:t>08/23/2021</a:t>
             </a:fld>
             <a:endParaRPr lang="LID4096"/>
           </a:p>
@@ -2398,7 +2399,7 @@
           <a:p>
             <a:fld id="{371346F4-35EC-4130-B4CC-0DFD34D5B213}" type="datetimeFigureOut">
               <a:rPr lang="LID4096" smtClean="0"/>
-              <a:t>11/13/2020</a:t>
+              <a:t>08/23/2021</a:t>
             </a:fld>
             <a:endParaRPr lang="LID4096"/>
           </a:p>
@@ -2687,7 +2688,7 @@
           <a:p>
             <a:fld id="{371346F4-35EC-4130-B4CC-0DFD34D5B213}" type="datetimeFigureOut">
               <a:rPr lang="LID4096" smtClean="0"/>
-              <a:t>11/13/2020</a:t>
+              <a:t>08/23/2021</a:t>
             </a:fld>
             <a:endParaRPr lang="LID4096"/>
           </a:p>
@@ -2930,7 +2931,7 @@
           <a:p>
             <a:fld id="{371346F4-35EC-4130-B4CC-0DFD34D5B213}" type="datetimeFigureOut">
               <a:rPr lang="LID4096" smtClean="0"/>
-              <a:t>11/13/2020</a:t>
+              <a:t>08/23/2021</a:t>
             </a:fld>
             <a:endParaRPr lang="LID4096"/>
           </a:p>
@@ -3331,6 +3332,1272 @@
 </file>
 
 <file path=ppt/slides/slide1.xml><?xml version="1.0" encoding="utf-8"?>
+<p:sld xmlns:a="http://schemas.openxmlformats.org/drawingml/2006/main" xmlns:r="http://schemas.openxmlformats.org/officeDocument/2006/relationships" xmlns:p="http://schemas.openxmlformats.org/presentationml/2006/main">
+  <p:cSld>
+    <p:spTree>
+      <p:nvGrpSpPr>
+        <p:cNvPr id="1" name=""/>
+        <p:cNvGrpSpPr/>
+        <p:nvPr/>
+      </p:nvGrpSpPr>
+      <p:grpSpPr>
+        <a:xfrm>
+          <a:off x="0" y="0"/>
+          <a:ext cx="0" cy="0"/>
+          <a:chOff x="0" y="0"/>
+          <a:chExt cx="0" cy="0"/>
+        </a:xfrm>
+      </p:grpSpPr>
+      <p:sp>
+        <p:nvSpPr>
+          <p:cNvPr id="3" name="Rectangle 2">
+            <a:extLst>
+              <a:ext uri="{FF2B5EF4-FFF2-40B4-BE49-F238E27FC236}">
+                <a16:creationId xmlns:a16="http://schemas.microsoft.com/office/drawing/2014/main" id="{1E28F949-1A45-410F-89EB-E8EC1901614F}"/>
+              </a:ext>
+            </a:extLst>
+          </p:cNvPr>
+          <p:cNvSpPr/>
+          <p:nvPr/>
+        </p:nvSpPr>
+        <p:spPr>
+          <a:xfrm>
+            <a:off x="1069675" y="656578"/>
+            <a:ext cx="7712016" cy="1747824"/>
+          </a:xfrm>
+          <a:prstGeom prst="rect">
+            <a:avLst/>
+          </a:prstGeom>
+          <a:ln w="28575"/>
+        </p:spPr>
+        <p:style>
+          <a:lnRef idx="2">
+            <a:schemeClr val="accent5"/>
+          </a:lnRef>
+          <a:fillRef idx="1">
+            <a:schemeClr val="lt1"/>
+          </a:fillRef>
+          <a:effectRef idx="0">
+            <a:schemeClr val="accent5"/>
+          </a:effectRef>
+          <a:fontRef idx="minor">
+            <a:schemeClr val="dk1"/>
+          </a:fontRef>
+        </p:style>
+        <p:txBody>
+          <a:bodyPr rtlCol="0" anchor="ctr"/>
+          <a:lstStyle/>
+          <a:p>
+            <a:pPr algn="ctr"/>
+            <a:endParaRPr lang="LID4096"/>
+          </a:p>
+        </p:txBody>
+      </p:sp>
+      <p:grpSp>
+        <p:nvGrpSpPr>
+          <p:cNvPr id="4" name="Group 3">
+            <a:extLst>
+              <a:ext uri="{FF2B5EF4-FFF2-40B4-BE49-F238E27FC236}">
+                <a16:creationId xmlns:a16="http://schemas.microsoft.com/office/drawing/2014/main" id="{02706037-1E8D-490D-B160-81905FDDDF09}"/>
+              </a:ext>
+            </a:extLst>
+          </p:cNvPr>
+          <p:cNvGrpSpPr/>
+          <p:nvPr/>
+        </p:nvGrpSpPr>
+        <p:grpSpPr>
+          <a:xfrm>
+            <a:off x="1339207" y="960992"/>
+            <a:ext cx="2769080" cy="1137083"/>
+            <a:chOff x="1742536" y="1718260"/>
+            <a:chExt cx="2769080" cy="1137083"/>
+          </a:xfrm>
+        </p:grpSpPr>
+        <p:sp>
+          <p:nvSpPr>
+            <p:cNvPr id="5" name="Rectangle 4">
+              <a:extLst>
+                <a:ext uri="{FF2B5EF4-FFF2-40B4-BE49-F238E27FC236}">
+                  <a16:creationId xmlns:a16="http://schemas.microsoft.com/office/drawing/2014/main" id="{3593F34C-1F4E-4AA1-8F11-8005307F6411}"/>
+                </a:ext>
+              </a:extLst>
+            </p:cNvPr>
+            <p:cNvSpPr/>
+            <p:nvPr/>
+          </p:nvSpPr>
+          <p:spPr>
+            <a:xfrm>
+              <a:off x="1742537" y="2087592"/>
+              <a:ext cx="2769079" cy="767751"/>
+            </a:xfrm>
+            <a:prstGeom prst="rect">
+              <a:avLst/>
+            </a:prstGeom>
+          </p:spPr>
+          <p:style>
+            <a:lnRef idx="2">
+              <a:schemeClr val="dk1"/>
+            </a:lnRef>
+            <a:fillRef idx="1">
+              <a:schemeClr val="lt1"/>
+            </a:fillRef>
+            <a:effectRef idx="0">
+              <a:schemeClr val="dk1"/>
+            </a:effectRef>
+            <a:fontRef idx="minor">
+              <a:schemeClr val="dk1"/>
+            </a:fontRef>
+          </p:style>
+          <p:txBody>
+            <a:bodyPr rtlCol="0" anchor="ctr"/>
+            <a:lstStyle/>
+            <a:p>
+              <a:r>
+                <a:rPr lang="en-US" dirty="0">
+                  <a:latin typeface="Segoe UI" panose="020B0502040204020203" pitchFamily="34" charset="0"/>
+                  <a:cs typeface="Segoe UI" panose="020B0502040204020203" pitchFamily="34" charset="0"/>
+                </a:rPr>
+                <a:t>  ASP.NET Core</a:t>
+              </a:r>
+              <a:br>
+                <a:rPr lang="en-US" dirty="0">
+                  <a:latin typeface="Segoe UI" panose="020B0502040204020203" pitchFamily="34" charset="0"/>
+                  <a:cs typeface="Segoe UI" panose="020B0502040204020203" pitchFamily="34" charset="0"/>
+                </a:rPr>
+              </a:br>
+              <a:r>
+                <a:rPr lang="en-US" dirty="0">
+                  <a:latin typeface="Segoe UI" panose="020B0502040204020203" pitchFamily="34" charset="0"/>
+                  <a:cs typeface="Segoe UI" panose="020B0502040204020203" pitchFamily="34" charset="0"/>
+                </a:rPr>
+                <a:t>  Website</a:t>
+              </a:r>
+              <a:endParaRPr lang="LID4096" dirty="0">
+                <a:latin typeface="Segoe UI" panose="020B0502040204020203" pitchFamily="34" charset="0"/>
+                <a:cs typeface="Segoe UI" panose="020B0502040204020203" pitchFamily="34" charset="0"/>
+              </a:endParaRPr>
+            </a:p>
+          </p:txBody>
+        </p:sp>
+        <p:sp>
+          <p:nvSpPr>
+            <p:cNvPr id="6" name="TextBox 5">
+              <a:extLst>
+                <a:ext uri="{FF2B5EF4-FFF2-40B4-BE49-F238E27FC236}">
+                  <a16:creationId xmlns:a16="http://schemas.microsoft.com/office/drawing/2014/main" id="{18BA2EC9-0CE0-49EB-835F-B0B092365A52}"/>
+                </a:ext>
+              </a:extLst>
+            </p:cNvPr>
+            <p:cNvSpPr txBox="1"/>
+            <p:nvPr/>
+          </p:nvSpPr>
+          <p:spPr>
+            <a:xfrm>
+              <a:off x="1742536" y="1718260"/>
+              <a:ext cx="2769079" cy="369332"/>
+            </a:xfrm>
+            <a:prstGeom prst="rect">
+              <a:avLst/>
+            </a:prstGeom>
+            <a:noFill/>
+          </p:spPr>
+          <p:txBody>
+            <a:bodyPr wrap="square" rtlCol="0">
+              <a:spAutoFit/>
+            </a:bodyPr>
+            <a:lstStyle/>
+            <a:p>
+              <a:pPr algn="ctr"/>
+              <a:r>
+                <a:rPr lang="en-US" b="1" dirty="0">
+                  <a:latin typeface="Segoe UI Bold" panose="020B0802040204020203" pitchFamily="34" charset="0"/>
+                  <a:cs typeface="Segoe UI Bold" panose="020B0802040204020203" pitchFamily="34" charset="0"/>
+                </a:rPr>
+                <a:t>Order Portal</a:t>
+              </a:r>
+              <a:r>
+                <a:rPr lang="en-US" b="1" dirty="0">
+                  <a:latin typeface="Segoe UI Semibold" panose="020B0702040204020203" pitchFamily="34" charset="0"/>
+                  <a:cs typeface="Segoe UI Semibold" panose="020B0702040204020203" pitchFamily="34" charset="0"/>
+                </a:rPr>
+                <a:t> </a:t>
+              </a:r>
+              <a:r>
+                <a:rPr lang="en-US" dirty="0">
+                  <a:latin typeface="Segoe UI Light" panose="020B0502040204020203" pitchFamily="34" charset="0"/>
+                  <a:cs typeface="Segoe UI Light" panose="020B0502040204020203" pitchFamily="34" charset="0"/>
+                </a:rPr>
+                <a:t>container</a:t>
+              </a:r>
+              <a:endParaRPr lang="LID4096" b="1" dirty="0">
+                <a:latin typeface="Segoe UI Light" panose="020B0502040204020203" pitchFamily="34" charset="0"/>
+                <a:cs typeface="Segoe UI Light" panose="020B0502040204020203" pitchFamily="34" charset="0"/>
+              </a:endParaRPr>
+            </a:p>
+          </p:txBody>
+        </p:sp>
+        <p:pic>
+          <p:nvPicPr>
+            <p:cNvPr id="7" name="Picture 2">
+              <a:extLst>
+                <a:ext uri="{FF2B5EF4-FFF2-40B4-BE49-F238E27FC236}">
+                  <a16:creationId xmlns:a16="http://schemas.microsoft.com/office/drawing/2014/main" id="{F20B3CFC-1BF6-4F82-92D8-03DFB4D1F4A2}"/>
+                </a:ext>
+              </a:extLst>
+            </p:cNvPr>
+            <p:cNvPicPr>
+              <a:picLocks noChangeAspect="1" noChangeArrowheads="1"/>
+            </p:cNvPicPr>
+            <p:nvPr/>
+          </p:nvPicPr>
+          <p:blipFill>
+            <a:blip r:embed="rId2">
+              <a:extLst>
+                <a:ext uri="{28A0092B-C50C-407E-A947-70E740481C1C}">
+                  <a14:useLocalDpi xmlns:a14="http://schemas.microsoft.com/office/drawing/2010/main" val="0"/>
+                </a:ext>
+              </a:extLst>
+            </a:blip>
+            <a:srcRect/>
+            <a:stretch>
+              <a:fillRect/>
+            </a:stretch>
+          </p:blipFill>
+          <p:spPr bwMode="auto">
+            <a:xfrm>
+              <a:off x="3847381" y="2225614"/>
+              <a:ext cx="491706" cy="491706"/>
+            </a:xfrm>
+            <a:prstGeom prst="rect">
+              <a:avLst/>
+            </a:prstGeom>
+            <a:noFill/>
+            <a:extLst>
+              <a:ext uri="{909E8E84-426E-40DD-AFC4-6F175D3DCCD1}">
+                <a14:hiddenFill xmlns:a14="http://schemas.microsoft.com/office/drawing/2010/main">
+                  <a:solidFill>
+                    <a:srgbClr val="FFFFFF"/>
+                  </a:solidFill>
+                </a14:hiddenFill>
+              </a:ext>
+            </a:extLst>
+          </p:spPr>
+        </p:pic>
+      </p:grpSp>
+      <p:sp>
+        <p:nvSpPr>
+          <p:cNvPr id="8" name="Rectangle 7">
+            <a:extLst>
+              <a:ext uri="{FF2B5EF4-FFF2-40B4-BE49-F238E27FC236}">
+                <a16:creationId xmlns:a16="http://schemas.microsoft.com/office/drawing/2014/main" id="{C1697494-A6C4-4C74-B677-DA25502C5FED}"/>
+              </a:ext>
+            </a:extLst>
+          </p:cNvPr>
+          <p:cNvSpPr/>
+          <p:nvPr/>
+        </p:nvSpPr>
+        <p:spPr>
+          <a:xfrm>
+            <a:off x="3045966" y="3503765"/>
+            <a:ext cx="5301529" cy="1270959"/>
+          </a:xfrm>
+          <a:prstGeom prst="rect">
+            <a:avLst/>
+          </a:prstGeom>
+        </p:spPr>
+        <p:style>
+          <a:lnRef idx="2">
+            <a:schemeClr val="dk1"/>
+          </a:lnRef>
+          <a:fillRef idx="1">
+            <a:schemeClr val="lt1"/>
+          </a:fillRef>
+          <a:effectRef idx="0">
+            <a:schemeClr val="dk1"/>
+          </a:effectRef>
+          <a:fontRef idx="minor">
+            <a:schemeClr val="dk1"/>
+          </a:fontRef>
+        </p:style>
+        <p:txBody>
+          <a:bodyPr rtlCol="0" anchor="ctr"/>
+          <a:lstStyle/>
+          <a:p>
+            <a:endParaRPr lang="LID4096" dirty="0"/>
+          </a:p>
+        </p:txBody>
+      </p:sp>
+      <p:grpSp>
+        <p:nvGrpSpPr>
+          <p:cNvPr id="9" name="Group 8">
+            <a:extLst>
+              <a:ext uri="{FF2B5EF4-FFF2-40B4-BE49-F238E27FC236}">
+                <a16:creationId xmlns:a16="http://schemas.microsoft.com/office/drawing/2014/main" id="{02BB986B-77EA-43B9-8A4D-EB7D0442B0E9}"/>
+              </a:ext>
+            </a:extLst>
+          </p:cNvPr>
+          <p:cNvGrpSpPr/>
+          <p:nvPr/>
+        </p:nvGrpSpPr>
+        <p:grpSpPr>
+          <a:xfrm>
+            <a:off x="3045966" y="2980545"/>
+            <a:ext cx="2124118" cy="523220"/>
+            <a:chOff x="3045966" y="4036026"/>
+            <a:chExt cx="2124118" cy="523220"/>
+          </a:xfrm>
+        </p:grpSpPr>
+        <p:pic>
+          <p:nvPicPr>
+            <p:cNvPr id="10" name="Picture 9">
+              <a:extLst>
+                <a:ext uri="{FF2B5EF4-FFF2-40B4-BE49-F238E27FC236}">
+                  <a16:creationId xmlns:a16="http://schemas.microsoft.com/office/drawing/2014/main" id="{A8659946-4772-4A6A-A3CE-F4D644FB0641}"/>
+                </a:ext>
+              </a:extLst>
+            </p:cNvPr>
+            <p:cNvPicPr>
+              <a:picLocks noChangeAspect="1"/>
+            </p:cNvPicPr>
+            <p:nvPr/>
+          </p:nvPicPr>
+          <p:blipFill>
+            <a:blip r:embed="rId3"/>
+            <a:stretch>
+              <a:fillRect/>
+            </a:stretch>
+          </p:blipFill>
+          <p:spPr>
+            <a:xfrm>
+              <a:off x="3045966" y="4084089"/>
+              <a:ext cx="427094" cy="427094"/>
+            </a:xfrm>
+            <a:prstGeom prst="rect">
+              <a:avLst/>
+            </a:prstGeom>
+          </p:spPr>
+        </p:pic>
+        <p:sp>
+          <p:nvSpPr>
+            <p:cNvPr id="11" name="TextBox 10">
+              <a:extLst>
+                <a:ext uri="{FF2B5EF4-FFF2-40B4-BE49-F238E27FC236}">
+                  <a16:creationId xmlns:a16="http://schemas.microsoft.com/office/drawing/2014/main" id="{A3F08E6F-4DC1-45E9-BAF5-9D25D4934CC3}"/>
+                </a:ext>
+              </a:extLst>
+            </p:cNvPr>
+            <p:cNvSpPr txBox="1"/>
+            <p:nvPr/>
+          </p:nvSpPr>
+          <p:spPr>
+            <a:xfrm>
+              <a:off x="3480134" y="4036026"/>
+              <a:ext cx="1689950" cy="523220"/>
+            </a:xfrm>
+            <a:prstGeom prst="rect">
+              <a:avLst/>
+            </a:prstGeom>
+            <a:noFill/>
+          </p:spPr>
+          <p:txBody>
+            <a:bodyPr wrap="none" rtlCol="0">
+              <a:spAutoFit/>
+            </a:bodyPr>
+            <a:lstStyle/>
+            <a:p>
+              <a:r>
+                <a:rPr lang="en-US" sz="1400" b="1" dirty="0">
+                  <a:latin typeface="Segoe UI Bold" panose="020B0802040204020203" pitchFamily="34" charset="0"/>
+                  <a:cs typeface="Segoe UI Bold" panose="020B0802040204020203" pitchFamily="34" charset="0"/>
+                </a:rPr>
+                <a:t>Azure Service Bus</a:t>
+              </a:r>
+              <a:br>
+                <a:rPr lang="en-US" sz="1400" b="1" dirty="0">
+                  <a:latin typeface="Segoe UI Bold" panose="020B0802040204020203" pitchFamily="34" charset="0"/>
+                  <a:cs typeface="Segoe UI Bold" panose="020B0802040204020203" pitchFamily="34" charset="0"/>
+                </a:rPr>
+              </a:br>
+              <a:r>
+                <a:rPr lang="en-US" sz="1400" dirty="0">
+                  <a:latin typeface="Segoe UI Light" panose="020B0502040204020203" pitchFamily="34" charset="0"/>
+                  <a:cs typeface="Segoe UI Light" panose="020B0502040204020203" pitchFamily="34" charset="0"/>
+                </a:rPr>
+                <a:t>Namespace</a:t>
+              </a:r>
+              <a:endParaRPr lang="LID4096" sz="1400" dirty="0">
+                <a:latin typeface="Segoe UI Light" panose="020B0502040204020203" pitchFamily="34" charset="0"/>
+                <a:cs typeface="Segoe UI Light" panose="020B0502040204020203" pitchFamily="34" charset="0"/>
+              </a:endParaRPr>
+            </a:p>
+          </p:txBody>
+        </p:sp>
+      </p:grpSp>
+      <p:grpSp>
+        <p:nvGrpSpPr>
+          <p:cNvPr id="12" name="Group 11">
+            <a:extLst>
+              <a:ext uri="{FF2B5EF4-FFF2-40B4-BE49-F238E27FC236}">
+                <a16:creationId xmlns:a16="http://schemas.microsoft.com/office/drawing/2014/main" id="{12724643-CF1A-4432-9437-6D3BF533C2DA}"/>
+              </a:ext>
+            </a:extLst>
+          </p:cNvPr>
+          <p:cNvGrpSpPr/>
+          <p:nvPr/>
+        </p:nvGrpSpPr>
+        <p:grpSpPr>
+          <a:xfrm>
+            <a:off x="6367054" y="3765433"/>
+            <a:ext cx="1268617" cy="770092"/>
+            <a:chOff x="5500099" y="4908430"/>
+            <a:chExt cx="1268617" cy="770092"/>
+          </a:xfrm>
+        </p:grpSpPr>
+        <p:pic>
+          <p:nvPicPr>
+            <p:cNvPr id="13" name="Picture 12">
+              <a:extLst>
+                <a:ext uri="{FF2B5EF4-FFF2-40B4-BE49-F238E27FC236}">
+                  <a16:creationId xmlns:a16="http://schemas.microsoft.com/office/drawing/2014/main" id="{76F8CECB-D6EA-4A62-A860-A73C66BB1577}"/>
+                </a:ext>
+              </a:extLst>
+            </p:cNvPr>
+            <p:cNvPicPr>
+              <a:picLocks noChangeAspect="1"/>
+            </p:cNvPicPr>
+            <p:nvPr/>
+          </p:nvPicPr>
+          <p:blipFill>
+            <a:blip r:embed="rId4"/>
+            <a:stretch>
+              <a:fillRect/>
+            </a:stretch>
+          </p:blipFill>
+          <p:spPr>
+            <a:xfrm>
+              <a:off x="5867400" y="4908430"/>
+              <a:ext cx="457200" cy="457200"/>
+            </a:xfrm>
+            <a:prstGeom prst="rect">
+              <a:avLst/>
+            </a:prstGeom>
+          </p:spPr>
+        </p:pic>
+        <p:sp>
+          <p:nvSpPr>
+            <p:cNvPr id="14" name="TextBox 13">
+              <a:extLst>
+                <a:ext uri="{FF2B5EF4-FFF2-40B4-BE49-F238E27FC236}">
+                  <a16:creationId xmlns:a16="http://schemas.microsoft.com/office/drawing/2014/main" id="{6BCA753C-FFC5-43C8-8F7E-04FB3CF88EEF}"/>
+                </a:ext>
+              </a:extLst>
+            </p:cNvPr>
+            <p:cNvSpPr txBox="1"/>
+            <p:nvPr/>
+          </p:nvSpPr>
+          <p:spPr>
+            <a:xfrm>
+              <a:off x="5500099" y="5370745"/>
+              <a:ext cx="1268617" cy="307777"/>
+            </a:xfrm>
+            <a:prstGeom prst="rect">
+              <a:avLst/>
+            </a:prstGeom>
+            <a:noFill/>
+          </p:spPr>
+          <p:txBody>
+            <a:bodyPr wrap="none" rtlCol="0">
+              <a:spAutoFit/>
+            </a:bodyPr>
+            <a:lstStyle/>
+            <a:p>
+              <a:r>
+                <a:rPr lang="en-US" sz="1400" b="1" dirty="0">
+                  <a:latin typeface="Segoe UI Bold" panose="020B0802040204020203" pitchFamily="34" charset="0"/>
+                  <a:cs typeface="Segoe UI Bold" panose="020B0802040204020203" pitchFamily="34" charset="0"/>
+                </a:rPr>
+                <a:t>Orders</a:t>
+              </a:r>
+              <a:r>
+                <a:rPr lang="en-US" sz="1400" b="1" dirty="0"/>
+                <a:t> </a:t>
+              </a:r>
+              <a:r>
+                <a:rPr lang="en-US" sz="1400" dirty="0">
+                  <a:latin typeface="Segoe UI Light" panose="020B0502040204020203" pitchFamily="34" charset="0"/>
+                  <a:cs typeface="Segoe UI Light" panose="020B0502040204020203" pitchFamily="34" charset="0"/>
+                </a:rPr>
+                <a:t>queue</a:t>
+              </a:r>
+              <a:endParaRPr lang="LID4096" sz="1400" dirty="0">
+                <a:latin typeface="Segoe UI Light" panose="020B0502040204020203" pitchFamily="34" charset="0"/>
+                <a:cs typeface="Segoe UI Light" panose="020B0502040204020203" pitchFamily="34" charset="0"/>
+              </a:endParaRPr>
+            </a:p>
+          </p:txBody>
+        </p:sp>
+      </p:grpSp>
+      <p:grpSp>
+        <p:nvGrpSpPr>
+          <p:cNvPr id="15" name="Group 14">
+            <a:extLst>
+              <a:ext uri="{FF2B5EF4-FFF2-40B4-BE49-F238E27FC236}">
+                <a16:creationId xmlns:a16="http://schemas.microsoft.com/office/drawing/2014/main" id="{3ADD424D-D4BA-4A1C-953E-811D55A6ABE9}"/>
+              </a:ext>
+            </a:extLst>
+          </p:cNvPr>
+          <p:cNvGrpSpPr/>
+          <p:nvPr/>
+        </p:nvGrpSpPr>
+        <p:grpSpPr>
+          <a:xfrm>
+            <a:off x="5512289" y="960992"/>
+            <a:ext cx="2901334" cy="1137083"/>
+            <a:chOff x="1676409" y="1718260"/>
+            <a:chExt cx="2901334" cy="1137083"/>
+          </a:xfrm>
+        </p:grpSpPr>
+        <p:sp>
+          <p:nvSpPr>
+            <p:cNvPr id="16" name="Rectangle 15">
+              <a:extLst>
+                <a:ext uri="{FF2B5EF4-FFF2-40B4-BE49-F238E27FC236}">
+                  <a16:creationId xmlns:a16="http://schemas.microsoft.com/office/drawing/2014/main" id="{8AD0DAE6-0E3C-4E6C-882D-0D015781F20F}"/>
+                </a:ext>
+              </a:extLst>
+            </p:cNvPr>
+            <p:cNvSpPr/>
+            <p:nvPr/>
+          </p:nvSpPr>
+          <p:spPr>
+            <a:xfrm>
+              <a:off x="1742537" y="2087592"/>
+              <a:ext cx="2769079" cy="767751"/>
+            </a:xfrm>
+            <a:prstGeom prst="rect">
+              <a:avLst/>
+            </a:prstGeom>
+          </p:spPr>
+          <p:style>
+            <a:lnRef idx="2">
+              <a:schemeClr val="dk1"/>
+            </a:lnRef>
+            <a:fillRef idx="1">
+              <a:schemeClr val="lt1"/>
+            </a:fillRef>
+            <a:effectRef idx="0">
+              <a:schemeClr val="dk1"/>
+            </a:effectRef>
+            <a:fontRef idx="minor">
+              <a:schemeClr val="dk1"/>
+            </a:fontRef>
+          </p:style>
+          <p:txBody>
+            <a:bodyPr rtlCol="0" anchor="ctr"/>
+            <a:lstStyle/>
+            <a:p>
+              <a:r>
+                <a:rPr lang="en-US" dirty="0">
+                  <a:latin typeface="Segoe UI" panose="020B0502040204020203" pitchFamily="34" charset="0"/>
+                  <a:cs typeface="Segoe UI" panose="020B0502040204020203" pitchFamily="34" charset="0"/>
+                </a:rPr>
+                <a:t>  .NET Core Worker</a:t>
+              </a:r>
+              <a:endParaRPr lang="LID4096" dirty="0">
+                <a:latin typeface="Segoe UI" panose="020B0502040204020203" pitchFamily="34" charset="0"/>
+                <a:cs typeface="Segoe UI" panose="020B0502040204020203" pitchFamily="34" charset="0"/>
+              </a:endParaRPr>
+            </a:p>
+          </p:txBody>
+        </p:sp>
+        <p:sp>
+          <p:nvSpPr>
+            <p:cNvPr id="17" name="TextBox 16">
+              <a:extLst>
+                <a:ext uri="{FF2B5EF4-FFF2-40B4-BE49-F238E27FC236}">
+                  <a16:creationId xmlns:a16="http://schemas.microsoft.com/office/drawing/2014/main" id="{004DA272-BB38-46EC-A7D8-EF2F3ED09C31}"/>
+                </a:ext>
+              </a:extLst>
+            </p:cNvPr>
+            <p:cNvSpPr txBox="1"/>
+            <p:nvPr/>
+          </p:nvSpPr>
+          <p:spPr>
+            <a:xfrm>
+              <a:off x="1676409" y="1718260"/>
+              <a:ext cx="2901334" cy="369332"/>
+            </a:xfrm>
+            <a:prstGeom prst="rect">
+              <a:avLst/>
+            </a:prstGeom>
+            <a:noFill/>
+          </p:spPr>
+          <p:txBody>
+            <a:bodyPr wrap="square" rtlCol="0">
+              <a:spAutoFit/>
+            </a:bodyPr>
+            <a:lstStyle/>
+            <a:p>
+              <a:pPr algn="ctr"/>
+              <a:r>
+                <a:rPr lang="en-US" b="1" dirty="0">
+                  <a:latin typeface="Segoe UI Bold" panose="020B0802040204020203" pitchFamily="34" charset="0"/>
+                  <a:cs typeface="Segoe UI Bold" panose="020B0802040204020203" pitchFamily="34" charset="0"/>
+                </a:rPr>
+                <a:t>Order Processor </a:t>
+              </a:r>
+              <a:r>
+                <a:rPr lang="en-US" dirty="0">
+                  <a:latin typeface="Segoe UI Light" panose="020B0502040204020203" pitchFamily="34" charset="0"/>
+                  <a:cs typeface="Segoe UI Light" panose="020B0502040204020203" pitchFamily="34" charset="0"/>
+                </a:rPr>
+                <a:t>container</a:t>
+              </a:r>
+              <a:endParaRPr lang="LID4096" dirty="0">
+                <a:latin typeface="Segoe UI Light" panose="020B0502040204020203" pitchFamily="34" charset="0"/>
+                <a:cs typeface="Segoe UI Light" panose="020B0502040204020203" pitchFamily="34" charset="0"/>
+              </a:endParaRPr>
+            </a:p>
+          </p:txBody>
+        </p:sp>
+        <p:pic>
+          <p:nvPicPr>
+            <p:cNvPr id="18" name="Picture 2">
+              <a:extLst>
+                <a:ext uri="{FF2B5EF4-FFF2-40B4-BE49-F238E27FC236}">
+                  <a16:creationId xmlns:a16="http://schemas.microsoft.com/office/drawing/2014/main" id="{55CC26A9-3A02-422E-AA04-1847A41EAA94}"/>
+                </a:ext>
+              </a:extLst>
+            </p:cNvPr>
+            <p:cNvPicPr>
+              <a:picLocks noChangeAspect="1" noChangeArrowheads="1"/>
+            </p:cNvPicPr>
+            <p:nvPr/>
+          </p:nvPicPr>
+          <p:blipFill>
+            <a:blip r:embed="rId2">
+              <a:extLst>
+                <a:ext uri="{28A0092B-C50C-407E-A947-70E740481C1C}">
+                  <a14:useLocalDpi xmlns:a14="http://schemas.microsoft.com/office/drawing/2010/main" val="0"/>
+                </a:ext>
+              </a:extLst>
+            </a:blip>
+            <a:srcRect/>
+            <a:stretch>
+              <a:fillRect/>
+            </a:stretch>
+          </p:blipFill>
+          <p:spPr bwMode="auto">
+            <a:xfrm>
+              <a:off x="3847381" y="2225614"/>
+              <a:ext cx="491706" cy="491706"/>
+            </a:xfrm>
+            <a:prstGeom prst="rect">
+              <a:avLst/>
+            </a:prstGeom>
+            <a:noFill/>
+            <a:extLst>
+              <a:ext uri="{909E8E84-426E-40DD-AFC4-6F175D3DCCD1}">
+                <a14:hiddenFill xmlns:a14="http://schemas.microsoft.com/office/drawing/2010/main">
+                  <a:solidFill>
+                    <a:srgbClr val="FFFFFF"/>
+                  </a:solidFill>
+                </a14:hiddenFill>
+              </a:ext>
+            </a:extLst>
+          </p:spPr>
+        </p:pic>
+      </p:grpSp>
+      <p:cxnSp>
+        <p:nvCxnSpPr>
+          <p:cNvPr id="19" name="Connector: Elbow 18">
+            <a:extLst>
+              <a:ext uri="{FF2B5EF4-FFF2-40B4-BE49-F238E27FC236}">
+                <a16:creationId xmlns:a16="http://schemas.microsoft.com/office/drawing/2014/main" id="{CC993DF2-CC6C-43B9-9559-634D2648418D}"/>
+              </a:ext>
+            </a:extLst>
+          </p:cNvPr>
+          <p:cNvCxnSpPr>
+            <a:cxnSpLocks/>
+            <a:stCxn id="5" idx="2"/>
+            <a:endCxn id="8" idx="1"/>
+          </p:cNvCxnSpPr>
+          <p:nvPr/>
+        </p:nvCxnSpPr>
+        <p:spPr>
+          <a:xfrm rot="16200000" flipH="1">
+            <a:off x="1864272" y="2957551"/>
+            <a:ext cx="2041170" cy="322218"/>
+          </a:xfrm>
+          <a:prstGeom prst="bentConnector2">
+            <a:avLst/>
+          </a:prstGeom>
+          <a:ln>
+            <a:prstDash val="lgDash"/>
+            <a:tailEnd type="triangle"/>
+          </a:ln>
+        </p:spPr>
+        <p:style>
+          <a:lnRef idx="1">
+            <a:schemeClr val="dk1"/>
+          </a:lnRef>
+          <a:fillRef idx="0">
+            <a:schemeClr val="dk1"/>
+          </a:fillRef>
+          <a:effectRef idx="0">
+            <a:schemeClr val="dk1"/>
+          </a:effectRef>
+          <a:fontRef idx="minor">
+            <a:schemeClr val="tx1"/>
+          </a:fontRef>
+        </p:style>
+      </p:cxnSp>
+      <p:cxnSp>
+        <p:nvCxnSpPr>
+          <p:cNvPr id="20" name="Connector: Elbow 19">
+            <a:extLst>
+              <a:ext uri="{FF2B5EF4-FFF2-40B4-BE49-F238E27FC236}">
+                <a16:creationId xmlns:a16="http://schemas.microsoft.com/office/drawing/2014/main" id="{CF42C2EF-F241-441F-AEB1-439E009D6802}"/>
+              </a:ext>
+            </a:extLst>
+          </p:cNvPr>
+          <p:cNvCxnSpPr>
+            <a:cxnSpLocks/>
+            <a:stCxn id="16" idx="2"/>
+            <a:endCxn id="13" idx="0"/>
+          </p:cNvCxnSpPr>
+          <p:nvPr/>
+        </p:nvCxnSpPr>
+        <p:spPr>
+          <a:xfrm rot="5400000">
+            <a:off x="6129277" y="2931753"/>
+            <a:ext cx="1667358" cy="2"/>
+          </a:xfrm>
+          <a:prstGeom prst="bentConnector3">
+            <a:avLst>
+              <a:gd name="adj1" fmla="val 50000"/>
+            </a:avLst>
+          </a:prstGeom>
+          <a:ln>
+            <a:headEnd type="triangle" w="med" len="med"/>
+            <a:tailEnd type="triangle" w="med" len="med"/>
+          </a:ln>
+        </p:spPr>
+        <p:style>
+          <a:lnRef idx="1">
+            <a:schemeClr val="dk1"/>
+          </a:lnRef>
+          <a:fillRef idx="0">
+            <a:schemeClr val="dk1"/>
+          </a:fillRef>
+          <a:effectRef idx="0">
+            <a:schemeClr val="dk1"/>
+          </a:effectRef>
+          <a:fontRef idx="minor">
+            <a:schemeClr val="tx1"/>
+          </a:fontRef>
+        </p:style>
+      </p:cxnSp>
+      <p:grpSp>
+        <p:nvGrpSpPr>
+          <p:cNvPr id="21" name="Group 20">
+            <a:extLst>
+              <a:ext uri="{FF2B5EF4-FFF2-40B4-BE49-F238E27FC236}">
+                <a16:creationId xmlns:a16="http://schemas.microsoft.com/office/drawing/2014/main" id="{7F911EAF-1040-4400-8BE7-F093D91CC88B}"/>
+              </a:ext>
+            </a:extLst>
+          </p:cNvPr>
+          <p:cNvGrpSpPr/>
+          <p:nvPr/>
+        </p:nvGrpSpPr>
+        <p:grpSpPr>
+          <a:xfrm>
+            <a:off x="5578414" y="5682570"/>
+            <a:ext cx="2769080" cy="1137083"/>
+            <a:chOff x="1742536" y="1718260"/>
+            <a:chExt cx="2769080" cy="1137083"/>
+          </a:xfrm>
+        </p:grpSpPr>
+        <p:sp>
+          <p:nvSpPr>
+            <p:cNvPr id="22" name="Rectangle 21">
+              <a:extLst>
+                <a:ext uri="{FF2B5EF4-FFF2-40B4-BE49-F238E27FC236}">
+                  <a16:creationId xmlns:a16="http://schemas.microsoft.com/office/drawing/2014/main" id="{0672AB20-85EC-46ED-BC1F-A6F8147128F2}"/>
+                </a:ext>
+              </a:extLst>
+            </p:cNvPr>
+            <p:cNvSpPr/>
+            <p:nvPr/>
+          </p:nvSpPr>
+          <p:spPr>
+            <a:xfrm>
+              <a:off x="1742537" y="2087592"/>
+              <a:ext cx="2769079" cy="767751"/>
+            </a:xfrm>
+            <a:prstGeom prst="rect">
+              <a:avLst/>
+            </a:prstGeom>
+          </p:spPr>
+          <p:style>
+            <a:lnRef idx="2">
+              <a:schemeClr val="dk1"/>
+            </a:lnRef>
+            <a:fillRef idx="1">
+              <a:schemeClr val="lt1"/>
+            </a:fillRef>
+            <a:effectRef idx="0">
+              <a:schemeClr val="dk1"/>
+            </a:effectRef>
+            <a:fontRef idx="minor">
+              <a:schemeClr val="dk1"/>
+            </a:fontRef>
+          </p:style>
+          <p:txBody>
+            <a:bodyPr rtlCol="0" anchor="ctr"/>
+            <a:lstStyle/>
+            <a:p>
+              <a:r>
+                <a:rPr lang="en-US" dirty="0">
+                  <a:solidFill>
+                    <a:schemeClr val="accent3">
+                      <a:lumMod val="75000"/>
+                    </a:schemeClr>
+                  </a:solidFill>
+                  <a:latin typeface="Segoe UI" panose="020B0502040204020203" pitchFamily="34" charset="0"/>
+                  <a:cs typeface="Segoe UI" panose="020B0502040204020203" pitchFamily="34" charset="0"/>
+                </a:rPr>
+                <a:t>   .NET Core</a:t>
+              </a:r>
+              <a:br>
+                <a:rPr lang="en-US" dirty="0">
+                  <a:solidFill>
+                    <a:schemeClr val="accent3">
+                      <a:lumMod val="75000"/>
+                    </a:schemeClr>
+                  </a:solidFill>
+                  <a:latin typeface="Segoe UI" panose="020B0502040204020203" pitchFamily="34" charset="0"/>
+                  <a:cs typeface="Segoe UI" panose="020B0502040204020203" pitchFamily="34" charset="0"/>
+                </a:rPr>
+              </a:br>
+              <a:r>
+                <a:rPr lang="en-US" dirty="0">
+                  <a:solidFill>
+                    <a:schemeClr val="accent3">
+                      <a:lumMod val="75000"/>
+                    </a:schemeClr>
+                  </a:solidFill>
+                  <a:latin typeface="Segoe UI" panose="020B0502040204020203" pitchFamily="34" charset="0"/>
+                  <a:cs typeface="Segoe UI" panose="020B0502040204020203" pitchFamily="34" charset="0"/>
+                </a:rPr>
+                <a:t>   Console</a:t>
+              </a:r>
+              <a:endParaRPr lang="LID4096" dirty="0">
+                <a:solidFill>
+                  <a:schemeClr val="accent3">
+                    <a:lumMod val="75000"/>
+                  </a:schemeClr>
+                </a:solidFill>
+                <a:latin typeface="Segoe UI" panose="020B0502040204020203" pitchFamily="34" charset="0"/>
+                <a:cs typeface="Segoe UI" panose="020B0502040204020203" pitchFamily="34" charset="0"/>
+              </a:endParaRPr>
+            </a:p>
+          </p:txBody>
+        </p:sp>
+        <p:sp>
+          <p:nvSpPr>
+            <p:cNvPr id="23" name="TextBox 22">
+              <a:extLst>
+                <a:ext uri="{FF2B5EF4-FFF2-40B4-BE49-F238E27FC236}">
+                  <a16:creationId xmlns:a16="http://schemas.microsoft.com/office/drawing/2014/main" id="{C76153B1-E65E-4A38-BC79-C26ACA738E11}"/>
+                </a:ext>
+              </a:extLst>
+            </p:cNvPr>
+            <p:cNvSpPr txBox="1"/>
+            <p:nvPr/>
+          </p:nvSpPr>
+          <p:spPr>
+            <a:xfrm>
+              <a:off x="1742536" y="1718260"/>
+              <a:ext cx="2769079" cy="369332"/>
+            </a:xfrm>
+            <a:prstGeom prst="rect">
+              <a:avLst/>
+            </a:prstGeom>
+            <a:noFill/>
+          </p:spPr>
+          <p:txBody>
+            <a:bodyPr wrap="square" rtlCol="0">
+              <a:spAutoFit/>
+            </a:bodyPr>
+            <a:lstStyle/>
+            <a:p>
+              <a:pPr algn="ctr"/>
+              <a:r>
+                <a:rPr lang="en-US" b="1" dirty="0">
+                  <a:solidFill>
+                    <a:schemeClr val="accent3">
+                      <a:lumMod val="75000"/>
+                    </a:schemeClr>
+                  </a:solidFill>
+                  <a:latin typeface="Segoe UI Bold" panose="020B0802040204020203" pitchFamily="34" charset="0"/>
+                  <a:cs typeface="Segoe UI Bold" panose="020B0802040204020203" pitchFamily="34" charset="0"/>
+                </a:rPr>
+                <a:t>Order Generator </a:t>
+              </a:r>
+              <a:r>
+                <a:rPr lang="en-US" dirty="0">
+                  <a:solidFill>
+                    <a:schemeClr val="accent3">
+                      <a:lumMod val="75000"/>
+                    </a:schemeClr>
+                  </a:solidFill>
+                  <a:latin typeface="Segoe UI Light" panose="020B0502040204020203" pitchFamily="34" charset="0"/>
+                  <a:cs typeface="Segoe UI Light" panose="020B0502040204020203" pitchFamily="34" charset="0"/>
+                </a:rPr>
+                <a:t>CLI</a:t>
+              </a:r>
+              <a:endParaRPr lang="LID4096" dirty="0">
+                <a:solidFill>
+                  <a:schemeClr val="accent3">
+                    <a:lumMod val="75000"/>
+                  </a:schemeClr>
+                </a:solidFill>
+                <a:latin typeface="Segoe UI Light" panose="020B0502040204020203" pitchFamily="34" charset="0"/>
+                <a:cs typeface="Segoe UI Light" panose="020B0502040204020203" pitchFamily="34" charset="0"/>
+              </a:endParaRPr>
+            </a:p>
+          </p:txBody>
+        </p:sp>
+        <p:pic>
+          <p:nvPicPr>
+            <p:cNvPr id="24" name="Picture 2">
+              <a:extLst>
+                <a:ext uri="{FF2B5EF4-FFF2-40B4-BE49-F238E27FC236}">
+                  <a16:creationId xmlns:a16="http://schemas.microsoft.com/office/drawing/2014/main" id="{BFF7FFD4-C275-483E-8992-53EB4B02D65A}"/>
+                </a:ext>
+              </a:extLst>
+            </p:cNvPr>
+            <p:cNvPicPr>
+              <a:picLocks noChangeAspect="1" noChangeArrowheads="1"/>
+            </p:cNvPicPr>
+            <p:nvPr/>
+          </p:nvPicPr>
+          <p:blipFill>
+            <a:blip r:embed="rId2">
+              <a:extLst>
+                <a:ext uri="{28A0092B-C50C-407E-A947-70E740481C1C}">
+                  <a14:useLocalDpi xmlns:a14="http://schemas.microsoft.com/office/drawing/2010/main" val="0"/>
+                </a:ext>
+              </a:extLst>
+            </a:blip>
+            <a:srcRect/>
+            <a:stretch>
+              <a:fillRect/>
+            </a:stretch>
+          </p:blipFill>
+          <p:spPr bwMode="auto">
+            <a:xfrm>
+              <a:off x="3847381" y="2225614"/>
+              <a:ext cx="491706" cy="491706"/>
+            </a:xfrm>
+            <a:prstGeom prst="rect">
+              <a:avLst/>
+            </a:prstGeom>
+            <a:noFill/>
+            <a:extLst>
+              <a:ext uri="{909E8E84-426E-40DD-AFC4-6F175D3DCCD1}">
+                <a14:hiddenFill xmlns:a14="http://schemas.microsoft.com/office/drawing/2010/main">
+                  <a:solidFill>
+                    <a:srgbClr val="FFFFFF"/>
+                  </a:solidFill>
+                </a14:hiddenFill>
+              </a:ext>
+            </a:extLst>
+          </p:spPr>
+        </p:pic>
+      </p:grpSp>
+      <p:sp>
+        <p:nvSpPr>
+          <p:cNvPr id="25" name="TextBox 24">
+            <a:extLst>
+              <a:ext uri="{FF2B5EF4-FFF2-40B4-BE49-F238E27FC236}">
+                <a16:creationId xmlns:a16="http://schemas.microsoft.com/office/drawing/2014/main" id="{191BB794-10DC-464E-99A0-9D5E999FB01E}"/>
+              </a:ext>
+            </a:extLst>
+          </p:cNvPr>
+          <p:cNvSpPr txBox="1"/>
+          <p:nvPr/>
+        </p:nvSpPr>
+        <p:spPr>
+          <a:xfrm>
+            <a:off x="2751920" y="2419663"/>
+            <a:ext cx="1456427" cy="338554"/>
+          </a:xfrm>
+          <a:prstGeom prst="rect">
+            <a:avLst/>
+          </a:prstGeom>
+          <a:noFill/>
+        </p:spPr>
+        <p:txBody>
+          <a:bodyPr wrap="square" rtlCol="0">
+            <a:spAutoFit/>
+          </a:bodyPr>
+          <a:lstStyle/>
+          <a:p>
+            <a:r>
+              <a:rPr lang="en-US" sz="1600" i="1" dirty="0">
+                <a:latin typeface="Segoe UI Light" panose="020B0502040204020203" pitchFamily="34" charset="0"/>
+                <a:cs typeface="Segoe UI Light" panose="020B0502040204020203" pitchFamily="34" charset="0"/>
+              </a:rPr>
+              <a:t>Get Metrics</a:t>
+            </a:r>
+            <a:endParaRPr lang="LID4096" sz="1600" i="1" dirty="0">
+              <a:latin typeface="Segoe UI Light" panose="020B0502040204020203" pitchFamily="34" charset="0"/>
+              <a:cs typeface="Segoe UI Light" panose="020B0502040204020203" pitchFamily="34" charset="0"/>
+            </a:endParaRPr>
+          </a:p>
+        </p:txBody>
+      </p:sp>
+      <p:sp>
+        <p:nvSpPr>
+          <p:cNvPr id="26" name="TextBox 25">
+            <a:extLst>
+              <a:ext uri="{FF2B5EF4-FFF2-40B4-BE49-F238E27FC236}">
+                <a16:creationId xmlns:a16="http://schemas.microsoft.com/office/drawing/2014/main" id="{6B6F3ACC-F244-4B19-B8EA-72868AE64C4E}"/>
+              </a:ext>
+            </a:extLst>
+          </p:cNvPr>
+          <p:cNvSpPr txBox="1"/>
+          <p:nvPr/>
+        </p:nvSpPr>
+        <p:spPr>
+          <a:xfrm>
+            <a:off x="7063015" y="2624670"/>
+            <a:ext cx="1456427" cy="584775"/>
+          </a:xfrm>
+          <a:prstGeom prst="rect">
+            <a:avLst/>
+          </a:prstGeom>
+          <a:noFill/>
+        </p:spPr>
+        <p:txBody>
+          <a:bodyPr wrap="square" rtlCol="0">
+            <a:spAutoFit/>
+          </a:bodyPr>
+          <a:lstStyle/>
+          <a:p>
+            <a:r>
+              <a:rPr lang="en-US" sz="1600" i="1" dirty="0">
+                <a:latin typeface="Segoe UI Light" panose="020B0502040204020203" pitchFamily="34" charset="0"/>
+                <a:cs typeface="Segoe UI Light" panose="020B0502040204020203" pitchFamily="34" charset="0"/>
+              </a:rPr>
+              <a:t>Process</a:t>
+            </a:r>
+            <a:br>
+              <a:rPr lang="en-US" sz="1600" i="1" dirty="0">
+                <a:latin typeface="Segoe UI Light" panose="020B0502040204020203" pitchFamily="34" charset="0"/>
+                <a:cs typeface="Segoe UI Light" panose="020B0502040204020203" pitchFamily="34" charset="0"/>
+              </a:rPr>
+            </a:br>
+            <a:r>
+              <a:rPr lang="en-US" sz="1600" i="1" dirty="0">
+                <a:latin typeface="Segoe UI Light" panose="020B0502040204020203" pitchFamily="34" charset="0"/>
+                <a:cs typeface="Segoe UI Light" panose="020B0502040204020203" pitchFamily="34" charset="0"/>
+              </a:rPr>
+              <a:t>Messages</a:t>
+            </a:r>
+            <a:endParaRPr lang="LID4096" sz="1600" i="1" dirty="0">
+              <a:latin typeface="Segoe UI Light" panose="020B0502040204020203" pitchFamily="34" charset="0"/>
+              <a:cs typeface="Segoe UI Light" panose="020B0502040204020203" pitchFamily="34" charset="0"/>
+            </a:endParaRPr>
+          </a:p>
+        </p:txBody>
+      </p:sp>
+      <p:cxnSp>
+        <p:nvCxnSpPr>
+          <p:cNvPr id="27" name="Connector: Elbow 26">
+            <a:extLst>
+              <a:ext uri="{FF2B5EF4-FFF2-40B4-BE49-F238E27FC236}">
+                <a16:creationId xmlns:a16="http://schemas.microsoft.com/office/drawing/2014/main" id="{56684E54-7404-44DA-B0E0-2B7BEC968840}"/>
+              </a:ext>
+            </a:extLst>
+          </p:cNvPr>
+          <p:cNvCxnSpPr>
+            <a:cxnSpLocks/>
+          </p:cNvCxnSpPr>
+          <p:nvPr/>
+        </p:nvCxnSpPr>
+        <p:spPr>
+          <a:xfrm rot="5400000">
+            <a:off x="6389430" y="5109047"/>
+            <a:ext cx="1147045" cy="1"/>
+          </a:xfrm>
+          <a:prstGeom prst="bentConnector3">
+            <a:avLst>
+              <a:gd name="adj1" fmla="val 50000"/>
+            </a:avLst>
+          </a:prstGeom>
+          <a:ln>
+            <a:solidFill>
+              <a:schemeClr val="accent3"/>
+            </a:solidFill>
+            <a:prstDash val="lgDash"/>
+            <a:headEnd type="triangle" w="med" len="med"/>
+            <a:tailEnd type="none" w="med" len="med"/>
+          </a:ln>
+        </p:spPr>
+        <p:style>
+          <a:lnRef idx="1">
+            <a:schemeClr val="dk1"/>
+          </a:lnRef>
+          <a:fillRef idx="0">
+            <a:schemeClr val="dk1"/>
+          </a:fillRef>
+          <a:effectRef idx="0">
+            <a:schemeClr val="dk1"/>
+          </a:effectRef>
+          <a:fontRef idx="minor">
+            <a:schemeClr val="tx1"/>
+          </a:fontRef>
+        </p:style>
+      </p:cxnSp>
+      <p:sp>
+        <p:nvSpPr>
+          <p:cNvPr id="28" name="TextBox 27">
+            <a:extLst>
+              <a:ext uri="{FF2B5EF4-FFF2-40B4-BE49-F238E27FC236}">
+                <a16:creationId xmlns:a16="http://schemas.microsoft.com/office/drawing/2014/main" id="{8789B42B-1061-4C42-8603-B1BD46A39A38}"/>
+              </a:ext>
+            </a:extLst>
+          </p:cNvPr>
+          <p:cNvSpPr txBox="1"/>
+          <p:nvPr/>
+        </p:nvSpPr>
+        <p:spPr>
+          <a:xfrm>
+            <a:off x="6962953" y="4851668"/>
+            <a:ext cx="1456427" cy="584775"/>
+          </a:xfrm>
+          <a:prstGeom prst="rect">
+            <a:avLst/>
+          </a:prstGeom>
+          <a:noFill/>
+        </p:spPr>
+        <p:txBody>
+          <a:bodyPr wrap="square" rtlCol="0">
+            <a:spAutoFit/>
+          </a:bodyPr>
+          <a:lstStyle/>
+          <a:p>
+            <a:r>
+              <a:rPr lang="en-US" sz="1600" i="1" dirty="0">
+                <a:solidFill>
+                  <a:schemeClr val="accent3">
+                    <a:lumMod val="75000"/>
+                  </a:schemeClr>
+                </a:solidFill>
+                <a:latin typeface="Segoe UI Light" panose="020B0502040204020203" pitchFamily="34" charset="0"/>
+                <a:cs typeface="Segoe UI Light" panose="020B0502040204020203" pitchFamily="34" charset="0"/>
+              </a:rPr>
+              <a:t>Generate</a:t>
+            </a:r>
+            <a:br>
+              <a:rPr lang="en-US" sz="1600" i="1" dirty="0">
+                <a:solidFill>
+                  <a:schemeClr val="accent3">
+                    <a:lumMod val="75000"/>
+                  </a:schemeClr>
+                </a:solidFill>
+                <a:latin typeface="Segoe UI Light" panose="020B0502040204020203" pitchFamily="34" charset="0"/>
+                <a:cs typeface="Segoe UI Light" panose="020B0502040204020203" pitchFamily="34" charset="0"/>
+              </a:rPr>
+            </a:br>
+            <a:r>
+              <a:rPr lang="en-US" sz="1600" i="1" dirty="0">
+                <a:solidFill>
+                  <a:schemeClr val="accent3">
+                    <a:lumMod val="75000"/>
+                  </a:schemeClr>
+                </a:solidFill>
+                <a:latin typeface="Segoe UI Light" panose="020B0502040204020203" pitchFamily="34" charset="0"/>
+                <a:cs typeface="Segoe UI Light" panose="020B0502040204020203" pitchFamily="34" charset="0"/>
+              </a:rPr>
+              <a:t>Messages</a:t>
+            </a:r>
+            <a:endParaRPr lang="LID4096" sz="1600" i="1" dirty="0">
+              <a:solidFill>
+                <a:schemeClr val="accent3">
+                  <a:lumMod val="75000"/>
+                </a:schemeClr>
+              </a:solidFill>
+              <a:latin typeface="Segoe UI Light" panose="020B0502040204020203" pitchFamily="34" charset="0"/>
+              <a:cs typeface="Segoe UI Light" panose="020B0502040204020203" pitchFamily="34" charset="0"/>
+            </a:endParaRPr>
+          </a:p>
+        </p:txBody>
+      </p:sp>
+      <p:pic>
+        <p:nvPicPr>
+          <p:cNvPr id="29" name="Picture 2" descr="Kubernetes">
+            <a:extLst>
+              <a:ext uri="{FF2B5EF4-FFF2-40B4-BE49-F238E27FC236}">
+                <a16:creationId xmlns:a16="http://schemas.microsoft.com/office/drawing/2014/main" id="{FF16D4A8-BBD5-46F2-89B7-8B5998271197}"/>
+              </a:ext>
+            </a:extLst>
+          </p:cNvPr>
+          <p:cNvPicPr>
+            <a:picLocks noChangeAspect="1" noChangeArrowheads="1"/>
+          </p:cNvPicPr>
+          <p:nvPr/>
+        </p:nvPicPr>
+        <p:blipFill>
+          <a:blip r:embed="rId5">
+            <a:extLst>
+              <a:ext uri="{28A0092B-C50C-407E-A947-70E740481C1C}">
+                <a14:useLocalDpi xmlns:a14="http://schemas.microsoft.com/office/drawing/2010/main" val="0"/>
+              </a:ext>
+            </a:extLst>
+          </a:blip>
+          <a:srcRect/>
+          <a:stretch>
+            <a:fillRect/>
+          </a:stretch>
+        </p:blipFill>
+        <p:spPr bwMode="auto">
+          <a:xfrm>
+            <a:off x="1069675" y="169841"/>
+            <a:ext cx="1965137" cy="424500"/>
+          </a:xfrm>
+          <a:prstGeom prst="rect">
+            <a:avLst/>
+          </a:prstGeom>
+          <a:noFill/>
+          <a:extLst>
+            <a:ext uri="{909E8E84-426E-40DD-AFC4-6F175D3DCCD1}">
+              <a14:hiddenFill xmlns:a14="http://schemas.microsoft.com/office/drawing/2010/main">
+                <a:solidFill>
+                  <a:srgbClr val="FFFFFF"/>
+                </a:solidFill>
+              </a14:hiddenFill>
+            </a:ext>
+          </a:extLst>
+        </p:spPr>
+      </p:pic>
+    </p:spTree>
+    <p:extLst>
+      <p:ext uri="{BB962C8B-B14F-4D97-AF65-F5344CB8AC3E}">
+        <p14:creationId xmlns:p14="http://schemas.microsoft.com/office/powerpoint/2010/main" val="2695233683"/>
+      </p:ext>
+    </p:extLst>
+  </p:cSld>
+  <p:clrMapOvr>
+    <a:masterClrMapping/>
+  </p:clrMapOvr>
+</p:sld>
+</file>
+
+<file path=ppt/slides/slide2.xml><?xml version="1.0" encoding="utf-8"?>
 <p:sld xmlns:a="http://schemas.openxmlformats.org/drawingml/2006/main" xmlns:r="http://schemas.openxmlformats.org/officeDocument/2006/relationships" xmlns:p="http://schemas.openxmlformats.org/presentationml/2006/main">
   <p:cSld>
     <p:spTree>

</xml_diff>

<commit_message>
Add schematics for workload identity.
Signed-off-by: Vighnesh Shenoy <vshenoy@microsoft.com>
</commit_message>
<xml_diff>
--- a/images/schematics.pptx
+++ b/images/schematics.pptx
@@ -7,6 +7,7 @@
   <p:sldIdLst>
     <p:sldId id="259" r:id="rId2"/>
     <p:sldId id="258" r:id="rId3"/>
+    <p:sldId id="260" r:id="rId4"/>
   </p:sldIdLst>
   <p:sldSz cx="12192000" cy="6858000"/>
   <p:notesSz cx="6858000" cy="9144000"/>
@@ -262,7 +263,7 @@
           <a:p>
             <a:fld id="{371346F4-35EC-4130-B4CC-0DFD34D5B213}" type="datetimeFigureOut">
               <a:rPr lang="LID4096" smtClean="0"/>
-              <a:t>08/23/2021</a:t>
+              <a:t>05/10/2022</a:t>
             </a:fld>
             <a:endParaRPr lang="LID4096"/>
           </a:p>
@@ -462,7 +463,7 @@
           <a:p>
             <a:fld id="{371346F4-35EC-4130-B4CC-0DFD34D5B213}" type="datetimeFigureOut">
               <a:rPr lang="LID4096" smtClean="0"/>
-              <a:t>08/23/2021</a:t>
+              <a:t>05/10/2022</a:t>
             </a:fld>
             <a:endParaRPr lang="LID4096"/>
           </a:p>
@@ -672,7 +673,7 @@
           <a:p>
             <a:fld id="{371346F4-35EC-4130-B4CC-0DFD34D5B213}" type="datetimeFigureOut">
               <a:rPr lang="LID4096" smtClean="0"/>
-              <a:t>08/23/2021</a:t>
+              <a:t>05/10/2022</a:t>
             </a:fld>
             <a:endParaRPr lang="LID4096"/>
           </a:p>
@@ -872,7 +873,7 @@
           <a:p>
             <a:fld id="{371346F4-35EC-4130-B4CC-0DFD34D5B213}" type="datetimeFigureOut">
               <a:rPr lang="LID4096" smtClean="0"/>
-              <a:t>08/23/2021</a:t>
+              <a:t>05/10/2022</a:t>
             </a:fld>
             <a:endParaRPr lang="LID4096"/>
           </a:p>
@@ -1148,7 +1149,7 @@
           <a:p>
             <a:fld id="{371346F4-35EC-4130-B4CC-0DFD34D5B213}" type="datetimeFigureOut">
               <a:rPr lang="LID4096" smtClean="0"/>
-              <a:t>08/23/2021</a:t>
+              <a:t>05/10/2022</a:t>
             </a:fld>
             <a:endParaRPr lang="LID4096"/>
           </a:p>
@@ -1416,7 +1417,7 @@
           <a:p>
             <a:fld id="{371346F4-35EC-4130-B4CC-0DFD34D5B213}" type="datetimeFigureOut">
               <a:rPr lang="LID4096" smtClean="0"/>
-              <a:t>08/23/2021</a:t>
+              <a:t>05/10/2022</a:t>
             </a:fld>
             <a:endParaRPr lang="LID4096"/>
           </a:p>
@@ -1831,7 +1832,7 @@
           <a:p>
             <a:fld id="{371346F4-35EC-4130-B4CC-0DFD34D5B213}" type="datetimeFigureOut">
               <a:rPr lang="LID4096" smtClean="0"/>
-              <a:t>08/23/2021</a:t>
+              <a:t>05/10/2022</a:t>
             </a:fld>
             <a:endParaRPr lang="LID4096"/>
           </a:p>
@@ -1973,7 +1974,7 @@
           <a:p>
             <a:fld id="{371346F4-35EC-4130-B4CC-0DFD34D5B213}" type="datetimeFigureOut">
               <a:rPr lang="LID4096" smtClean="0"/>
-              <a:t>08/23/2021</a:t>
+              <a:t>05/10/2022</a:t>
             </a:fld>
             <a:endParaRPr lang="LID4096"/>
           </a:p>
@@ -2086,7 +2087,7 @@
           <a:p>
             <a:fld id="{371346F4-35EC-4130-B4CC-0DFD34D5B213}" type="datetimeFigureOut">
               <a:rPr lang="LID4096" smtClean="0"/>
-              <a:t>08/23/2021</a:t>
+              <a:t>05/10/2022</a:t>
             </a:fld>
             <a:endParaRPr lang="LID4096"/>
           </a:p>
@@ -2399,7 +2400,7 @@
           <a:p>
             <a:fld id="{371346F4-35EC-4130-B4CC-0DFD34D5B213}" type="datetimeFigureOut">
               <a:rPr lang="LID4096" smtClean="0"/>
-              <a:t>08/23/2021</a:t>
+              <a:t>05/10/2022</a:t>
             </a:fld>
             <a:endParaRPr lang="LID4096"/>
           </a:p>
@@ -2688,7 +2689,7 @@
           <a:p>
             <a:fld id="{371346F4-35EC-4130-B4CC-0DFD34D5B213}" type="datetimeFigureOut">
               <a:rPr lang="LID4096" smtClean="0"/>
-              <a:t>08/23/2021</a:t>
+              <a:t>05/10/2022</a:t>
             </a:fld>
             <a:endParaRPr lang="LID4096"/>
           </a:p>
@@ -2931,7 +2932,7 @@
           <a:p>
             <a:fld id="{371346F4-35EC-4130-B4CC-0DFD34D5B213}" type="datetimeFigureOut">
               <a:rPr lang="LID4096" smtClean="0"/>
-              <a:t>08/23/2021</a:t>
+              <a:t>05/10/2022</a:t>
             </a:fld>
             <a:endParaRPr lang="LID4096"/>
           </a:p>
@@ -5355,7 +5356,7 @@
             <a:p>
               <a:pPr algn="ctr"/>
               <a:r>
-                <a:rPr lang="en-US" sz="1100" b="1" i="1" dirty="0" err="1">
+                <a:rPr lang="en-US" sz="1100" b="1" i="1" dirty="0">
                   <a:solidFill>
                     <a:srgbClr val="080808"/>
                   </a:solidFill>
@@ -6056,7 +6057,7 @@
             <a:p>
               <a:pPr algn="ctr"/>
               <a:r>
-                <a:rPr lang="en-US" sz="1200" dirty="0" err="1">
+                <a:rPr lang="en-US" sz="1200" dirty="0">
                   <a:solidFill>
                     <a:schemeClr val="accent2"/>
                   </a:solidFill>
@@ -6843,6 +6844,1933 @@
     <p:extLst>
       <p:ext uri="{BB962C8B-B14F-4D97-AF65-F5344CB8AC3E}">
         <p14:creationId xmlns:p14="http://schemas.microsoft.com/office/powerpoint/2010/main" val="1646763499"/>
+      </p:ext>
+    </p:extLst>
+  </p:cSld>
+  <p:clrMapOvr>
+    <a:masterClrMapping/>
+  </p:clrMapOvr>
+</p:sld>
+</file>
+
+<file path=ppt/slides/slide3.xml><?xml version="1.0" encoding="utf-8"?>
+<p:sld xmlns:a="http://schemas.openxmlformats.org/drawingml/2006/main" xmlns:r="http://schemas.openxmlformats.org/officeDocument/2006/relationships" xmlns:p="http://schemas.openxmlformats.org/presentationml/2006/main">
+  <p:cSld>
+    <p:spTree>
+      <p:nvGrpSpPr>
+        <p:cNvPr id="1" name=""/>
+        <p:cNvGrpSpPr/>
+        <p:nvPr/>
+      </p:nvGrpSpPr>
+      <p:grpSpPr>
+        <a:xfrm>
+          <a:off x="0" y="0"/>
+          <a:ext cx="0" cy="0"/>
+          <a:chOff x="0" y="0"/>
+          <a:chExt cx="0" cy="0"/>
+        </a:xfrm>
+      </p:grpSpPr>
+      <p:grpSp>
+        <p:nvGrpSpPr>
+          <p:cNvPr id="29" name="Group 28">
+            <a:extLst>
+              <a:ext uri="{FF2B5EF4-FFF2-40B4-BE49-F238E27FC236}">
+                <a16:creationId xmlns:a16="http://schemas.microsoft.com/office/drawing/2014/main" id="{1901A072-DD7F-4820-9A00-10C3D4663F9E}"/>
+              </a:ext>
+            </a:extLst>
+          </p:cNvPr>
+          <p:cNvGrpSpPr/>
+          <p:nvPr/>
+        </p:nvGrpSpPr>
+        <p:grpSpPr>
+          <a:xfrm>
+            <a:off x="1184091" y="4700785"/>
+            <a:ext cx="10058529" cy="1839352"/>
+            <a:chOff x="1184091" y="4700785"/>
+            <a:chExt cx="10058529" cy="1518249"/>
+          </a:xfrm>
+        </p:grpSpPr>
+        <p:sp>
+          <p:nvSpPr>
+            <p:cNvPr id="16" name="Rectangle 15">
+              <a:extLst>
+                <a:ext uri="{FF2B5EF4-FFF2-40B4-BE49-F238E27FC236}">
+                  <a16:creationId xmlns:a16="http://schemas.microsoft.com/office/drawing/2014/main" id="{BD001E1A-F99A-4DB4-93C3-4C50E9CA65F7}"/>
+                </a:ext>
+              </a:extLst>
+            </p:cNvPr>
+            <p:cNvSpPr/>
+            <p:nvPr/>
+          </p:nvSpPr>
+          <p:spPr>
+            <a:xfrm>
+              <a:off x="1184091" y="4700785"/>
+              <a:ext cx="10058529" cy="1518249"/>
+            </a:xfrm>
+            <a:prstGeom prst="rect">
+              <a:avLst/>
+            </a:prstGeom>
+            <a:ln>
+              <a:solidFill>
+                <a:srgbClr val="0070C0"/>
+              </a:solidFill>
+            </a:ln>
+          </p:spPr>
+          <p:style>
+            <a:lnRef idx="2">
+              <a:schemeClr val="accent3"/>
+            </a:lnRef>
+            <a:fillRef idx="1">
+              <a:schemeClr val="lt1"/>
+            </a:fillRef>
+            <a:effectRef idx="0">
+              <a:schemeClr val="accent3"/>
+            </a:effectRef>
+            <a:fontRef idx="minor">
+              <a:schemeClr val="dk1"/>
+            </a:fontRef>
+          </p:style>
+          <p:txBody>
+            <a:bodyPr rtlCol="0" anchor="ctr"/>
+            <a:lstStyle/>
+            <a:p>
+              <a:pPr algn="ctr"/>
+              <a:endParaRPr lang="en-BE" dirty="0" err="1">
+                <a:solidFill>
+                  <a:schemeClr val="bg1"/>
+                </a:solidFill>
+                <a:latin typeface="Tahoma"/>
+                <a:cs typeface="Tahoma"/>
+              </a:endParaRPr>
+            </a:p>
+          </p:txBody>
+        </p:sp>
+        <p:pic>
+          <p:nvPicPr>
+            <p:cNvPr id="1026" name="Picture 2">
+              <a:extLst>
+                <a:ext uri="{FF2B5EF4-FFF2-40B4-BE49-F238E27FC236}">
+                  <a16:creationId xmlns:a16="http://schemas.microsoft.com/office/drawing/2014/main" id="{E89967E0-4B5C-4B1F-AED7-E8B67E483AAF}"/>
+                </a:ext>
+              </a:extLst>
+            </p:cNvPr>
+            <p:cNvPicPr>
+              <a:picLocks noChangeAspect="1" noChangeArrowheads="1"/>
+            </p:cNvPicPr>
+            <p:nvPr/>
+          </p:nvPicPr>
+          <p:blipFill>
+            <a:blip r:embed="rId2">
+              <a:extLst>
+                <a:ext uri="{28A0092B-C50C-407E-A947-70E740481C1C}">
+                  <a14:useLocalDpi xmlns:a14="http://schemas.microsoft.com/office/drawing/2010/main" val="0"/>
+                </a:ext>
+              </a:extLst>
+            </a:blip>
+            <a:srcRect/>
+            <a:stretch>
+              <a:fillRect/>
+            </a:stretch>
+          </p:blipFill>
+          <p:spPr bwMode="auto">
+            <a:xfrm>
+              <a:off x="1335723" y="5638210"/>
+              <a:ext cx="1572540" cy="454562"/>
+            </a:xfrm>
+            <a:prstGeom prst="rect">
+              <a:avLst/>
+            </a:prstGeom>
+            <a:noFill/>
+            <a:extLst>
+              <a:ext uri="{909E8E84-426E-40DD-AFC4-6F175D3DCCD1}">
+                <a14:hiddenFill xmlns:a14="http://schemas.microsoft.com/office/drawing/2010/main">
+                  <a:solidFill>
+                    <a:srgbClr val="FFFFFF"/>
+                  </a:solidFill>
+                </a14:hiddenFill>
+              </a:ext>
+            </a:extLst>
+          </p:spPr>
+        </p:pic>
+      </p:grpSp>
+      <p:sp>
+        <p:nvSpPr>
+          <p:cNvPr id="4" name="Title 3">
+            <a:extLst>
+              <a:ext uri="{FF2B5EF4-FFF2-40B4-BE49-F238E27FC236}">
+                <a16:creationId xmlns:a16="http://schemas.microsoft.com/office/drawing/2014/main" id="{D21861B8-CFD0-4148-8599-E9B7897651DA}"/>
+              </a:ext>
+            </a:extLst>
+          </p:cNvPr>
+          <p:cNvSpPr>
+            <a:spLocks noGrp="1"/>
+          </p:cNvSpPr>
+          <p:nvPr>
+            <p:ph type="title"/>
+          </p:nvPr>
+        </p:nvSpPr>
+        <p:spPr>
+          <a:xfrm>
+            <a:off x="838200" y="203201"/>
+            <a:ext cx="10515600" cy="190391"/>
+          </a:xfrm>
+        </p:spPr>
+        <p:txBody>
+          <a:bodyPr>
+            <a:noAutofit/>
+          </a:bodyPr>
+          <a:lstStyle/>
+          <a:p>
+            <a:r>
+              <a:rPr lang="en-US" sz="2400" dirty="0"/>
+              <a:t>Authentication – Workload Identity</a:t>
+            </a:r>
+            <a:endParaRPr lang="LID4096" sz="2400" dirty="0"/>
+          </a:p>
+        </p:txBody>
+      </p:sp>
+      <p:grpSp>
+        <p:nvGrpSpPr>
+          <p:cNvPr id="30" name="Group 29">
+            <a:extLst>
+              <a:ext uri="{FF2B5EF4-FFF2-40B4-BE49-F238E27FC236}">
+                <a16:creationId xmlns:a16="http://schemas.microsoft.com/office/drawing/2014/main" id="{6B08E9A4-22BC-426F-844C-875CBB9318FB}"/>
+              </a:ext>
+            </a:extLst>
+          </p:cNvPr>
+          <p:cNvGrpSpPr/>
+          <p:nvPr/>
+        </p:nvGrpSpPr>
+        <p:grpSpPr>
+          <a:xfrm>
+            <a:off x="1184092" y="921729"/>
+            <a:ext cx="10058529" cy="3494386"/>
+            <a:chOff x="1184092" y="921729"/>
+            <a:chExt cx="10058529" cy="3494386"/>
+          </a:xfrm>
+        </p:grpSpPr>
+        <p:sp>
+          <p:nvSpPr>
+            <p:cNvPr id="5" name="Rectangle 4">
+              <a:extLst>
+                <a:ext uri="{FF2B5EF4-FFF2-40B4-BE49-F238E27FC236}">
+                  <a16:creationId xmlns:a16="http://schemas.microsoft.com/office/drawing/2014/main" id="{9CDC7901-ED8A-49E0-ADCD-096C981F6322}"/>
+                </a:ext>
+              </a:extLst>
+            </p:cNvPr>
+            <p:cNvSpPr/>
+            <p:nvPr/>
+          </p:nvSpPr>
+          <p:spPr>
+            <a:xfrm>
+              <a:off x="1184092" y="921729"/>
+              <a:ext cx="10058529" cy="3494386"/>
+            </a:xfrm>
+            <a:prstGeom prst="rect">
+              <a:avLst/>
+            </a:prstGeom>
+            <a:ln>
+              <a:solidFill>
+                <a:srgbClr val="0070C0"/>
+              </a:solidFill>
+            </a:ln>
+          </p:spPr>
+          <p:style>
+            <a:lnRef idx="2">
+              <a:schemeClr val="accent3"/>
+            </a:lnRef>
+            <a:fillRef idx="1">
+              <a:schemeClr val="lt1"/>
+            </a:fillRef>
+            <a:effectRef idx="0">
+              <a:schemeClr val="accent3"/>
+            </a:effectRef>
+            <a:fontRef idx="minor">
+              <a:schemeClr val="dk1"/>
+            </a:fontRef>
+          </p:style>
+          <p:txBody>
+            <a:bodyPr rtlCol="0" anchor="ctr"/>
+            <a:lstStyle/>
+            <a:p>
+              <a:pPr algn="ctr"/>
+              <a:endParaRPr lang="en-BE" dirty="0" err="1">
+                <a:solidFill>
+                  <a:schemeClr val="bg1"/>
+                </a:solidFill>
+                <a:latin typeface="Tahoma"/>
+                <a:cs typeface="Tahoma"/>
+              </a:endParaRPr>
+            </a:p>
+          </p:txBody>
+        </p:sp>
+        <p:pic>
+          <p:nvPicPr>
+            <p:cNvPr id="6" name="Picture 2" descr="Image result for kubernetes logo">
+              <a:extLst>
+                <a:ext uri="{FF2B5EF4-FFF2-40B4-BE49-F238E27FC236}">
+                  <a16:creationId xmlns:a16="http://schemas.microsoft.com/office/drawing/2014/main" id="{B65CE384-AD87-404A-BAB5-BD5FE2699559}"/>
+                </a:ext>
+              </a:extLst>
+            </p:cNvPr>
+            <p:cNvPicPr>
+              <a:picLocks noChangeAspect="1" noChangeArrowheads="1"/>
+            </p:cNvPicPr>
+            <p:nvPr/>
+          </p:nvPicPr>
+          <p:blipFill>
+            <a:blip r:embed="rId3" cstate="print">
+              <a:extLst>
+                <a:ext uri="{28A0092B-C50C-407E-A947-70E740481C1C}">
+                  <a14:useLocalDpi xmlns:a14="http://schemas.microsoft.com/office/drawing/2010/main" val="0"/>
+                </a:ext>
+              </a:extLst>
+            </a:blip>
+            <a:srcRect/>
+            <a:stretch>
+              <a:fillRect/>
+            </a:stretch>
+          </p:blipFill>
+          <p:spPr bwMode="auto">
+            <a:xfrm>
+              <a:off x="1335723" y="1090255"/>
+              <a:ext cx="2581836" cy="557718"/>
+            </a:xfrm>
+            <a:prstGeom prst="rect">
+              <a:avLst/>
+            </a:prstGeom>
+            <a:noFill/>
+            <a:extLst>
+              <a:ext uri="{909E8E84-426E-40DD-AFC4-6F175D3DCCD1}">
+                <a14:hiddenFill xmlns:a14="http://schemas.microsoft.com/office/drawing/2010/main">
+                  <a:solidFill>
+                    <a:srgbClr val="FFFFFF"/>
+                  </a:solidFill>
+                </a14:hiddenFill>
+              </a:ext>
+            </a:extLst>
+          </p:spPr>
+        </p:pic>
+      </p:grpSp>
+      <p:grpSp>
+        <p:nvGrpSpPr>
+          <p:cNvPr id="10" name="Group 9">
+            <a:extLst>
+              <a:ext uri="{FF2B5EF4-FFF2-40B4-BE49-F238E27FC236}">
+                <a16:creationId xmlns:a16="http://schemas.microsoft.com/office/drawing/2014/main" id="{EC0AB97F-39CE-4C1C-B637-141C688EC9D9}"/>
+              </a:ext>
+            </a:extLst>
+          </p:cNvPr>
+          <p:cNvGrpSpPr/>
+          <p:nvPr/>
+        </p:nvGrpSpPr>
+        <p:grpSpPr>
+          <a:xfrm>
+            <a:off x="5649103" y="5077625"/>
+            <a:ext cx="1604474" cy="1007114"/>
+            <a:chOff x="-77599" y="2712509"/>
+            <a:chExt cx="1604474" cy="1007114"/>
+          </a:xfrm>
+        </p:grpSpPr>
+        <p:pic>
+          <p:nvPicPr>
+            <p:cNvPr id="8" name="Picture 7">
+              <a:extLst>
+                <a:ext uri="{FF2B5EF4-FFF2-40B4-BE49-F238E27FC236}">
+                  <a16:creationId xmlns:a16="http://schemas.microsoft.com/office/drawing/2014/main" id="{B61A6C7F-FB16-484E-9DD2-CEB0D9FF0FF2}"/>
+                </a:ext>
+              </a:extLst>
+            </p:cNvPr>
+            <p:cNvPicPr>
+              <a:picLocks noChangeAspect="1"/>
+            </p:cNvPicPr>
+            <p:nvPr/>
+          </p:nvPicPr>
+          <p:blipFill>
+            <a:blip r:embed="rId4"/>
+            <a:stretch>
+              <a:fillRect/>
+            </a:stretch>
+          </p:blipFill>
+          <p:spPr>
+            <a:xfrm>
+              <a:off x="464314" y="2712509"/>
+              <a:ext cx="520647" cy="520647"/>
+            </a:xfrm>
+            <a:prstGeom prst="rect">
+              <a:avLst/>
+            </a:prstGeom>
+          </p:spPr>
+        </p:pic>
+        <p:sp>
+          <p:nvSpPr>
+            <p:cNvPr id="9" name="TextBox 8">
+              <a:extLst>
+                <a:ext uri="{FF2B5EF4-FFF2-40B4-BE49-F238E27FC236}">
+                  <a16:creationId xmlns:a16="http://schemas.microsoft.com/office/drawing/2014/main" id="{866C695D-7635-418B-B46A-D88A62CA19B2}"/>
+                </a:ext>
+              </a:extLst>
+            </p:cNvPr>
+            <p:cNvSpPr txBox="1"/>
+            <p:nvPr/>
+          </p:nvSpPr>
+          <p:spPr>
+            <a:xfrm>
+              <a:off x="-77599" y="3257958"/>
+              <a:ext cx="1604474" cy="461665"/>
+            </a:xfrm>
+            <a:prstGeom prst="rect">
+              <a:avLst/>
+            </a:prstGeom>
+            <a:noFill/>
+          </p:spPr>
+          <p:txBody>
+            <a:bodyPr wrap="square" rtlCol="0">
+              <a:spAutoFit/>
+            </a:bodyPr>
+            <a:lstStyle/>
+            <a:p>
+              <a:pPr algn="ctr"/>
+              <a:r>
+                <a:rPr lang="en-US" sz="1200" b="1" dirty="0"/>
+                <a:t>Orders Queue</a:t>
+              </a:r>
+              <a:br>
+                <a:rPr lang="en-US" sz="1200" dirty="0"/>
+              </a:br>
+              <a:r>
+                <a:rPr lang="en-US" sz="1200" i="1" dirty="0"/>
+                <a:t>Azure Service Bus</a:t>
+              </a:r>
+              <a:endParaRPr lang="LID4096" sz="1200" i="1" dirty="0"/>
+            </a:p>
+          </p:txBody>
+        </p:sp>
+      </p:grpSp>
+      <p:sp>
+        <p:nvSpPr>
+          <p:cNvPr id="36" name="Rectangle 35">
+            <a:extLst>
+              <a:ext uri="{FF2B5EF4-FFF2-40B4-BE49-F238E27FC236}">
+                <a16:creationId xmlns:a16="http://schemas.microsoft.com/office/drawing/2014/main" id="{B70CCA84-4458-4AFF-B188-7C6844F0A09F}"/>
+              </a:ext>
+            </a:extLst>
+          </p:cNvPr>
+          <p:cNvSpPr/>
+          <p:nvPr/>
+        </p:nvSpPr>
+        <p:spPr>
+          <a:xfrm>
+            <a:off x="1360517" y="3446842"/>
+            <a:ext cx="9559675" cy="772942"/>
+          </a:xfrm>
+          <a:prstGeom prst="rect">
+            <a:avLst/>
+          </a:prstGeom>
+          <a:solidFill>
+            <a:schemeClr val="bg1">
+              <a:lumMod val="95000"/>
+            </a:schemeClr>
+          </a:solidFill>
+          <a:ln w="19050">
+            <a:solidFill>
+              <a:srgbClr val="0070C0"/>
+            </a:solidFill>
+          </a:ln>
+        </p:spPr>
+        <p:style>
+          <a:lnRef idx="2">
+            <a:schemeClr val="accent3"/>
+          </a:lnRef>
+          <a:fillRef idx="1">
+            <a:schemeClr val="lt1"/>
+          </a:fillRef>
+          <a:effectRef idx="0">
+            <a:schemeClr val="accent3"/>
+          </a:effectRef>
+          <a:fontRef idx="minor">
+            <a:schemeClr val="dk1"/>
+          </a:fontRef>
+        </p:style>
+        <p:txBody>
+          <a:bodyPr rtlCol="0" anchor="ctr"/>
+          <a:lstStyle/>
+          <a:p>
+            <a:pPr algn="ctr"/>
+            <a:endParaRPr lang="en-BE" sz="1600" dirty="0" err="1">
+              <a:solidFill>
+                <a:schemeClr val="tx2"/>
+              </a:solidFill>
+              <a:cs typeface="Tahoma"/>
+            </a:endParaRPr>
+          </a:p>
+        </p:txBody>
+      </p:sp>
+      <p:sp>
+        <p:nvSpPr>
+          <p:cNvPr id="37" name="TextBox 36">
+            <a:extLst>
+              <a:ext uri="{FF2B5EF4-FFF2-40B4-BE49-F238E27FC236}">
+                <a16:creationId xmlns:a16="http://schemas.microsoft.com/office/drawing/2014/main" id="{32F508D5-4877-4C35-B443-6509F28E19AC}"/>
+              </a:ext>
+            </a:extLst>
+          </p:cNvPr>
+          <p:cNvSpPr txBox="1"/>
+          <p:nvPr/>
+        </p:nvSpPr>
+        <p:spPr>
+          <a:xfrm>
+            <a:off x="2016485" y="3519424"/>
+            <a:ext cx="2021822" cy="618593"/>
+          </a:xfrm>
+          <a:prstGeom prst="rect">
+            <a:avLst/>
+          </a:prstGeom>
+          <a:noFill/>
+          <a:ln w="12700">
+            <a:noFill/>
+          </a:ln>
+        </p:spPr>
+        <p:style>
+          <a:lnRef idx="2">
+            <a:schemeClr val="accent3"/>
+          </a:lnRef>
+          <a:fillRef idx="1">
+            <a:schemeClr val="lt1"/>
+          </a:fillRef>
+          <a:effectRef idx="0">
+            <a:schemeClr val="accent3"/>
+          </a:effectRef>
+          <a:fontRef idx="minor">
+            <a:schemeClr val="dk1"/>
+          </a:fontRef>
+        </p:style>
+        <p:txBody>
+          <a:bodyPr rot="0" spcFirstLastPara="0" vertOverflow="overflow" horzOverflow="overflow" vert="horz" wrap="square" lIns="91440" tIns="45720" rIns="91440" bIns="45720" numCol="1" spcCol="0" rtlCol="0" fromWordArt="0" anchor="ctr" anchorCtr="0" forceAA="0" compatLnSpc="1">
+            <a:prstTxWarp prst="textNoShape">
+              <a:avLst/>
+            </a:prstTxWarp>
+            <a:noAutofit/>
+          </a:bodyPr>
+          <a:lstStyle>
+            <a:defPPr>
+              <a:defRPr lang="en-BE"/>
+            </a:defPPr>
+            <a:lvl1pPr algn="ctr">
+              <a:defRPr sz="1400">
+                <a:solidFill>
+                  <a:schemeClr val="tx2"/>
+                </a:solidFill>
+                <a:cs typeface="Tahoma"/>
+              </a:defRPr>
+            </a:lvl1pPr>
+            <a:lvl2pPr>
+              <a:defRPr>
+                <a:solidFill>
+                  <a:schemeClr val="dk1"/>
+                </a:solidFill>
+              </a:defRPr>
+            </a:lvl2pPr>
+            <a:lvl3pPr>
+              <a:defRPr>
+                <a:solidFill>
+                  <a:schemeClr val="dk1"/>
+                </a:solidFill>
+              </a:defRPr>
+            </a:lvl3pPr>
+            <a:lvl4pPr>
+              <a:defRPr>
+                <a:solidFill>
+                  <a:schemeClr val="dk1"/>
+                </a:solidFill>
+              </a:defRPr>
+            </a:lvl4pPr>
+            <a:lvl5pPr>
+              <a:defRPr>
+                <a:solidFill>
+                  <a:schemeClr val="dk1"/>
+                </a:solidFill>
+              </a:defRPr>
+            </a:lvl5pPr>
+            <a:lvl6pPr>
+              <a:defRPr>
+                <a:solidFill>
+                  <a:schemeClr val="dk1"/>
+                </a:solidFill>
+              </a:defRPr>
+            </a:lvl6pPr>
+            <a:lvl7pPr>
+              <a:defRPr>
+                <a:solidFill>
+                  <a:schemeClr val="dk1"/>
+                </a:solidFill>
+              </a:defRPr>
+            </a:lvl7pPr>
+            <a:lvl8pPr>
+              <a:defRPr>
+                <a:solidFill>
+                  <a:schemeClr val="dk1"/>
+                </a:solidFill>
+              </a:defRPr>
+            </a:lvl8pPr>
+            <a:lvl9pPr>
+              <a:defRPr>
+                <a:solidFill>
+                  <a:schemeClr val="dk1"/>
+                </a:solidFill>
+              </a:defRPr>
+            </a:lvl9pPr>
+          </a:lstStyle>
+          <a:p>
+            <a:pPr algn="l"/>
+            <a:r>
+              <a:rPr lang="en-US" sz="1000" b="1" dirty="0">
+                <a:solidFill>
+                  <a:srgbClr val="0070C0"/>
+                </a:solidFill>
+              </a:rPr>
+              <a:t>Azure AD Workload Identity </a:t>
+            </a:r>
+            <a:r>
+              <a:rPr lang="en-US" sz="1000" dirty="0">
+                <a:solidFill>
+                  <a:srgbClr val="0070C0"/>
+                </a:solidFill>
+              </a:rPr>
+              <a:t>allows exchanging service account tokens for Azure AD tokens using federated credentials.</a:t>
+            </a:r>
+            <a:endParaRPr lang="en-BE" sz="1000" dirty="0">
+              <a:solidFill>
+                <a:srgbClr val="0070C0"/>
+              </a:solidFill>
+            </a:endParaRPr>
+          </a:p>
+        </p:txBody>
+      </p:sp>
+      <p:pic>
+        <p:nvPicPr>
+          <p:cNvPr id="2" name="Picture 2" descr="How to manage customer access to Azure, Intune and Office 365? | Marius  Sandbu">
+            <a:extLst>
+              <a:ext uri="{FF2B5EF4-FFF2-40B4-BE49-F238E27FC236}">
+                <a16:creationId xmlns:a16="http://schemas.microsoft.com/office/drawing/2014/main" id="{D31D2E2A-4619-4CE3-A310-C7EC01665EAA}"/>
+              </a:ext>
+            </a:extLst>
+          </p:cNvPr>
+          <p:cNvPicPr>
+            <a:picLocks noChangeAspect="1" noChangeArrowheads="1"/>
+          </p:cNvPicPr>
+          <p:nvPr/>
+        </p:nvPicPr>
+        <p:blipFill rotWithShape="1">
+          <a:blip r:embed="rId5">
+            <a:extLst>
+              <a:ext uri="{28A0092B-C50C-407E-A947-70E740481C1C}">
+                <a14:useLocalDpi xmlns:a14="http://schemas.microsoft.com/office/drawing/2010/main" val="0"/>
+              </a:ext>
+            </a:extLst>
+          </a:blip>
+          <a:srcRect l="6248" r="63507"/>
+          <a:stretch/>
+        </p:blipFill>
+        <p:spPr bwMode="auto">
+          <a:xfrm>
+            <a:off x="1448246" y="3538341"/>
+            <a:ext cx="580896" cy="580758"/>
+          </a:xfrm>
+          <a:prstGeom prst="rect">
+            <a:avLst/>
+          </a:prstGeom>
+          <a:noFill/>
+          <a:extLst>
+            <a:ext uri="{909E8E84-426E-40DD-AFC4-6F175D3DCCD1}">
+              <a14:hiddenFill xmlns:a14="http://schemas.microsoft.com/office/drawing/2010/main">
+                <a:solidFill>
+                  <a:srgbClr val="FFFFFF"/>
+                </a:solidFill>
+              </a14:hiddenFill>
+            </a:ext>
+          </a:extLst>
+        </p:spPr>
+      </p:pic>
+      <p:sp>
+        <p:nvSpPr>
+          <p:cNvPr id="41" name="TextBox 40">
+            <a:extLst>
+              <a:ext uri="{FF2B5EF4-FFF2-40B4-BE49-F238E27FC236}">
+                <a16:creationId xmlns:a16="http://schemas.microsoft.com/office/drawing/2014/main" id="{3BC57BA6-E24E-44FF-A76F-F877FDC42564}"/>
+              </a:ext>
+            </a:extLst>
+          </p:cNvPr>
+          <p:cNvSpPr txBox="1"/>
+          <p:nvPr/>
+        </p:nvSpPr>
+        <p:spPr>
+          <a:xfrm>
+            <a:off x="4251010" y="5581182"/>
+            <a:ext cx="1447619" cy="600164"/>
+          </a:xfrm>
+          <a:prstGeom prst="rect">
+            <a:avLst/>
+          </a:prstGeom>
+          <a:noFill/>
+        </p:spPr>
+        <p:txBody>
+          <a:bodyPr wrap="square">
+            <a:spAutoFit/>
+          </a:bodyPr>
+          <a:lstStyle/>
+          <a:p>
+            <a:pPr algn="ctr"/>
+            <a:r>
+              <a:rPr lang="en-US" sz="1100" b="1" i="1" dirty="0">
+                <a:solidFill>
+                  <a:srgbClr val="080808"/>
+                </a:solidFill>
+                <a:latin typeface="Segoe UI (Body)"/>
+                <a:cs typeface="Tahoma"/>
+              </a:rPr>
+              <a:t>Autoscaler</a:t>
+            </a:r>
+            <a:br>
+              <a:rPr lang="en-US" sz="1100" i="1" dirty="0">
+                <a:solidFill>
+                  <a:srgbClr val="080808"/>
+                </a:solidFill>
+                <a:latin typeface="Segoe UI (Body)"/>
+                <a:cs typeface="Tahoma"/>
+              </a:rPr>
+            </a:br>
+            <a:r>
+              <a:rPr lang="en-US" sz="1100" i="1" dirty="0">
+                <a:solidFill>
+                  <a:srgbClr val="080808"/>
+                </a:solidFill>
+                <a:latin typeface="Segoe UI (Body)"/>
+                <a:cs typeface="Tahoma"/>
+              </a:rPr>
+              <a:t>Azure AD Application</a:t>
+            </a:r>
+          </a:p>
+        </p:txBody>
+      </p:sp>
+      <p:sp>
+        <p:nvSpPr>
+          <p:cNvPr id="44" name="TextBox 43">
+            <a:extLst>
+              <a:ext uri="{FF2B5EF4-FFF2-40B4-BE49-F238E27FC236}">
+                <a16:creationId xmlns:a16="http://schemas.microsoft.com/office/drawing/2014/main" id="{B92808C4-C72D-45ED-A3F4-D9F85BE12BE9}"/>
+              </a:ext>
+            </a:extLst>
+          </p:cNvPr>
+          <p:cNvSpPr txBox="1"/>
+          <p:nvPr/>
+        </p:nvSpPr>
+        <p:spPr>
+          <a:xfrm>
+            <a:off x="9116963" y="5581182"/>
+            <a:ext cx="1447619" cy="600164"/>
+          </a:xfrm>
+          <a:prstGeom prst="rect">
+            <a:avLst/>
+          </a:prstGeom>
+          <a:noFill/>
+        </p:spPr>
+        <p:txBody>
+          <a:bodyPr wrap="square">
+            <a:spAutoFit/>
+          </a:bodyPr>
+          <a:lstStyle/>
+          <a:p>
+            <a:pPr algn="ctr"/>
+            <a:r>
+              <a:rPr lang="en-US" sz="1100" b="1" i="1" dirty="0">
+                <a:solidFill>
+                  <a:srgbClr val="080808"/>
+                </a:solidFill>
+                <a:latin typeface="Segoe UI (Body)"/>
+                <a:cs typeface="Tahoma"/>
+              </a:rPr>
+              <a:t>Order Processor</a:t>
+            </a:r>
+            <a:br>
+              <a:rPr lang="en-US" sz="1100" i="1" dirty="0">
+                <a:solidFill>
+                  <a:srgbClr val="080808"/>
+                </a:solidFill>
+                <a:latin typeface="Segoe UI (Body)"/>
+                <a:cs typeface="Tahoma"/>
+              </a:rPr>
+            </a:br>
+            <a:r>
+              <a:rPr lang="en-US" sz="1100" i="1" dirty="0">
+                <a:solidFill>
+                  <a:srgbClr val="080808"/>
+                </a:solidFill>
+                <a:latin typeface="Segoe UI (Body)"/>
+                <a:cs typeface="Tahoma"/>
+              </a:rPr>
+              <a:t>Azure AD Application</a:t>
+            </a:r>
+          </a:p>
+        </p:txBody>
+      </p:sp>
+      <p:grpSp>
+        <p:nvGrpSpPr>
+          <p:cNvPr id="1062" name="Group 1061">
+            <a:extLst>
+              <a:ext uri="{FF2B5EF4-FFF2-40B4-BE49-F238E27FC236}">
+                <a16:creationId xmlns:a16="http://schemas.microsoft.com/office/drawing/2014/main" id="{F8581A8A-3EE4-496E-8D24-397792AFFFC0}"/>
+              </a:ext>
+            </a:extLst>
+          </p:cNvPr>
+          <p:cNvGrpSpPr/>
+          <p:nvPr/>
+        </p:nvGrpSpPr>
+        <p:grpSpPr>
+          <a:xfrm>
+            <a:off x="6781413" y="1407782"/>
+            <a:ext cx="4139288" cy="1884618"/>
+            <a:chOff x="6461656" y="1159446"/>
+            <a:chExt cx="4139288" cy="1884618"/>
+          </a:xfrm>
+        </p:grpSpPr>
+        <p:sp>
+          <p:nvSpPr>
+            <p:cNvPr id="26" name="Rectangle 25">
+              <a:extLst>
+                <a:ext uri="{FF2B5EF4-FFF2-40B4-BE49-F238E27FC236}">
+                  <a16:creationId xmlns:a16="http://schemas.microsoft.com/office/drawing/2014/main" id="{CEBDA6AC-795A-43CC-AABB-977CBF1ABA7F}"/>
+                </a:ext>
+              </a:extLst>
+            </p:cNvPr>
+            <p:cNvSpPr/>
+            <p:nvPr/>
+          </p:nvSpPr>
+          <p:spPr>
+            <a:xfrm>
+              <a:off x="6461656" y="1515280"/>
+              <a:ext cx="4139288" cy="1528784"/>
+            </a:xfrm>
+            <a:prstGeom prst="rect">
+              <a:avLst/>
+            </a:prstGeom>
+            <a:solidFill>
+              <a:schemeClr val="accent2">
+                <a:lumMod val="20000"/>
+                <a:lumOff val="80000"/>
+              </a:schemeClr>
+            </a:solidFill>
+            <a:ln w="19050">
+              <a:solidFill>
+                <a:schemeClr val="accent2"/>
+              </a:solidFill>
+            </a:ln>
+          </p:spPr>
+          <p:style>
+            <a:lnRef idx="2">
+              <a:schemeClr val="dk1"/>
+            </a:lnRef>
+            <a:fillRef idx="1">
+              <a:schemeClr val="lt1"/>
+            </a:fillRef>
+            <a:effectRef idx="0">
+              <a:schemeClr val="dk1"/>
+            </a:effectRef>
+            <a:fontRef idx="minor">
+              <a:schemeClr val="dk1"/>
+            </a:fontRef>
+          </p:style>
+          <p:txBody>
+            <a:bodyPr rtlCol="0" anchor="ctr"/>
+            <a:lstStyle/>
+            <a:p>
+              <a:pPr algn="ctr"/>
+              <a:endParaRPr lang="en-BE" dirty="0" err="1">
+                <a:solidFill>
+                  <a:schemeClr val="bg1"/>
+                </a:solidFill>
+                <a:latin typeface="Tahoma"/>
+                <a:cs typeface="Tahoma"/>
+              </a:endParaRPr>
+            </a:p>
+          </p:txBody>
+        </p:sp>
+        <p:sp>
+          <p:nvSpPr>
+            <p:cNvPr id="27" name="TextBox 26">
+              <a:extLst>
+                <a:ext uri="{FF2B5EF4-FFF2-40B4-BE49-F238E27FC236}">
+                  <a16:creationId xmlns:a16="http://schemas.microsoft.com/office/drawing/2014/main" id="{89C66294-CC4B-4091-BF89-605A3D26C1E5}"/>
+                </a:ext>
+              </a:extLst>
+            </p:cNvPr>
+            <p:cNvSpPr txBox="1"/>
+            <p:nvPr/>
+          </p:nvSpPr>
+          <p:spPr>
+            <a:xfrm>
+              <a:off x="6461656" y="1159446"/>
+              <a:ext cx="4139288" cy="276999"/>
+            </a:xfrm>
+            <a:prstGeom prst="rect">
+              <a:avLst/>
+            </a:prstGeom>
+            <a:noFill/>
+          </p:spPr>
+          <p:txBody>
+            <a:bodyPr wrap="square" rtlCol="0">
+              <a:spAutoFit/>
+            </a:bodyPr>
+            <a:lstStyle/>
+            <a:p>
+              <a:pPr algn="ctr"/>
+              <a:r>
+                <a:rPr lang="en-US" sz="1200" b="1" dirty="0">
+                  <a:solidFill>
+                    <a:schemeClr val="accent2"/>
+                  </a:solidFill>
+                </a:rPr>
+                <a:t>App</a:t>
+              </a:r>
+              <a:endParaRPr lang="LID4096" sz="1200" b="1" dirty="0">
+                <a:solidFill>
+                  <a:schemeClr val="accent2"/>
+                </a:solidFill>
+              </a:endParaRPr>
+            </a:p>
+          </p:txBody>
+        </p:sp>
+        <p:grpSp>
+          <p:nvGrpSpPr>
+            <p:cNvPr id="22" name="Group 21">
+              <a:extLst>
+                <a:ext uri="{FF2B5EF4-FFF2-40B4-BE49-F238E27FC236}">
+                  <a16:creationId xmlns:a16="http://schemas.microsoft.com/office/drawing/2014/main" id="{30ACD4CD-8458-4027-941C-155317B14ADB}"/>
+                </a:ext>
+              </a:extLst>
+            </p:cNvPr>
+            <p:cNvGrpSpPr/>
+            <p:nvPr/>
+          </p:nvGrpSpPr>
+          <p:grpSpPr>
+            <a:xfrm>
+              <a:off x="6614498" y="1680818"/>
+              <a:ext cx="1799991" cy="504169"/>
+              <a:chOff x="6362933" y="1680818"/>
+              <a:chExt cx="1799991" cy="504169"/>
+            </a:xfrm>
+          </p:grpSpPr>
+          <p:sp>
+            <p:nvSpPr>
+              <p:cNvPr id="28" name="Rectangle 27">
+                <a:extLst>
+                  <a:ext uri="{FF2B5EF4-FFF2-40B4-BE49-F238E27FC236}">
+                    <a16:creationId xmlns:a16="http://schemas.microsoft.com/office/drawing/2014/main" id="{797B0673-6D0E-4AAC-A651-6718C9FC1F33}"/>
+                  </a:ext>
+                </a:extLst>
+              </p:cNvPr>
+              <p:cNvSpPr/>
+              <p:nvPr/>
+            </p:nvSpPr>
+            <p:spPr>
+              <a:xfrm rot="5400000">
+                <a:off x="7010844" y="1032907"/>
+                <a:ext cx="504169" cy="1799991"/>
+              </a:xfrm>
+              <a:prstGeom prst="rect">
+                <a:avLst/>
+              </a:prstGeom>
+              <a:ln w="19050">
+                <a:solidFill>
+                  <a:schemeClr val="accent2"/>
+                </a:solidFill>
+              </a:ln>
+            </p:spPr>
+            <p:style>
+              <a:lnRef idx="2">
+                <a:schemeClr val="accent2"/>
+              </a:lnRef>
+              <a:fillRef idx="1">
+                <a:schemeClr val="lt1"/>
+              </a:fillRef>
+              <a:effectRef idx="0">
+                <a:schemeClr val="accent2"/>
+              </a:effectRef>
+              <a:fontRef idx="minor">
+                <a:schemeClr val="dk1"/>
+              </a:fontRef>
+            </p:style>
+            <p:txBody>
+              <a:bodyPr vert="vert270" rtlCol="0" anchor="ctr"/>
+              <a:lstStyle/>
+              <a:p>
+                <a:pPr algn="ctr"/>
+                <a:r>
+                  <a:rPr lang="en-US" sz="1200" dirty="0">
+                    <a:solidFill>
+                      <a:schemeClr val="accent2"/>
+                    </a:solidFill>
+                    <a:cs typeface="Tahoma"/>
+                  </a:rPr>
+                  <a:t>Deployment</a:t>
+                </a:r>
+                <a:endParaRPr lang="en-BE" sz="1200" dirty="0" err="1">
+                  <a:solidFill>
+                    <a:schemeClr val="accent2"/>
+                  </a:solidFill>
+                  <a:cs typeface="Tahoma"/>
+                </a:endParaRPr>
+              </a:p>
+            </p:txBody>
+          </p:sp>
+          <p:pic>
+            <p:nvPicPr>
+              <p:cNvPr id="25" name="Picture 8" descr="GitHub - json-api-dotnet/JsonApiDotNetCore: JSON:API Framework for ...">
+                <a:extLst>
+                  <a:ext uri="{FF2B5EF4-FFF2-40B4-BE49-F238E27FC236}">
+                    <a16:creationId xmlns:a16="http://schemas.microsoft.com/office/drawing/2014/main" id="{8AC17890-ED61-4840-9841-305B773E49B4}"/>
+                  </a:ext>
+                </a:extLst>
+              </p:cNvPr>
+              <p:cNvPicPr>
+                <a:picLocks noChangeAspect="1" noChangeArrowheads="1"/>
+              </p:cNvPicPr>
+              <p:nvPr/>
+            </p:nvPicPr>
+            <p:blipFill rotWithShape="1">
+              <a:blip r:embed="rId6" cstate="print">
+                <a:extLst>
+                  <a:ext uri="{BEBA8EAE-BF5A-486C-A8C5-ECC9F3942E4B}">
+                    <a14:imgProps xmlns:a14="http://schemas.microsoft.com/office/drawing/2010/main">
+                      <a14:imgLayer r:embed="rId7">
+                        <a14:imgEffect>
+                          <a14:backgroundRemoval t="30556" b="87963" l="19907" r="76852">
+                            <a14:foregroundMark x1="24537" y1="48148" x2="25000" y2="71296"/>
+                            <a14:foregroundMark x1="25000" y1="71296" x2="43056" y2="86574"/>
+                            <a14:foregroundMark x1="43056" y1="86574" x2="66204" y2="80556"/>
+                            <a14:foregroundMark x1="66204" y1="80556" x2="77315" y2="59259"/>
+                            <a14:foregroundMark x1="77315" y1="59259" x2="67130" y2="37963"/>
+                            <a14:foregroundMark x1="67130" y1="37963" x2="44907" y2="31019"/>
+                            <a14:foregroundMark x1="44907" y1="31019" x2="24074" y2="43519"/>
+                            <a14:foregroundMark x1="24074" y1="43519" x2="22685" y2="50000"/>
+                            <a14:foregroundMark x1="35185" y1="48611" x2="61574" y2="50463"/>
+                            <a14:foregroundMark x1="61574" y1="50463" x2="75000" y2="69444"/>
+                            <a14:foregroundMark x1="75000" y1="69444" x2="56944" y2="84722"/>
+                            <a14:foregroundMark x1="56944" y1="84722" x2="40278" y2="86111"/>
+                            <a14:foregroundMark x1="47222" y1="47685" x2="31944" y2="64352"/>
+                            <a14:foregroundMark x1="33333" y1="48148" x2="33333" y2="48148"/>
+                            <a14:foregroundMark x1="31944" y1="52315" x2="31944" y2="52315"/>
+                            <a14:foregroundMark x1="43519" y1="61111" x2="43519" y2="61111"/>
+                            <a14:foregroundMark x1="50926" y1="55093" x2="50926" y2="55093"/>
+                            <a14:foregroundMark x1="66204" y1="48611" x2="66204" y2="48611"/>
+                            <a14:foregroundMark x1="50000" y1="60648" x2="50000" y2="60648"/>
+                            <a14:foregroundMark x1="49074" y1="30556" x2="49074" y2="30556"/>
+                            <a14:foregroundMark x1="76852" y1="54167" x2="76852" y2="54167"/>
+                            <a14:foregroundMark x1="50926" y1="87963" x2="50926" y2="87963"/>
+                            <a14:foregroundMark x1="19907" y1="59259" x2="19907" y2="59259"/>
+                          </a14:backgroundRemoval>
+                        </a14:imgEffect>
+                      </a14:imgLayer>
+                    </a14:imgProps>
+                  </a:ext>
+                  <a:ext uri="{28A0092B-C50C-407E-A947-70E740481C1C}">
+                    <a14:useLocalDpi xmlns:a14="http://schemas.microsoft.com/office/drawing/2010/main" val="0"/>
+                  </a:ext>
+                </a:extLst>
+              </a:blip>
+              <a:srcRect l="18508" t="28341" r="19779" b="8891"/>
+              <a:stretch/>
+            </p:blipFill>
+            <p:spPr bwMode="auto">
+              <a:xfrm>
+                <a:off x="7837383" y="1821380"/>
+                <a:ext cx="217692" cy="221407"/>
+              </a:xfrm>
+              <a:prstGeom prst="rect">
+                <a:avLst/>
+              </a:prstGeom>
+              <a:noFill/>
+              <a:extLst>
+                <a:ext uri="{909E8E84-426E-40DD-AFC4-6F175D3DCCD1}">
+                  <a14:hiddenFill xmlns:a14="http://schemas.microsoft.com/office/drawing/2010/main">
+                    <a:solidFill>
+                      <a:srgbClr val="FFFFFF"/>
+                    </a:solidFill>
+                  </a14:hiddenFill>
+                </a:ext>
+              </a:extLst>
+            </p:spPr>
+          </p:pic>
+        </p:grpSp>
+        <p:sp>
+          <p:nvSpPr>
+            <p:cNvPr id="15" name="Rectangle 14">
+              <a:extLst>
+                <a:ext uri="{FF2B5EF4-FFF2-40B4-BE49-F238E27FC236}">
+                  <a16:creationId xmlns:a16="http://schemas.microsoft.com/office/drawing/2014/main" id="{88BE7B74-C161-46E3-8558-40A56E711772}"/>
+                </a:ext>
+              </a:extLst>
+            </p:cNvPr>
+            <p:cNvSpPr/>
+            <p:nvPr/>
+          </p:nvSpPr>
+          <p:spPr>
+            <a:xfrm rot="5400000">
+              <a:off x="9263659" y="1032087"/>
+              <a:ext cx="504169" cy="1799991"/>
+            </a:xfrm>
+            <a:prstGeom prst="rect">
+              <a:avLst/>
+            </a:prstGeom>
+            <a:ln w="19050">
+              <a:solidFill>
+                <a:schemeClr val="accent2"/>
+              </a:solidFill>
+            </a:ln>
+          </p:spPr>
+          <p:style>
+            <a:lnRef idx="2">
+              <a:schemeClr val="accent2"/>
+            </a:lnRef>
+            <a:fillRef idx="1">
+              <a:schemeClr val="lt1"/>
+            </a:fillRef>
+            <a:effectRef idx="0">
+              <a:schemeClr val="accent2"/>
+            </a:effectRef>
+            <a:fontRef idx="minor">
+              <a:schemeClr val="dk1"/>
+            </a:fontRef>
+          </p:style>
+          <p:txBody>
+            <a:bodyPr vert="vert270" rtlCol="0" anchor="ctr"/>
+            <a:lstStyle/>
+            <a:p>
+              <a:pPr algn="ctr"/>
+              <a:r>
+                <a:rPr lang="en-US" sz="1200" dirty="0">
+                  <a:solidFill>
+                    <a:schemeClr val="accent2"/>
+                  </a:solidFill>
+                  <a:cs typeface="Tahoma"/>
+                </a:rPr>
+                <a:t>Service Account</a:t>
+              </a:r>
+              <a:endParaRPr lang="en-BE" sz="1200" dirty="0" err="1">
+                <a:solidFill>
+                  <a:schemeClr val="accent2"/>
+                </a:solidFill>
+                <a:cs typeface="Tahoma"/>
+              </a:endParaRPr>
+            </a:p>
+          </p:txBody>
+        </p:sp>
+        <p:sp>
+          <p:nvSpPr>
+            <p:cNvPr id="35" name="Rectangle 34">
+              <a:extLst>
+                <a:ext uri="{FF2B5EF4-FFF2-40B4-BE49-F238E27FC236}">
+                  <a16:creationId xmlns:a16="http://schemas.microsoft.com/office/drawing/2014/main" id="{75D55F4F-E05F-406E-AD7B-16DDA2BDB444}"/>
+                </a:ext>
+              </a:extLst>
+            </p:cNvPr>
+            <p:cNvSpPr/>
+            <p:nvPr/>
+          </p:nvSpPr>
+          <p:spPr>
+            <a:xfrm rot="5400000">
+              <a:off x="7261817" y="1723363"/>
+              <a:ext cx="504169" cy="1799991"/>
+            </a:xfrm>
+            <a:prstGeom prst="rect">
+              <a:avLst/>
+            </a:prstGeom>
+            <a:ln w="19050">
+              <a:solidFill>
+                <a:schemeClr val="accent2"/>
+              </a:solidFill>
+            </a:ln>
+          </p:spPr>
+          <p:style>
+            <a:lnRef idx="2">
+              <a:schemeClr val="accent2"/>
+            </a:lnRef>
+            <a:fillRef idx="1">
+              <a:schemeClr val="lt1"/>
+            </a:fillRef>
+            <a:effectRef idx="0">
+              <a:schemeClr val="accent2"/>
+            </a:effectRef>
+            <a:fontRef idx="minor">
+              <a:schemeClr val="dk1"/>
+            </a:fontRef>
+          </p:style>
+          <p:txBody>
+            <a:bodyPr vert="vert270" rtlCol="0" anchor="ctr"/>
+            <a:lstStyle/>
+            <a:p>
+              <a:pPr algn="ctr"/>
+              <a:r>
+                <a:rPr lang="en-US" sz="1200" dirty="0">
+                  <a:solidFill>
+                    <a:schemeClr val="accent2"/>
+                  </a:solidFill>
+                  <a:cs typeface="Tahoma"/>
+                </a:rPr>
+                <a:t>ScaledObject</a:t>
+              </a:r>
+              <a:endParaRPr lang="en-BE" sz="1200" dirty="0" err="1">
+                <a:solidFill>
+                  <a:schemeClr val="accent2"/>
+                </a:solidFill>
+                <a:cs typeface="Tahoma"/>
+              </a:endParaRPr>
+            </a:p>
+          </p:txBody>
+        </p:sp>
+        <p:cxnSp>
+          <p:nvCxnSpPr>
+            <p:cNvPr id="56" name="Straight Arrow Connector 52">
+              <a:extLst>
+                <a:ext uri="{FF2B5EF4-FFF2-40B4-BE49-F238E27FC236}">
+                  <a16:creationId xmlns:a16="http://schemas.microsoft.com/office/drawing/2014/main" id="{4BBAD611-E25A-4421-A9F1-EF89D5DA9F8A}"/>
+                </a:ext>
+              </a:extLst>
+            </p:cNvPr>
+            <p:cNvCxnSpPr>
+              <a:cxnSpLocks/>
+              <a:stCxn id="15" idx="2"/>
+              <a:endCxn id="28" idx="0"/>
+            </p:cNvCxnSpPr>
+            <p:nvPr/>
+          </p:nvCxnSpPr>
+          <p:spPr>
+            <a:xfrm rot="10800000" flipV="1">
+              <a:off x="8414490" y="1932083"/>
+              <a:ext cx="201259" cy="820"/>
+            </a:xfrm>
+            <a:prstGeom prst="bentConnector3">
+              <a:avLst>
+                <a:gd name="adj1" fmla="val 50000"/>
+              </a:avLst>
+            </a:prstGeom>
+            <a:ln w="9525">
+              <a:tailEnd type="triangle"/>
+            </a:ln>
+          </p:spPr>
+          <p:style>
+            <a:lnRef idx="1">
+              <a:schemeClr val="accent3"/>
+            </a:lnRef>
+            <a:fillRef idx="0">
+              <a:schemeClr val="accent3"/>
+            </a:fillRef>
+            <a:effectRef idx="0">
+              <a:schemeClr val="accent3"/>
+            </a:effectRef>
+            <a:fontRef idx="minor">
+              <a:schemeClr val="tx1"/>
+            </a:fontRef>
+          </p:style>
+        </p:cxnSp>
+        <p:cxnSp>
+          <p:nvCxnSpPr>
+            <p:cNvPr id="71" name="Straight Arrow Connector 52">
+              <a:extLst>
+                <a:ext uri="{FF2B5EF4-FFF2-40B4-BE49-F238E27FC236}">
+                  <a16:creationId xmlns:a16="http://schemas.microsoft.com/office/drawing/2014/main" id="{36E791DE-8A22-4C82-84D7-59593AE2A51A}"/>
+                </a:ext>
+              </a:extLst>
+            </p:cNvPr>
+            <p:cNvCxnSpPr>
+              <a:cxnSpLocks/>
+              <a:stCxn id="35" idx="1"/>
+              <a:endCxn id="28" idx="3"/>
+            </p:cNvCxnSpPr>
+            <p:nvPr/>
+          </p:nvCxnSpPr>
+          <p:spPr>
+            <a:xfrm flipV="1">
+              <a:off x="7513901" y="2184987"/>
+              <a:ext cx="592" cy="186287"/>
+            </a:xfrm>
+            <a:prstGeom prst="straightConnector1">
+              <a:avLst/>
+            </a:prstGeom>
+            <a:ln w="9525">
+              <a:tailEnd type="triangle"/>
+            </a:ln>
+          </p:spPr>
+          <p:style>
+            <a:lnRef idx="1">
+              <a:schemeClr val="accent3"/>
+            </a:lnRef>
+            <a:fillRef idx="0">
+              <a:schemeClr val="accent3"/>
+            </a:fillRef>
+            <a:effectRef idx="0">
+              <a:schemeClr val="accent3"/>
+            </a:effectRef>
+            <a:fontRef idx="minor">
+              <a:schemeClr val="tx1"/>
+            </a:fontRef>
+          </p:style>
+        </p:cxnSp>
+      </p:grpSp>
+      <p:grpSp>
+        <p:nvGrpSpPr>
+          <p:cNvPr id="1040" name="Group 1039">
+            <a:extLst>
+              <a:ext uri="{FF2B5EF4-FFF2-40B4-BE49-F238E27FC236}">
+                <a16:creationId xmlns:a16="http://schemas.microsoft.com/office/drawing/2014/main" id="{400953ED-CBB1-4DEC-8462-22432940CC70}"/>
+              </a:ext>
+            </a:extLst>
+          </p:cNvPr>
+          <p:cNvGrpSpPr/>
+          <p:nvPr/>
+        </p:nvGrpSpPr>
+        <p:grpSpPr>
+          <a:xfrm>
+            <a:off x="1326636" y="1805346"/>
+            <a:ext cx="4692730" cy="1445166"/>
+            <a:chOff x="1403270" y="1805346"/>
+            <a:chExt cx="4692730" cy="1445166"/>
+          </a:xfrm>
+        </p:grpSpPr>
+        <p:sp>
+          <p:nvSpPr>
+            <p:cNvPr id="12" name="Rectangle 11">
+              <a:extLst>
+                <a:ext uri="{FF2B5EF4-FFF2-40B4-BE49-F238E27FC236}">
+                  <a16:creationId xmlns:a16="http://schemas.microsoft.com/office/drawing/2014/main" id="{BE514519-6863-4E67-BD5E-863ADFC76B13}"/>
+                </a:ext>
+              </a:extLst>
+            </p:cNvPr>
+            <p:cNvSpPr/>
+            <p:nvPr/>
+          </p:nvSpPr>
+          <p:spPr>
+            <a:xfrm>
+              <a:off x="1403270" y="1805346"/>
+              <a:ext cx="4692730" cy="1445166"/>
+            </a:xfrm>
+            <a:prstGeom prst="rect">
+              <a:avLst/>
+            </a:prstGeom>
+            <a:solidFill>
+              <a:schemeClr val="bg1">
+                <a:lumMod val="95000"/>
+              </a:schemeClr>
+            </a:solidFill>
+            <a:ln w="19050">
+              <a:solidFill>
+                <a:srgbClr val="0070C0"/>
+              </a:solidFill>
+            </a:ln>
+          </p:spPr>
+          <p:style>
+            <a:lnRef idx="2">
+              <a:schemeClr val="accent3"/>
+            </a:lnRef>
+            <a:fillRef idx="1">
+              <a:schemeClr val="lt1"/>
+            </a:fillRef>
+            <a:effectRef idx="0">
+              <a:schemeClr val="accent3"/>
+            </a:effectRef>
+            <a:fontRef idx="minor">
+              <a:schemeClr val="dk1"/>
+            </a:fontRef>
+          </p:style>
+          <p:txBody>
+            <a:bodyPr rtlCol="0" anchor="ctr"/>
+            <a:lstStyle/>
+            <a:p>
+              <a:pPr algn="ctr"/>
+              <a:endParaRPr lang="en-BE" sz="1600" dirty="0" err="1">
+                <a:solidFill>
+                  <a:schemeClr val="tx2"/>
+                </a:solidFill>
+                <a:cs typeface="Tahoma"/>
+              </a:endParaRPr>
+            </a:p>
+          </p:txBody>
+        </p:sp>
+        <p:sp>
+          <p:nvSpPr>
+            <p:cNvPr id="13" name="TextBox 12">
+              <a:extLst>
+                <a:ext uri="{FF2B5EF4-FFF2-40B4-BE49-F238E27FC236}">
+                  <a16:creationId xmlns:a16="http://schemas.microsoft.com/office/drawing/2014/main" id="{FA012573-CE86-471D-BB3D-564AA6A582B7}"/>
+                </a:ext>
+              </a:extLst>
+            </p:cNvPr>
+            <p:cNvSpPr txBox="1"/>
+            <p:nvPr/>
+          </p:nvSpPr>
+          <p:spPr>
+            <a:xfrm>
+              <a:off x="2059238" y="1877930"/>
+              <a:ext cx="2021822" cy="1087912"/>
+            </a:xfrm>
+            <a:prstGeom prst="rect">
+              <a:avLst/>
+            </a:prstGeom>
+            <a:noFill/>
+            <a:ln w="12700">
+              <a:noFill/>
+            </a:ln>
+          </p:spPr>
+          <p:style>
+            <a:lnRef idx="2">
+              <a:schemeClr val="accent3"/>
+            </a:lnRef>
+            <a:fillRef idx="1">
+              <a:schemeClr val="lt1"/>
+            </a:fillRef>
+            <a:effectRef idx="0">
+              <a:schemeClr val="accent3"/>
+            </a:effectRef>
+            <a:fontRef idx="minor">
+              <a:schemeClr val="dk1"/>
+            </a:fontRef>
+          </p:style>
+          <p:txBody>
+            <a:bodyPr rot="0" spcFirstLastPara="0" vertOverflow="overflow" horzOverflow="overflow" vert="horz" wrap="square" lIns="91440" tIns="45720" rIns="91440" bIns="45720" numCol="1" spcCol="0" rtlCol="0" fromWordArt="0" anchor="ctr" anchorCtr="0" forceAA="0" compatLnSpc="1">
+              <a:prstTxWarp prst="textNoShape">
+                <a:avLst/>
+              </a:prstTxWarp>
+              <a:noAutofit/>
+            </a:bodyPr>
+            <a:lstStyle>
+              <a:defPPr>
+                <a:defRPr lang="en-BE"/>
+              </a:defPPr>
+              <a:lvl1pPr algn="ctr">
+                <a:defRPr sz="1400">
+                  <a:solidFill>
+                    <a:schemeClr val="tx2"/>
+                  </a:solidFill>
+                  <a:cs typeface="Tahoma"/>
+                </a:defRPr>
+              </a:lvl1pPr>
+              <a:lvl2pPr>
+                <a:defRPr>
+                  <a:solidFill>
+                    <a:schemeClr val="dk1"/>
+                  </a:solidFill>
+                </a:defRPr>
+              </a:lvl2pPr>
+              <a:lvl3pPr>
+                <a:defRPr>
+                  <a:solidFill>
+                    <a:schemeClr val="dk1"/>
+                  </a:solidFill>
+                </a:defRPr>
+              </a:lvl3pPr>
+              <a:lvl4pPr>
+                <a:defRPr>
+                  <a:solidFill>
+                    <a:schemeClr val="dk1"/>
+                  </a:solidFill>
+                </a:defRPr>
+              </a:lvl4pPr>
+              <a:lvl5pPr>
+                <a:defRPr>
+                  <a:solidFill>
+                    <a:schemeClr val="dk1"/>
+                  </a:solidFill>
+                </a:defRPr>
+              </a:lvl5pPr>
+              <a:lvl6pPr>
+                <a:defRPr>
+                  <a:solidFill>
+                    <a:schemeClr val="dk1"/>
+                  </a:solidFill>
+                </a:defRPr>
+              </a:lvl6pPr>
+              <a:lvl7pPr>
+                <a:defRPr>
+                  <a:solidFill>
+                    <a:schemeClr val="dk1"/>
+                  </a:solidFill>
+                </a:defRPr>
+              </a:lvl7pPr>
+              <a:lvl8pPr>
+                <a:defRPr>
+                  <a:solidFill>
+                    <a:schemeClr val="dk1"/>
+                  </a:solidFill>
+                </a:defRPr>
+              </a:lvl8pPr>
+              <a:lvl9pPr>
+                <a:defRPr>
+                  <a:solidFill>
+                    <a:schemeClr val="dk1"/>
+                  </a:solidFill>
+                </a:defRPr>
+              </a:lvl9pPr>
+            </a:lstStyle>
+            <a:p>
+              <a:pPr algn="l"/>
+              <a:r>
+                <a:rPr lang="en-US" sz="1000" b="1" dirty="0">
+                  <a:solidFill>
+                    <a:srgbClr val="0070C0"/>
+                  </a:solidFill>
+                </a:rPr>
+                <a:t>Kubernetes Event-driven Autoscaling </a:t>
+              </a:r>
+              <a:r>
+                <a:rPr lang="en-US" sz="1000" dirty="0">
+                  <a:solidFill>
+                    <a:srgbClr val="0070C0"/>
+                  </a:solidFill>
+                </a:rPr>
+                <a:t>provides application autoscaling on a variety of metric sources such as Azure Event Hubs &amp; Azure Service Bus.</a:t>
+              </a:r>
+              <a:endParaRPr lang="en-BE" sz="1000" dirty="0">
+                <a:solidFill>
+                  <a:srgbClr val="0070C0"/>
+                </a:solidFill>
+              </a:endParaRPr>
+            </a:p>
+          </p:txBody>
+        </p:sp>
+        <p:pic>
+          <p:nvPicPr>
+            <p:cNvPr id="14" name="Picture 6" descr="KEDA | KEDA Concepts">
+              <a:extLst>
+                <a:ext uri="{FF2B5EF4-FFF2-40B4-BE49-F238E27FC236}">
+                  <a16:creationId xmlns:a16="http://schemas.microsoft.com/office/drawing/2014/main" id="{25FEB9E1-1168-4338-8335-A6CB11CAE4D5}"/>
+                </a:ext>
+              </a:extLst>
+            </p:cNvPr>
+            <p:cNvPicPr>
+              <a:picLocks noChangeAspect="1" noChangeArrowheads="1"/>
+            </p:cNvPicPr>
+            <p:nvPr/>
+          </p:nvPicPr>
+          <p:blipFill>
+            <a:blip r:embed="rId8" cstate="print">
+              <a:extLst>
+                <a:ext uri="{28A0092B-C50C-407E-A947-70E740481C1C}">
+                  <a14:useLocalDpi xmlns:a14="http://schemas.microsoft.com/office/drawing/2010/main" val="0"/>
+                </a:ext>
+              </a:extLst>
+            </a:blip>
+            <a:srcRect/>
+            <a:stretch>
+              <a:fillRect/>
+            </a:stretch>
+          </p:blipFill>
+          <p:spPr bwMode="auto">
+            <a:xfrm>
+              <a:off x="1490998" y="1877930"/>
+              <a:ext cx="555582" cy="555968"/>
+            </a:xfrm>
+            <a:prstGeom prst="rect">
+              <a:avLst/>
+            </a:prstGeom>
+            <a:noFill/>
+            <a:extLst>
+              <a:ext uri="{909E8E84-426E-40DD-AFC4-6F175D3DCCD1}">
+                <a14:hiddenFill xmlns:a14="http://schemas.microsoft.com/office/drawing/2010/main">
+                  <a:solidFill>
+                    <a:srgbClr val="FFFFFF"/>
+                  </a:solidFill>
+                </a14:hiddenFill>
+              </a:ext>
+            </a:extLst>
+          </p:spPr>
+        </p:pic>
+        <p:sp>
+          <p:nvSpPr>
+            <p:cNvPr id="1034" name="Rectangle 1033">
+              <a:extLst>
+                <a:ext uri="{FF2B5EF4-FFF2-40B4-BE49-F238E27FC236}">
+                  <a16:creationId xmlns:a16="http://schemas.microsoft.com/office/drawing/2014/main" id="{0688F378-9B93-49C7-9149-83B3AF726470}"/>
+                </a:ext>
+              </a:extLst>
+            </p:cNvPr>
+            <p:cNvSpPr/>
+            <p:nvPr/>
+          </p:nvSpPr>
+          <p:spPr>
+            <a:xfrm rot="5400000">
+              <a:off x="4803025" y="1284171"/>
+              <a:ext cx="504169" cy="1799991"/>
+            </a:xfrm>
+            <a:prstGeom prst="rect">
+              <a:avLst/>
+            </a:prstGeom>
+            <a:ln w="19050">
+              <a:solidFill>
+                <a:schemeClr val="accent1"/>
+              </a:solidFill>
+            </a:ln>
+          </p:spPr>
+          <p:style>
+            <a:lnRef idx="2">
+              <a:schemeClr val="accent2"/>
+            </a:lnRef>
+            <a:fillRef idx="1">
+              <a:schemeClr val="lt1"/>
+            </a:fillRef>
+            <a:effectRef idx="0">
+              <a:schemeClr val="accent2"/>
+            </a:effectRef>
+            <a:fontRef idx="minor">
+              <a:schemeClr val="dk1"/>
+            </a:fontRef>
+          </p:style>
+          <p:txBody>
+            <a:bodyPr vert="vert270" rtlCol="0" anchor="ctr"/>
+            <a:lstStyle/>
+            <a:p>
+              <a:pPr algn="ctr"/>
+              <a:r>
+                <a:rPr lang="en-US" sz="1200" dirty="0">
+                  <a:solidFill>
+                    <a:srgbClr val="0070C0"/>
+                  </a:solidFill>
+                  <a:cs typeface="Tahoma"/>
+                </a:rPr>
+                <a:t>Service Account</a:t>
+              </a:r>
+            </a:p>
+          </p:txBody>
+        </p:sp>
+      </p:grpSp>
+      <p:cxnSp>
+        <p:nvCxnSpPr>
+          <p:cNvPr id="81" name="Straight Arrow Connector 52">
+            <a:extLst>
+              <a:ext uri="{FF2B5EF4-FFF2-40B4-BE49-F238E27FC236}">
+                <a16:creationId xmlns:a16="http://schemas.microsoft.com/office/drawing/2014/main" id="{B202ABEF-F168-4B1E-8ED9-254EDC324B3B}"/>
+              </a:ext>
+            </a:extLst>
+          </p:cNvPr>
+          <p:cNvCxnSpPr>
+            <a:cxnSpLocks/>
+          </p:cNvCxnSpPr>
+          <p:nvPr/>
+        </p:nvCxnSpPr>
+        <p:spPr>
+          <a:xfrm>
+            <a:off x="4955342" y="2441713"/>
+            <a:ext cx="19477" cy="2628815"/>
+          </a:xfrm>
+          <a:prstGeom prst="straightConnector1">
+            <a:avLst/>
+          </a:prstGeom>
+          <a:ln w="9525">
+            <a:tailEnd type="triangle"/>
+          </a:ln>
+        </p:spPr>
+        <p:style>
+          <a:lnRef idx="1">
+            <a:schemeClr val="accent3"/>
+          </a:lnRef>
+          <a:fillRef idx="0">
+            <a:schemeClr val="accent3"/>
+          </a:fillRef>
+          <a:effectRef idx="0">
+            <a:schemeClr val="accent3"/>
+          </a:effectRef>
+          <a:fontRef idx="minor">
+            <a:schemeClr val="tx1"/>
+          </a:fontRef>
+        </p:style>
+      </p:cxnSp>
+      <p:cxnSp>
+        <p:nvCxnSpPr>
+          <p:cNvPr id="92" name="Straight Arrow Connector 52">
+            <a:extLst>
+              <a:ext uri="{FF2B5EF4-FFF2-40B4-BE49-F238E27FC236}">
+                <a16:creationId xmlns:a16="http://schemas.microsoft.com/office/drawing/2014/main" id="{B3BC6902-CD33-449C-A8C8-73AB1D17760F}"/>
+              </a:ext>
+            </a:extLst>
+          </p:cNvPr>
+          <p:cNvCxnSpPr>
+            <a:cxnSpLocks/>
+            <a:stCxn id="1034" idx="0"/>
+            <a:endCxn id="8" idx="0"/>
+          </p:cNvCxnSpPr>
+          <p:nvPr/>
+        </p:nvCxnSpPr>
+        <p:spPr>
+          <a:xfrm>
+            <a:off x="5878471" y="2184167"/>
+            <a:ext cx="572869" cy="2893458"/>
+          </a:xfrm>
+          <a:prstGeom prst="bentConnector2">
+            <a:avLst/>
+          </a:prstGeom>
+          <a:ln w="9525">
+            <a:tailEnd type="triangle"/>
+          </a:ln>
+        </p:spPr>
+        <p:style>
+          <a:lnRef idx="1">
+            <a:schemeClr val="accent3"/>
+          </a:lnRef>
+          <a:fillRef idx="0">
+            <a:schemeClr val="accent3"/>
+          </a:fillRef>
+          <a:effectRef idx="0">
+            <a:schemeClr val="accent3"/>
+          </a:effectRef>
+          <a:fontRef idx="minor">
+            <a:schemeClr val="tx1"/>
+          </a:fontRef>
+        </p:style>
+      </p:cxnSp>
+      <p:cxnSp>
+        <p:nvCxnSpPr>
+          <p:cNvPr id="45" name="Straight Arrow Connector 52">
+            <a:extLst>
+              <a:ext uri="{FF2B5EF4-FFF2-40B4-BE49-F238E27FC236}">
+                <a16:creationId xmlns:a16="http://schemas.microsoft.com/office/drawing/2014/main" id="{02BD691F-56AD-404A-B206-449763758380}"/>
+              </a:ext>
+            </a:extLst>
+          </p:cNvPr>
+          <p:cNvCxnSpPr>
+            <a:cxnSpLocks/>
+            <a:stCxn id="28" idx="2"/>
+            <a:endCxn id="8" idx="0"/>
+          </p:cNvCxnSpPr>
+          <p:nvPr/>
+        </p:nvCxnSpPr>
+        <p:spPr>
+          <a:xfrm rot="10800000" flipV="1">
+            <a:off x="6451341" y="2181239"/>
+            <a:ext cx="482915" cy="2896386"/>
+          </a:xfrm>
+          <a:prstGeom prst="bentConnector2">
+            <a:avLst/>
+          </a:prstGeom>
+          <a:ln w="9525">
+            <a:tailEnd type="triangle"/>
+          </a:ln>
+        </p:spPr>
+        <p:style>
+          <a:lnRef idx="1">
+            <a:schemeClr val="accent3"/>
+          </a:lnRef>
+          <a:fillRef idx="0">
+            <a:schemeClr val="accent3"/>
+          </a:fillRef>
+          <a:effectRef idx="0">
+            <a:schemeClr val="accent3"/>
+          </a:effectRef>
+          <a:fontRef idx="minor">
+            <a:schemeClr val="tx1"/>
+          </a:fontRef>
+        </p:style>
+      </p:cxnSp>
+      <p:pic>
+        <p:nvPicPr>
+          <p:cNvPr id="11" name="Picture 10" descr="Shape&#10;&#10;Description automatically generated with low confidence">
+            <a:extLst>
+              <a:ext uri="{FF2B5EF4-FFF2-40B4-BE49-F238E27FC236}">
+                <a16:creationId xmlns:a16="http://schemas.microsoft.com/office/drawing/2014/main" id="{2968CA16-8428-0899-DDB3-D1B5DF80247C}"/>
+              </a:ext>
+            </a:extLst>
+          </p:cNvPr>
+          <p:cNvPicPr>
+            <a:picLocks noChangeAspect="1"/>
+          </p:cNvPicPr>
+          <p:nvPr/>
+        </p:nvPicPr>
+        <p:blipFill>
+          <a:blip r:embed="rId9">
+            <a:extLst>
+              <a:ext uri="{28A0092B-C50C-407E-A947-70E740481C1C}">
+                <a14:useLocalDpi xmlns:a14="http://schemas.microsoft.com/office/drawing/2010/main" val="0"/>
+              </a:ext>
+            </a:extLst>
+          </a:blip>
+          <a:stretch>
+            <a:fillRect/>
+          </a:stretch>
+        </p:blipFill>
+        <p:spPr>
+          <a:xfrm>
+            <a:off x="4720210" y="5100181"/>
+            <a:ext cx="529706" cy="529706"/>
+          </a:xfrm>
+          <a:prstGeom prst="rect">
+            <a:avLst/>
+          </a:prstGeom>
+        </p:spPr>
+      </p:pic>
+      <p:pic>
+        <p:nvPicPr>
+          <p:cNvPr id="17" name="Picture 16" descr="Shape&#10;&#10;Description automatically generated with low confidence">
+            <a:extLst>
+              <a:ext uri="{FF2B5EF4-FFF2-40B4-BE49-F238E27FC236}">
+                <a16:creationId xmlns:a16="http://schemas.microsoft.com/office/drawing/2014/main" id="{DA8CCEE8-4987-E21C-CF08-2848DB6FD755}"/>
+              </a:ext>
+            </a:extLst>
+          </p:cNvPr>
+          <p:cNvPicPr>
+            <a:picLocks noChangeAspect="1"/>
+          </p:cNvPicPr>
+          <p:nvPr/>
+        </p:nvPicPr>
+        <p:blipFill>
+          <a:blip r:embed="rId9">
+            <a:extLst>
+              <a:ext uri="{28A0092B-C50C-407E-A947-70E740481C1C}">
+                <a14:useLocalDpi xmlns:a14="http://schemas.microsoft.com/office/drawing/2010/main" val="0"/>
+              </a:ext>
+            </a:extLst>
+          </a:blip>
+          <a:stretch>
+            <a:fillRect/>
+          </a:stretch>
+        </p:blipFill>
+        <p:spPr>
+          <a:xfrm>
+            <a:off x="9576998" y="5100181"/>
+            <a:ext cx="529706" cy="529706"/>
+          </a:xfrm>
+          <a:prstGeom prst="rect">
+            <a:avLst/>
+          </a:prstGeom>
+        </p:spPr>
+      </p:pic>
+      <p:cxnSp>
+        <p:nvCxnSpPr>
+          <p:cNvPr id="53" name="Straight Arrow Connector 52">
+            <a:extLst>
+              <a:ext uri="{FF2B5EF4-FFF2-40B4-BE49-F238E27FC236}">
+                <a16:creationId xmlns:a16="http://schemas.microsoft.com/office/drawing/2014/main" id="{3242B989-43FA-4ACE-A27E-058D5A7DF25C}"/>
+              </a:ext>
+            </a:extLst>
+          </p:cNvPr>
+          <p:cNvCxnSpPr>
+            <a:cxnSpLocks/>
+            <a:stCxn id="15" idx="3"/>
+          </p:cNvCxnSpPr>
+          <p:nvPr/>
+        </p:nvCxnSpPr>
+        <p:spPr>
+          <a:xfrm rot="16200000" flipH="1">
+            <a:off x="8519124" y="3748879"/>
+            <a:ext cx="2638024" cy="5272"/>
+          </a:xfrm>
+          <a:prstGeom prst="bentConnector3">
+            <a:avLst>
+              <a:gd name="adj1" fmla="val 50000"/>
+            </a:avLst>
+          </a:prstGeom>
+          <a:ln w="9525">
+            <a:tailEnd type="triangle"/>
+          </a:ln>
+        </p:spPr>
+        <p:style>
+          <a:lnRef idx="1">
+            <a:schemeClr val="accent3"/>
+          </a:lnRef>
+          <a:fillRef idx="0">
+            <a:schemeClr val="accent3"/>
+          </a:fillRef>
+          <a:effectRef idx="0">
+            <a:schemeClr val="accent3"/>
+          </a:effectRef>
+          <a:fontRef idx="minor">
+            <a:schemeClr val="tx1"/>
+          </a:fontRef>
+        </p:style>
+      </p:cxnSp>
+      <p:sp>
+        <p:nvSpPr>
+          <p:cNvPr id="31" name="TextBox 30">
+            <a:extLst>
+              <a:ext uri="{FF2B5EF4-FFF2-40B4-BE49-F238E27FC236}">
+                <a16:creationId xmlns:a16="http://schemas.microsoft.com/office/drawing/2014/main" id="{5DDEA6D1-89BC-34CA-4B7D-2BEAABEF1F63}"/>
+              </a:ext>
+            </a:extLst>
+          </p:cNvPr>
+          <p:cNvSpPr txBox="1"/>
+          <p:nvPr/>
+        </p:nvSpPr>
+        <p:spPr>
+          <a:xfrm>
+            <a:off x="4974819" y="3638679"/>
+            <a:ext cx="930938" cy="430887"/>
+          </a:xfrm>
+          <a:prstGeom prst="rect">
+            <a:avLst/>
+          </a:prstGeom>
+          <a:noFill/>
+        </p:spPr>
+        <p:txBody>
+          <a:bodyPr wrap="square" rtlCol="0">
+            <a:spAutoFit/>
+          </a:bodyPr>
+          <a:lstStyle/>
+          <a:p>
+            <a:r>
+              <a:rPr lang="en-US" sz="1100" dirty="0">
+                <a:solidFill>
+                  <a:schemeClr val="accent1">
+                    <a:lumMod val="75000"/>
+                  </a:schemeClr>
+                </a:solidFill>
+              </a:rPr>
+              <a:t>Federated Credentials</a:t>
+            </a:r>
+          </a:p>
+        </p:txBody>
+      </p:sp>
+      <p:sp>
+        <p:nvSpPr>
+          <p:cNvPr id="32" name="TextBox 31">
+            <a:extLst>
+              <a:ext uri="{FF2B5EF4-FFF2-40B4-BE49-F238E27FC236}">
+                <a16:creationId xmlns:a16="http://schemas.microsoft.com/office/drawing/2014/main" id="{4F150F1C-1CAB-DD70-68C5-948E54077279}"/>
+              </a:ext>
+            </a:extLst>
+          </p:cNvPr>
+          <p:cNvSpPr txBox="1"/>
+          <p:nvPr/>
+        </p:nvSpPr>
+        <p:spPr>
+          <a:xfrm>
+            <a:off x="9865671" y="3638679"/>
+            <a:ext cx="884875" cy="430887"/>
+          </a:xfrm>
+          <a:prstGeom prst="rect">
+            <a:avLst/>
+          </a:prstGeom>
+          <a:noFill/>
+        </p:spPr>
+        <p:txBody>
+          <a:bodyPr wrap="square" rtlCol="0">
+            <a:spAutoFit/>
+          </a:bodyPr>
+          <a:lstStyle/>
+          <a:p>
+            <a:r>
+              <a:rPr lang="en-US" sz="1100" dirty="0">
+                <a:solidFill>
+                  <a:schemeClr val="accent1">
+                    <a:lumMod val="75000"/>
+                  </a:schemeClr>
+                </a:solidFill>
+              </a:rPr>
+              <a:t>Federated Credentials</a:t>
+            </a:r>
+          </a:p>
+        </p:txBody>
+      </p:sp>
+    </p:spTree>
+    <p:extLst>
+      <p:ext uri="{BB962C8B-B14F-4D97-AF65-F5344CB8AC3E}">
+        <p14:creationId xmlns:p14="http://schemas.microsoft.com/office/powerpoint/2010/main" val="2245483744"/>
       </p:ext>
     </p:extLst>
   </p:cSld>

</xml_diff>

<commit_message>
Add scenario for workload identity. (#45)
</commit_message>
<xml_diff>
--- a/images/schematics.pptx
+++ b/images/schematics.pptx
@@ -7,6 +7,7 @@
   <p:sldIdLst>
     <p:sldId id="259" r:id="rId2"/>
     <p:sldId id="258" r:id="rId3"/>
+    <p:sldId id="260" r:id="rId4"/>
   </p:sldIdLst>
   <p:sldSz cx="12192000" cy="6858000"/>
   <p:notesSz cx="6858000" cy="9144000"/>
@@ -262,7 +263,7 @@
           <a:p>
             <a:fld id="{371346F4-35EC-4130-B4CC-0DFD34D5B213}" type="datetimeFigureOut">
               <a:rPr lang="LID4096" smtClean="0"/>
-              <a:t>08/23/2021</a:t>
+              <a:t>05/10/2022</a:t>
             </a:fld>
             <a:endParaRPr lang="LID4096"/>
           </a:p>
@@ -462,7 +463,7 @@
           <a:p>
             <a:fld id="{371346F4-35EC-4130-B4CC-0DFD34D5B213}" type="datetimeFigureOut">
               <a:rPr lang="LID4096" smtClean="0"/>
-              <a:t>08/23/2021</a:t>
+              <a:t>05/10/2022</a:t>
             </a:fld>
             <a:endParaRPr lang="LID4096"/>
           </a:p>
@@ -672,7 +673,7 @@
           <a:p>
             <a:fld id="{371346F4-35EC-4130-B4CC-0DFD34D5B213}" type="datetimeFigureOut">
               <a:rPr lang="LID4096" smtClean="0"/>
-              <a:t>08/23/2021</a:t>
+              <a:t>05/10/2022</a:t>
             </a:fld>
             <a:endParaRPr lang="LID4096"/>
           </a:p>
@@ -872,7 +873,7 @@
           <a:p>
             <a:fld id="{371346F4-35EC-4130-B4CC-0DFD34D5B213}" type="datetimeFigureOut">
               <a:rPr lang="LID4096" smtClean="0"/>
-              <a:t>08/23/2021</a:t>
+              <a:t>05/10/2022</a:t>
             </a:fld>
             <a:endParaRPr lang="LID4096"/>
           </a:p>
@@ -1148,7 +1149,7 @@
           <a:p>
             <a:fld id="{371346F4-35EC-4130-B4CC-0DFD34D5B213}" type="datetimeFigureOut">
               <a:rPr lang="LID4096" smtClean="0"/>
-              <a:t>08/23/2021</a:t>
+              <a:t>05/10/2022</a:t>
             </a:fld>
             <a:endParaRPr lang="LID4096"/>
           </a:p>
@@ -1416,7 +1417,7 @@
           <a:p>
             <a:fld id="{371346F4-35EC-4130-B4CC-0DFD34D5B213}" type="datetimeFigureOut">
               <a:rPr lang="LID4096" smtClean="0"/>
-              <a:t>08/23/2021</a:t>
+              <a:t>05/10/2022</a:t>
             </a:fld>
             <a:endParaRPr lang="LID4096"/>
           </a:p>
@@ -1831,7 +1832,7 @@
           <a:p>
             <a:fld id="{371346F4-35EC-4130-B4CC-0DFD34D5B213}" type="datetimeFigureOut">
               <a:rPr lang="LID4096" smtClean="0"/>
-              <a:t>08/23/2021</a:t>
+              <a:t>05/10/2022</a:t>
             </a:fld>
             <a:endParaRPr lang="LID4096"/>
           </a:p>
@@ -1973,7 +1974,7 @@
           <a:p>
             <a:fld id="{371346F4-35EC-4130-B4CC-0DFD34D5B213}" type="datetimeFigureOut">
               <a:rPr lang="LID4096" smtClean="0"/>
-              <a:t>08/23/2021</a:t>
+              <a:t>05/10/2022</a:t>
             </a:fld>
             <a:endParaRPr lang="LID4096"/>
           </a:p>
@@ -2086,7 +2087,7 @@
           <a:p>
             <a:fld id="{371346F4-35EC-4130-B4CC-0DFD34D5B213}" type="datetimeFigureOut">
               <a:rPr lang="LID4096" smtClean="0"/>
-              <a:t>08/23/2021</a:t>
+              <a:t>05/10/2022</a:t>
             </a:fld>
             <a:endParaRPr lang="LID4096"/>
           </a:p>
@@ -2399,7 +2400,7 @@
           <a:p>
             <a:fld id="{371346F4-35EC-4130-B4CC-0DFD34D5B213}" type="datetimeFigureOut">
               <a:rPr lang="LID4096" smtClean="0"/>
-              <a:t>08/23/2021</a:t>
+              <a:t>05/10/2022</a:t>
             </a:fld>
             <a:endParaRPr lang="LID4096"/>
           </a:p>
@@ -2688,7 +2689,7 @@
           <a:p>
             <a:fld id="{371346F4-35EC-4130-B4CC-0DFD34D5B213}" type="datetimeFigureOut">
               <a:rPr lang="LID4096" smtClean="0"/>
-              <a:t>08/23/2021</a:t>
+              <a:t>05/10/2022</a:t>
             </a:fld>
             <a:endParaRPr lang="LID4096"/>
           </a:p>
@@ -2931,7 +2932,7 @@
           <a:p>
             <a:fld id="{371346F4-35EC-4130-B4CC-0DFD34D5B213}" type="datetimeFigureOut">
               <a:rPr lang="LID4096" smtClean="0"/>
-              <a:t>08/23/2021</a:t>
+              <a:t>05/10/2022</a:t>
             </a:fld>
             <a:endParaRPr lang="LID4096"/>
           </a:p>
@@ -5355,7 +5356,7 @@
             <a:p>
               <a:pPr algn="ctr"/>
               <a:r>
-                <a:rPr lang="en-US" sz="1100" b="1" i="1" dirty="0" err="1">
+                <a:rPr lang="en-US" sz="1100" b="1" i="1" dirty="0">
                   <a:solidFill>
                     <a:srgbClr val="080808"/>
                   </a:solidFill>
@@ -6056,7 +6057,7 @@
             <a:p>
               <a:pPr algn="ctr"/>
               <a:r>
-                <a:rPr lang="en-US" sz="1200" dirty="0" err="1">
+                <a:rPr lang="en-US" sz="1200" dirty="0">
                   <a:solidFill>
                     <a:schemeClr val="accent2"/>
                   </a:solidFill>
@@ -6843,6 +6844,1933 @@
     <p:extLst>
       <p:ext uri="{BB962C8B-B14F-4D97-AF65-F5344CB8AC3E}">
         <p14:creationId xmlns:p14="http://schemas.microsoft.com/office/powerpoint/2010/main" val="1646763499"/>
+      </p:ext>
+    </p:extLst>
+  </p:cSld>
+  <p:clrMapOvr>
+    <a:masterClrMapping/>
+  </p:clrMapOvr>
+</p:sld>
+</file>
+
+<file path=ppt/slides/slide3.xml><?xml version="1.0" encoding="utf-8"?>
+<p:sld xmlns:a="http://schemas.openxmlformats.org/drawingml/2006/main" xmlns:r="http://schemas.openxmlformats.org/officeDocument/2006/relationships" xmlns:p="http://schemas.openxmlformats.org/presentationml/2006/main">
+  <p:cSld>
+    <p:spTree>
+      <p:nvGrpSpPr>
+        <p:cNvPr id="1" name=""/>
+        <p:cNvGrpSpPr/>
+        <p:nvPr/>
+      </p:nvGrpSpPr>
+      <p:grpSpPr>
+        <a:xfrm>
+          <a:off x="0" y="0"/>
+          <a:ext cx="0" cy="0"/>
+          <a:chOff x="0" y="0"/>
+          <a:chExt cx="0" cy="0"/>
+        </a:xfrm>
+      </p:grpSpPr>
+      <p:grpSp>
+        <p:nvGrpSpPr>
+          <p:cNvPr id="29" name="Group 28">
+            <a:extLst>
+              <a:ext uri="{FF2B5EF4-FFF2-40B4-BE49-F238E27FC236}">
+                <a16:creationId xmlns:a16="http://schemas.microsoft.com/office/drawing/2014/main" id="{1901A072-DD7F-4820-9A00-10C3D4663F9E}"/>
+              </a:ext>
+            </a:extLst>
+          </p:cNvPr>
+          <p:cNvGrpSpPr/>
+          <p:nvPr/>
+        </p:nvGrpSpPr>
+        <p:grpSpPr>
+          <a:xfrm>
+            <a:off x="1184091" y="4700785"/>
+            <a:ext cx="10058529" cy="1839352"/>
+            <a:chOff x="1184091" y="4700785"/>
+            <a:chExt cx="10058529" cy="1518249"/>
+          </a:xfrm>
+        </p:grpSpPr>
+        <p:sp>
+          <p:nvSpPr>
+            <p:cNvPr id="16" name="Rectangle 15">
+              <a:extLst>
+                <a:ext uri="{FF2B5EF4-FFF2-40B4-BE49-F238E27FC236}">
+                  <a16:creationId xmlns:a16="http://schemas.microsoft.com/office/drawing/2014/main" id="{BD001E1A-F99A-4DB4-93C3-4C50E9CA65F7}"/>
+                </a:ext>
+              </a:extLst>
+            </p:cNvPr>
+            <p:cNvSpPr/>
+            <p:nvPr/>
+          </p:nvSpPr>
+          <p:spPr>
+            <a:xfrm>
+              <a:off x="1184091" y="4700785"/>
+              <a:ext cx="10058529" cy="1518249"/>
+            </a:xfrm>
+            <a:prstGeom prst="rect">
+              <a:avLst/>
+            </a:prstGeom>
+            <a:ln>
+              <a:solidFill>
+                <a:srgbClr val="0070C0"/>
+              </a:solidFill>
+            </a:ln>
+          </p:spPr>
+          <p:style>
+            <a:lnRef idx="2">
+              <a:schemeClr val="accent3"/>
+            </a:lnRef>
+            <a:fillRef idx="1">
+              <a:schemeClr val="lt1"/>
+            </a:fillRef>
+            <a:effectRef idx="0">
+              <a:schemeClr val="accent3"/>
+            </a:effectRef>
+            <a:fontRef idx="minor">
+              <a:schemeClr val="dk1"/>
+            </a:fontRef>
+          </p:style>
+          <p:txBody>
+            <a:bodyPr rtlCol="0" anchor="ctr"/>
+            <a:lstStyle/>
+            <a:p>
+              <a:pPr algn="ctr"/>
+              <a:endParaRPr lang="en-BE" dirty="0" err="1">
+                <a:solidFill>
+                  <a:schemeClr val="bg1"/>
+                </a:solidFill>
+                <a:latin typeface="Tahoma"/>
+                <a:cs typeface="Tahoma"/>
+              </a:endParaRPr>
+            </a:p>
+          </p:txBody>
+        </p:sp>
+        <p:pic>
+          <p:nvPicPr>
+            <p:cNvPr id="1026" name="Picture 2">
+              <a:extLst>
+                <a:ext uri="{FF2B5EF4-FFF2-40B4-BE49-F238E27FC236}">
+                  <a16:creationId xmlns:a16="http://schemas.microsoft.com/office/drawing/2014/main" id="{E89967E0-4B5C-4B1F-AED7-E8B67E483AAF}"/>
+                </a:ext>
+              </a:extLst>
+            </p:cNvPr>
+            <p:cNvPicPr>
+              <a:picLocks noChangeAspect="1" noChangeArrowheads="1"/>
+            </p:cNvPicPr>
+            <p:nvPr/>
+          </p:nvPicPr>
+          <p:blipFill>
+            <a:blip r:embed="rId2">
+              <a:extLst>
+                <a:ext uri="{28A0092B-C50C-407E-A947-70E740481C1C}">
+                  <a14:useLocalDpi xmlns:a14="http://schemas.microsoft.com/office/drawing/2010/main" val="0"/>
+                </a:ext>
+              </a:extLst>
+            </a:blip>
+            <a:srcRect/>
+            <a:stretch>
+              <a:fillRect/>
+            </a:stretch>
+          </p:blipFill>
+          <p:spPr bwMode="auto">
+            <a:xfrm>
+              <a:off x="1335723" y="5638210"/>
+              <a:ext cx="1572540" cy="454562"/>
+            </a:xfrm>
+            <a:prstGeom prst="rect">
+              <a:avLst/>
+            </a:prstGeom>
+            <a:noFill/>
+            <a:extLst>
+              <a:ext uri="{909E8E84-426E-40DD-AFC4-6F175D3DCCD1}">
+                <a14:hiddenFill xmlns:a14="http://schemas.microsoft.com/office/drawing/2010/main">
+                  <a:solidFill>
+                    <a:srgbClr val="FFFFFF"/>
+                  </a:solidFill>
+                </a14:hiddenFill>
+              </a:ext>
+            </a:extLst>
+          </p:spPr>
+        </p:pic>
+      </p:grpSp>
+      <p:sp>
+        <p:nvSpPr>
+          <p:cNvPr id="4" name="Title 3">
+            <a:extLst>
+              <a:ext uri="{FF2B5EF4-FFF2-40B4-BE49-F238E27FC236}">
+                <a16:creationId xmlns:a16="http://schemas.microsoft.com/office/drawing/2014/main" id="{D21861B8-CFD0-4148-8599-E9B7897651DA}"/>
+              </a:ext>
+            </a:extLst>
+          </p:cNvPr>
+          <p:cNvSpPr>
+            <a:spLocks noGrp="1"/>
+          </p:cNvSpPr>
+          <p:nvPr>
+            <p:ph type="title"/>
+          </p:nvPr>
+        </p:nvSpPr>
+        <p:spPr>
+          <a:xfrm>
+            <a:off x="838200" y="203201"/>
+            <a:ext cx="10515600" cy="190391"/>
+          </a:xfrm>
+        </p:spPr>
+        <p:txBody>
+          <a:bodyPr>
+            <a:noAutofit/>
+          </a:bodyPr>
+          <a:lstStyle/>
+          <a:p>
+            <a:r>
+              <a:rPr lang="en-US" sz="2400" dirty="0"/>
+              <a:t>Authentication – Workload Identity</a:t>
+            </a:r>
+            <a:endParaRPr lang="LID4096" sz="2400" dirty="0"/>
+          </a:p>
+        </p:txBody>
+      </p:sp>
+      <p:grpSp>
+        <p:nvGrpSpPr>
+          <p:cNvPr id="30" name="Group 29">
+            <a:extLst>
+              <a:ext uri="{FF2B5EF4-FFF2-40B4-BE49-F238E27FC236}">
+                <a16:creationId xmlns:a16="http://schemas.microsoft.com/office/drawing/2014/main" id="{6B08E9A4-22BC-426F-844C-875CBB9318FB}"/>
+              </a:ext>
+            </a:extLst>
+          </p:cNvPr>
+          <p:cNvGrpSpPr/>
+          <p:nvPr/>
+        </p:nvGrpSpPr>
+        <p:grpSpPr>
+          <a:xfrm>
+            <a:off x="1184092" y="921729"/>
+            <a:ext cx="10058529" cy="3494386"/>
+            <a:chOff x="1184092" y="921729"/>
+            <a:chExt cx="10058529" cy="3494386"/>
+          </a:xfrm>
+        </p:grpSpPr>
+        <p:sp>
+          <p:nvSpPr>
+            <p:cNvPr id="5" name="Rectangle 4">
+              <a:extLst>
+                <a:ext uri="{FF2B5EF4-FFF2-40B4-BE49-F238E27FC236}">
+                  <a16:creationId xmlns:a16="http://schemas.microsoft.com/office/drawing/2014/main" id="{9CDC7901-ED8A-49E0-ADCD-096C981F6322}"/>
+                </a:ext>
+              </a:extLst>
+            </p:cNvPr>
+            <p:cNvSpPr/>
+            <p:nvPr/>
+          </p:nvSpPr>
+          <p:spPr>
+            <a:xfrm>
+              <a:off x="1184092" y="921729"/>
+              <a:ext cx="10058529" cy="3494386"/>
+            </a:xfrm>
+            <a:prstGeom prst="rect">
+              <a:avLst/>
+            </a:prstGeom>
+            <a:ln>
+              <a:solidFill>
+                <a:srgbClr val="0070C0"/>
+              </a:solidFill>
+            </a:ln>
+          </p:spPr>
+          <p:style>
+            <a:lnRef idx="2">
+              <a:schemeClr val="accent3"/>
+            </a:lnRef>
+            <a:fillRef idx="1">
+              <a:schemeClr val="lt1"/>
+            </a:fillRef>
+            <a:effectRef idx="0">
+              <a:schemeClr val="accent3"/>
+            </a:effectRef>
+            <a:fontRef idx="minor">
+              <a:schemeClr val="dk1"/>
+            </a:fontRef>
+          </p:style>
+          <p:txBody>
+            <a:bodyPr rtlCol="0" anchor="ctr"/>
+            <a:lstStyle/>
+            <a:p>
+              <a:pPr algn="ctr"/>
+              <a:endParaRPr lang="en-BE" dirty="0" err="1">
+                <a:solidFill>
+                  <a:schemeClr val="bg1"/>
+                </a:solidFill>
+                <a:latin typeface="Tahoma"/>
+                <a:cs typeface="Tahoma"/>
+              </a:endParaRPr>
+            </a:p>
+          </p:txBody>
+        </p:sp>
+        <p:pic>
+          <p:nvPicPr>
+            <p:cNvPr id="6" name="Picture 2" descr="Image result for kubernetes logo">
+              <a:extLst>
+                <a:ext uri="{FF2B5EF4-FFF2-40B4-BE49-F238E27FC236}">
+                  <a16:creationId xmlns:a16="http://schemas.microsoft.com/office/drawing/2014/main" id="{B65CE384-AD87-404A-BAB5-BD5FE2699559}"/>
+                </a:ext>
+              </a:extLst>
+            </p:cNvPr>
+            <p:cNvPicPr>
+              <a:picLocks noChangeAspect="1" noChangeArrowheads="1"/>
+            </p:cNvPicPr>
+            <p:nvPr/>
+          </p:nvPicPr>
+          <p:blipFill>
+            <a:blip r:embed="rId3" cstate="print">
+              <a:extLst>
+                <a:ext uri="{28A0092B-C50C-407E-A947-70E740481C1C}">
+                  <a14:useLocalDpi xmlns:a14="http://schemas.microsoft.com/office/drawing/2010/main" val="0"/>
+                </a:ext>
+              </a:extLst>
+            </a:blip>
+            <a:srcRect/>
+            <a:stretch>
+              <a:fillRect/>
+            </a:stretch>
+          </p:blipFill>
+          <p:spPr bwMode="auto">
+            <a:xfrm>
+              <a:off x="1335723" y="1090255"/>
+              <a:ext cx="2581836" cy="557718"/>
+            </a:xfrm>
+            <a:prstGeom prst="rect">
+              <a:avLst/>
+            </a:prstGeom>
+            <a:noFill/>
+            <a:extLst>
+              <a:ext uri="{909E8E84-426E-40DD-AFC4-6F175D3DCCD1}">
+                <a14:hiddenFill xmlns:a14="http://schemas.microsoft.com/office/drawing/2010/main">
+                  <a:solidFill>
+                    <a:srgbClr val="FFFFFF"/>
+                  </a:solidFill>
+                </a14:hiddenFill>
+              </a:ext>
+            </a:extLst>
+          </p:spPr>
+        </p:pic>
+      </p:grpSp>
+      <p:grpSp>
+        <p:nvGrpSpPr>
+          <p:cNvPr id="10" name="Group 9">
+            <a:extLst>
+              <a:ext uri="{FF2B5EF4-FFF2-40B4-BE49-F238E27FC236}">
+                <a16:creationId xmlns:a16="http://schemas.microsoft.com/office/drawing/2014/main" id="{EC0AB97F-39CE-4C1C-B637-141C688EC9D9}"/>
+              </a:ext>
+            </a:extLst>
+          </p:cNvPr>
+          <p:cNvGrpSpPr/>
+          <p:nvPr/>
+        </p:nvGrpSpPr>
+        <p:grpSpPr>
+          <a:xfrm>
+            <a:off x="5649103" y="5077625"/>
+            <a:ext cx="1604474" cy="1007114"/>
+            <a:chOff x="-77599" y="2712509"/>
+            <a:chExt cx="1604474" cy="1007114"/>
+          </a:xfrm>
+        </p:grpSpPr>
+        <p:pic>
+          <p:nvPicPr>
+            <p:cNvPr id="8" name="Picture 7">
+              <a:extLst>
+                <a:ext uri="{FF2B5EF4-FFF2-40B4-BE49-F238E27FC236}">
+                  <a16:creationId xmlns:a16="http://schemas.microsoft.com/office/drawing/2014/main" id="{B61A6C7F-FB16-484E-9DD2-CEB0D9FF0FF2}"/>
+                </a:ext>
+              </a:extLst>
+            </p:cNvPr>
+            <p:cNvPicPr>
+              <a:picLocks noChangeAspect="1"/>
+            </p:cNvPicPr>
+            <p:nvPr/>
+          </p:nvPicPr>
+          <p:blipFill>
+            <a:blip r:embed="rId4"/>
+            <a:stretch>
+              <a:fillRect/>
+            </a:stretch>
+          </p:blipFill>
+          <p:spPr>
+            <a:xfrm>
+              <a:off x="464314" y="2712509"/>
+              <a:ext cx="520647" cy="520647"/>
+            </a:xfrm>
+            <a:prstGeom prst="rect">
+              <a:avLst/>
+            </a:prstGeom>
+          </p:spPr>
+        </p:pic>
+        <p:sp>
+          <p:nvSpPr>
+            <p:cNvPr id="9" name="TextBox 8">
+              <a:extLst>
+                <a:ext uri="{FF2B5EF4-FFF2-40B4-BE49-F238E27FC236}">
+                  <a16:creationId xmlns:a16="http://schemas.microsoft.com/office/drawing/2014/main" id="{866C695D-7635-418B-B46A-D88A62CA19B2}"/>
+                </a:ext>
+              </a:extLst>
+            </p:cNvPr>
+            <p:cNvSpPr txBox="1"/>
+            <p:nvPr/>
+          </p:nvSpPr>
+          <p:spPr>
+            <a:xfrm>
+              <a:off x="-77599" y="3257958"/>
+              <a:ext cx="1604474" cy="461665"/>
+            </a:xfrm>
+            <a:prstGeom prst="rect">
+              <a:avLst/>
+            </a:prstGeom>
+            <a:noFill/>
+          </p:spPr>
+          <p:txBody>
+            <a:bodyPr wrap="square" rtlCol="0">
+              <a:spAutoFit/>
+            </a:bodyPr>
+            <a:lstStyle/>
+            <a:p>
+              <a:pPr algn="ctr"/>
+              <a:r>
+                <a:rPr lang="en-US" sz="1200" b="1" dirty="0"/>
+                <a:t>Orders Queue</a:t>
+              </a:r>
+              <a:br>
+                <a:rPr lang="en-US" sz="1200" dirty="0"/>
+              </a:br>
+              <a:r>
+                <a:rPr lang="en-US" sz="1200" i="1" dirty="0"/>
+                <a:t>Azure Service Bus</a:t>
+              </a:r>
+              <a:endParaRPr lang="LID4096" sz="1200" i="1" dirty="0"/>
+            </a:p>
+          </p:txBody>
+        </p:sp>
+      </p:grpSp>
+      <p:sp>
+        <p:nvSpPr>
+          <p:cNvPr id="36" name="Rectangle 35">
+            <a:extLst>
+              <a:ext uri="{FF2B5EF4-FFF2-40B4-BE49-F238E27FC236}">
+                <a16:creationId xmlns:a16="http://schemas.microsoft.com/office/drawing/2014/main" id="{B70CCA84-4458-4AFF-B188-7C6844F0A09F}"/>
+              </a:ext>
+            </a:extLst>
+          </p:cNvPr>
+          <p:cNvSpPr/>
+          <p:nvPr/>
+        </p:nvSpPr>
+        <p:spPr>
+          <a:xfrm>
+            <a:off x="1360517" y="3446842"/>
+            <a:ext cx="9559675" cy="772942"/>
+          </a:xfrm>
+          <a:prstGeom prst="rect">
+            <a:avLst/>
+          </a:prstGeom>
+          <a:solidFill>
+            <a:schemeClr val="bg1">
+              <a:lumMod val="95000"/>
+            </a:schemeClr>
+          </a:solidFill>
+          <a:ln w="19050">
+            <a:solidFill>
+              <a:srgbClr val="0070C0"/>
+            </a:solidFill>
+          </a:ln>
+        </p:spPr>
+        <p:style>
+          <a:lnRef idx="2">
+            <a:schemeClr val="accent3"/>
+          </a:lnRef>
+          <a:fillRef idx="1">
+            <a:schemeClr val="lt1"/>
+          </a:fillRef>
+          <a:effectRef idx="0">
+            <a:schemeClr val="accent3"/>
+          </a:effectRef>
+          <a:fontRef idx="minor">
+            <a:schemeClr val="dk1"/>
+          </a:fontRef>
+        </p:style>
+        <p:txBody>
+          <a:bodyPr rtlCol="0" anchor="ctr"/>
+          <a:lstStyle/>
+          <a:p>
+            <a:pPr algn="ctr"/>
+            <a:endParaRPr lang="en-BE" sz="1600" dirty="0" err="1">
+              <a:solidFill>
+                <a:schemeClr val="tx2"/>
+              </a:solidFill>
+              <a:cs typeface="Tahoma"/>
+            </a:endParaRPr>
+          </a:p>
+        </p:txBody>
+      </p:sp>
+      <p:sp>
+        <p:nvSpPr>
+          <p:cNvPr id="37" name="TextBox 36">
+            <a:extLst>
+              <a:ext uri="{FF2B5EF4-FFF2-40B4-BE49-F238E27FC236}">
+                <a16:creationId xmlns:a16="http://schemas.microsoft.com/office/drawing/2014/main" id="{32F508D5-4877-4C35-B443-6509F28E19AC}"/>
+              </a:ext>
+            </a:extLst>
+          </p:cNvPr>
+          <p:cNvSpPr txBox="1"/>
+          <p:nvPr/>
+        </p:nvSpPr>
+        <p:spPr>
+          <a:xfrm>
+            <a:off x="2016485" y="3519424"/>
+            <a:ext cx="2021822" cy="618593"/>
+          </a:xfrm>
+          <a:prstGeom prst="rect">
+            <a:avLst/>
+          </a:prstGeom>
+          <a:noFill/>
+          <a:ln w="12700">
+            <a:noFill/>
+          </a:ln>
+        </p:spPr>
+        <p:style>
+          <a:lnRef idx="2">
+            <a:schemeClr val="accent3"/>
+          </a:lnRef>
+          <a:fillRef idx="1">
+            <a:schemeClr val="lt1"/>
+          </a:fillRef>
+          <a:effectRef idx="0">
+            <a:schemeClr val="accent3"/>
+          </a:effectRef>
+          <a:fontRef idx="minor">
+            <a:schemeClr val="dk1"/>
+          </a:fontRef>
+        </p:style>
+        <p:txBody>
+          <a:bodyPr rot="0" spcFirstLastPara="0" vertOverflow="overflow" horzOverflow="overflow" vert="horz" wrap="square" lIns="91440" tIns="45720" rIns="91440" bIns="45720" numCol="1" spcCol="0" rtlCol="0" fromWordArt="0" anchor="ctr" anchorCtr="0" forceAA="0" compatLnSpc="1">
+            <a:prstTxWarp prst="textNoShape">
+              <a:avLst/>
+            </a:prstTxWarp>
+            <a:noAutofit/>
+          </a:bodyPr>
+          <a:lstStyle>
+            <a:defPPr>
+              <a:defRPr lang="en-BE"/>
+            </a:defPPr>
+            <a:lvl1pPr algn="ctr">
+              <a:defRPr sz="1400">
+                <a:solidFill>
+                  <a:schemeClr val="tx2"/>
+                </a:solidFill>
+                <a:cs typeface="Tahoma"/>
+              </a:defRPr>
+            </a:lvl1pPr>
+            <a:lvl2pPr>
+              <a:defRPr>
+                <a:solidFill>
+                  <a:schemeClr val="dk1"/>
+                </a:solidFill>
+              </a:defRPr>
+            </a:lvl2pPr>
+            <a:lvl3pPr>
+              <a:defRPr>
+                <a:solidFill>
+                  <a:schemeClr val="dk1"/>
+                </a:solidFill>
+              </a:defRPr>
+            </a:lvl3pPr>
+            <a:lvl4pPr>
+              <a:defRPr>
+                <a:solidFill>
+                  <a:schemeClr val="dk1"/>
+                </a:solidFill>
+              </a:defRPr>
+            </a:lvl4pPr>
+            <a:lvl5pPr>
+              <a:defRPr>
+                <a:solidFill>
+                  <a:schemeClr val="dk1"/>
+                </a:solidFill>
+              </a:defRPr>
+            </a:lvl5pPr>
+            <a:lvl6pPr>
+              <a:defRPr>
+                <a:solidFill>
+                  <a:schemeClr val="dk1"/>
+                </a:solidFill>
+              </a:defRPr>
+            </a:lvl6pPr>
+            <a:lvl7pPr>
+              <a:defRPr>
+                <a:solidFill>
+                  <a:schemeClr val="dk1"/>
+                </a:solidFill>
+              </a:defRPr>
+            </a:lvl7pPr>
+            <a:lvl8pPr>
+              <a:defRPr>
+                <a:solidFill>
+                  <a:schemeClr val="dk1"/>
+                </a:solidFill>
+              </a:defRPr>
+            </a:lvl8pPr>
+            <a:lvl9pPr>
+              <a:defRPr>
+                <a:solidFill>
+                  <a:schemeClr val="dk1"/>
+                </a:solidFill>
+              </a:defRPr>
+            </a:lvl9pPr>
+          </a:lstStyle>
+          <a:p>
+            <a:pPr algn="l"/>
+            <a:r>
+              <a:rPr lang="en-US" sz="1000" b="1" dirty="0">
+                <a:solidFill>
+                  <a:srgbClr val="0070C0"/>
+                </a:solidFill>
+              </a:rPr>
+              <a:t>Azure AD Workload Identity </a:t>
+            </a:r>
+            <a:r>
+              <a:rPr lang="en-US" sz="1000" dirty="0">
+                <a:solidFill>
+                  <a:srgbClr val="0070C0"/>
+                </a:solidFill>
+              </a:rPr>
+              <a:t>allows exchanging service account tokens for Azure AD tokens using federated credentials.</a:t>
+            </a:r>
+            <a:endParaRPr lang="en-BE" sz="1000" dirty="0">
+              <a:solidFill>
+                <a:srgbClr val="0070C0"/>
+              </a:solidFill>
+            </a:endParaRPr>
+          </a:p>
+        </p:txBody>
+      </p:sp>
+      <p:pic>
+        <p:nvPicPr>
+          <p:cNvPr id="2" name="Picture 2" descr="How to manage customer access to Azure, Intune and Office 365? | Marius  Sandbu">
+            <a:extLst>
+              <a:ext uri="{FF2B5EF4-FFF2-40B4-BE49-F238E27FC236}">
+                <a16:creationId xmlns:a16="http://schemas.microsoft.com/office/drawing/2014/main" id="{D31D2E2A-4619-4CE3-A310-C7EC01665EAA}"/>
+              </a:ext>
+            </a:extLst>
+          </p:cNvPr>
+          <p:cNvPicPr>
+            <a:picLocks noChangeAspect="1" noChangeArrowheads="1"/>
+          </p:cNvPicPr>
+          <p:nvPr/>
+        </p:nvPicPr>
+        <p:blipFill rotWithShape="1">
+          <a:blip r:embed="rId5">
+            <a:extLst>
+              <a:ext uri="{28A0092B-C50C-407E-A947-70E740481C1C}">
+                <a14:useLocalDpi xmlns:a14="http://schemas.microsoft.com/office/drawing/2010/main" val="0"/>
+              </a:ext>
+            </a:extLst>
+          </a:blip>
+          <a:srcRect l="6248" r="63507"/>
+          <a:stretch/>
+        </p:blipFill>
+        <p:spPr bwMode="auto">
+          <a:xfrm>
+            <a:off x="1448246" y="3538341"/>
+            <a:ext cx="580896" cy="580758"/>
+          </a:xfrm>
+          <a:prstGeom prst="rect">
+            <a:avLst/>
+          </a:prstGeom>
+          <a:noFill/>
+          <a:extLst>
+            <a:ext uri="{909E8E84-426E-40DD-AFC4-6F175D3DCCD1}">
+              <a14:hiddenFill xmlns:a14="http://schemas.microsoft.com/office/drawing/2010/main">
+                <a:solidFill>
+                  <a:srgbClr val="FFFFFF"/>
+                </a:solidFill>
+              </a14:hiddenFill>
+            </a:ext>
+          </a:extLst>
+        </p:spPr>
+      </p:pic>
+      <p:sp>
+        <p:nvSpPr>
+          <p:cNvPr id="41" name="TextBox 40">
+            <a:extLst>
+              <a:ext uri="{FF2B5EF4-FFF2-40B4-BE49-F238E27FC236}">
+                <a16:creationId xmlns:a16="http://schemas.microsoft.com/office/drawing/2014/main" id="{3BC57BA6-E24E-44FF-A76F-F877FDC42564}"/>
+              </a:ext>
+            </a:extLst>
+          </p:cNvPr>
+          <p:cNvSpPr txBox="1"/>
+          <p:nvPr/>
+        </p:nvSpPr>
+        <p:spPr>
+          <a:xfrm>
+            <a:off x="4251010" y="5581182"/>
+            <a:ext cx="1447619" cy="600164"/>
+          </a:xfrm>
+          <a:prstGeom prst="rect">
+            <a:avLst/>
+          </a:prstGeom>
+          <a:noFill/>
+        </p:spPr>
+        <p:txBody>
+          <a:bodyPr wrap="square">
+            <a:spAutoFit/>
+          </a:bodyPr>
+          <a:lstStyle/>
+          <a:p>
+            <a:pPr algn="ctr"/>
+            <a:r>
+              <a:rPr lang="en-US" sz="1100" b="1" i="1" dirty="0">
+                <a:solidFill>
+                  <a:srgbClr val="080808"/>
+                </a:solidFill>
+                <a:latin typeface="Segoe UI (Body)"/>
+                <a:cs typeface="Tahoma"/>
+              </a:rPr>
+              <a:t>Autoscaler</a:t>
+            </a:r>
+            <a:br>
+              <a:rPr lang="en-US" sz="1100" i="1" dirty="0">
+                <a:solidFill>
+                  <a:srgbClr val="080808"/>
+                </a:solidFill>
+                <a:latin typeface="Segoe UI (Body)"/>
+                <a:cs typeface="Tahoma"/>
+              </a:rPr>
+            </a:br>
+            <a:r>
+              <a:rPr lang="en-US" sz="1100" i="1" dirty="0">
+                <a:solidFill>
+                  <a:srgbClr val="080808"/>
+                </a:solidFill>
+                <a:latin typeface="Segoe UI (Body)"/>
+                <a:cs typeface="Tahoma"/>
+              </a:rPr>
+              <a:t>Azure AD Application</a:t>
+            </a:r>
+          </a:p>
+        </p:txBody>
+      </p:sp>
+      <p:sp>
+        <p:nvSpPr>
+          <p:cNvPr id="44" name="TextBox 43">
+            <a:extLst>
+              <a:ext uri="{FF2B5EF4-FFF2-40B4-BE49-F238E27FC236}">
+                <a16:creationId xmlns:a16="http://schemas.microsoft.com/office/drawing/2014/main" id="{B92808C4-C72D-45ED-A3F4-D9F85BE12BE9}"/>
+              </a:ext>
+            </a:extLst>
+          </p:cNvPr>
+          <p:cNvSpPr txBox="1"/>
+          <p:nvPr/>
+        </p:nvSpPr>
+        <p:spPr>
+          <a:xfrm>
+            <a:off x="9116963" y="5581182"/>
+            <a:ext cx="1447619" cy="600164"/>
+          </a:xfrm>
+          <a:prstGeom prst="rect">
+            <a:avLst/>
+          </a:prstGeom>
+          <a:noFill/>
+        </p:spPr>
+        <p:txBody>
+          <a:bodyPr wrap="square">
+            <a:spAutoFit/>
+          </a:bodyPr>
+          <a:lstStyle/>
+          <a:p>
+            <a:pPr algn="ctr"/>
+            <a:r>
+              <a:rPr lang="en-US" sz="1100" b="1" i="1" dirty="0">
+                <a:solidFill>
+                  <a:srgbClr val="080808"/>
+                </a:solidFill>
+                <a:latin typeface="Segoe UI (Body)"/>
+                <a:cs typeface="Tahoma"/>
+              </a:rPr>
+              <a:t>Order Processor</a:t>
+            </a:r>
+            <a:br>
+              <a:rPr lang="en-US" sz="1100" i="1" dirty="0">
+                <a:solidFill>
+                  <a:srgbClr val="080808"/>
+                </a:solidFill>
+                <a:latin typeface="Segoe UI (Body)"/>
+                <a:cs typeface="Tahoma"/>
+              </a:rPr>
+            </a:br>
+            <a:r>
+              <a:rPr lang="en-US" sz="1100" i="1" dirty="0">
+                <a:solidFill>
+                  <a:srgbClr val="080808"/>
+                </a:solidFill>
+                <a:latin typeface="Segoe UI (Body)"/>
+                <a:cs typeface="Tahoma"/>
+              </a:rPr>
+              <a:t>Azure AD Application</a:t>
+            </a:r>
+          </a:p>
+        </p:txBody>
+      </p:sp>
+      <p:grpSp>
+        <p:nvGrpSpPr>
+          <p:cNvPr id="1062" name="Group 1061">
+            <a:extLst>
+              <a:ext uri="{FF2B5EF4-FFF2-40B4-BE49-F238E27FC236}">
+                <a16:creationId xmlns:a16="http://schemas.microsoft.com/office/drawing/2014/main" id="{F8581A8A-3EE4-496E-8D24-397792AFFFC0}"/>
+              </a:ext>
+            </a:extLst>
+          </p:cNvPr>
+          <p:cNvGrpSpPr/>
+          <p:nvPr/>
+        </p:nvGrpSpPr>
+        <p:grpSpPr>
+          <a:xfrm>
+            <a:off x="6781413" y="1407782"/>
+            <a:ext cx="4139288" cy="1884618"/>
+            <a:chOff x="6461656" y="1159446"/>
+            <a:chExt cx="4139288" cy="1884618"/>
+          </a:xfrm>
+        </p:grpSpPr>
+        <p:sp>
+          <p:nvSpPr>
+            <p:cNvPr id="26" name="Rectangle 25">
+              <a:extLst>
+                <a:ext uri="{FF2B5EF4-FFF2-40B4-BE49-F238E27FC236}">
+                  <a16:creationId xmlns:a16="http://schemas.microsoft.com/office/drawing/2014/main" id="{CEBDA6AC-795A-43CC-AABB-977CBF1ABA7F}"/>
+                </a:ext>
+              </a:extLst>
+            </p:cNvPr>
+            <p:cNvSpPr/>
+            <p:nvPr/>
+          </p:nvSpPr>
+          <p:spPr>
+            <a:xfrm>
+              <a:off x="6461656" y="1515280"/>
+              <a:ext cx="4139288" cy="1528784"/>
+            </a:xfrm>
+            <a:prstGeom prst="rect">
+              <a:avLst/>
+            </a:prstGeom>
+            <a:solidFill>
+              <a:schemeClr val="accent2">
+                <a:lumMod val="20000"/>
+                <a:lumOff val="80000"/>
+              </a:schemeClr>
+            </a:solidFill>
+            <a:ln w="19050">
+              <a:solidFill>
+                <a:schemeClr val="accent2"/>
+              </a:solidFill>
+            </a:ln>
+          </p:spPr>
+          <p:style>
+            <a:lnRef idx="2">
+              <a:schemeClr val="dk1"/>
+            </a:lnRef>
+            <a:fillRef idx="1">
+              <a:schemeClr val="lt1"/>
+            </a:fillRef>
+            <a:effectRef idx="0">
+              <a:schemeClr val="dk1"/>
+            </a:effectRef>
+            <a:fontRef idx="minor">
+              <a:schemeClr val="dk1"/>
+            </a:fontRef>
+          </p:style>
+          <p:txBody>
+            <a:bodyPr rtlCol="0" anchor="ctr"/>
+            <a:lstStyle/>
+            <a:p>
+              <a:pPr algn="ctr"/>
+              <a:endParaRPr lang="en-BE" dirty="0" err="1">
+                <a:solidFill>
+                  <a:schemeClr val="bg1"/>
+                </a:solidFill>
+                <a:latin typeface="Tahoma"/>
+                <a:cs typeface="Tahoma"/>
+              </a:endParaRPr>
+            </a:p>
+          </p:txBody>
+        </p:sp>
+        <p:sp>
+          <p:nvSpPr>
+            <p:cNvPr id="27" name="TextBox 26">
+              <a:extLst>
+                <a:ext uri="{FF2B5EF4-FFF2-40B4-BE49-F238E27FC236}">
+                  <a16:creationId xmlns:a16="http://schemas.microsoft.com/office/drawing/2014/main" id="{89C66294-CC4B-4091-BF89-605A3D26C1E5}"/>
+                </a:ext>
+              </a:extLst>
+            </p:cNvPr>
+            <p:cNvSpPr txBox="1"/>
+            <p:nvPr/>
+          </p:nvSpPr>
+          <p:spPr>
+            <a:xfrm>
+              <a:off x="6461656" y="1159446"/>
+              <a:ext cx="4139288" cy="276999"/>
+            </a:xfrm>
+            <a:prstGeom prst="rect">
+              <a:avLst/>
+            </a:prstGeom>
+            <a:noFill/>
+          </p:spPr>
+          <p:txBody>
+            <a:bodyPr wrap="square" rtlCol="0">
+              <a:spAutoFit/>
+            </a:bodyPr>
+            <a:lstStyle/>
+            <a:p>
+              <a:pPr algn="ctr"/>
+              <a:r>
+                <a:rPr lang="en-US" sz="1200" b="1" dirty="0">
+                  <a:solidFill>
+                    <a:schemeClr val="accent2"/>
+                  </a:solidFill>
+                </a:rPr>
+                <a:t>App</a:t>
+              </a:r>
+              <a:endParaRPr lang="LID4096" sz="1200" b="1" dirty="0">
+                <a:solidFill>
+                  <a:schemeClr val="accent2"/>
+                </a:solidFill>
+              </a:endParaRPr>
+            </a:p>
+          </p:txBody>
+        </p:sp>
+        <p:grpSp>
+          <p:nvGrpSpPr>
+            <p:cNvPr id="22" name="Group 21">
+              <a:extLst>
+                <a:ext uri="{FF2B5EF4-FFF2-40B4-BE49-F238E27FC236}">
+                  <a16:creationId xmlns:a16="http://schemas.microsoft.com/office/drawing/2014/main" id="{30ACD4CD-8458-4027-941C-155317B14ADB}"/>
+                </a:ext>
+              </a:extLst>
+            </p:cNvPr>
+            <p:cNvGrpSpPr/>
+            <p:nvPr/>
+          </p:nvGrpSpPr>
+          <p:grpSpPr>
+            <a:xfrm>
+              <a:off x="6614498" y="1680818"/>
+              <a:ext cx="1799991" cy="504169"/>
+              <a:chOff x="6362933" y="1680818"/>
+              <a:chExt cx="1799991" cy="504169"/>
+            </a:xfrm>
+          </p:grpSpPr>
+          <p:sp>
+            <p:nvSpPr>
+              <p:cNvPr id="28" name="Rectangle 27">
+                <a:extLst>
+                  <a:ext uri="{FF2B5EF4-FFF2-40B4-BE49-F238E27FC236}">
+                    <a16:creationId xmlns:a16="http://schemas.microsoft.com/office/drawing/2014/main" id="{797B0673-6D0E-4AAC-A651-6718C9FC1F33}"/>
+                  </a:ext>
+                </a:extLst>
+              </p:cNvPr>
+              <p:cNvSpPr/>
+              <p:nvPr/>
+            </p:nvSpPr>
+            <p:spPr>
+              <a:xfrm rot="5400000">
+                <a:off x="7010844" y="1032907"/>
+                <a:ext cx="504169" cy="1799991"/>
+              </a:xfrm>
+              <a:prstGeom prst="rect">
+                <a:avLst/>
+              </a:prstGeom>
+              <a:ln w="19050">
+                <a:solidFill>
+                  <a:schemeClr val="accent2"/>
+                </a:solidFill>
+              </a:ln>
+            </p:spPr>
+            <p:style>
+              <a:lnRef idx="2">
+                <a:schemeClr val="accent2"/>
+              </a:lnRef>
+              <a:fillRef idx="1">
+                <a:schemeClr val="lt1"/>
+              </a:fillRef>
+              <a:effectRef idx="0">
+                <a:schemeClr val="accent2"/>
+              </a:effectRef>
+              <a:fontRef idx="minor">
+                <a:schemeClr val="dk1"/>
+              </a:fontRef>
+            </p:style>
+            <p:txBody>
+              <a:bodyPr vert="vert270" rtlCol="0" anchor="ctr"/>
+              <a:lstStyle/>
+              <a:p>
+                <a:pPr algn="ctr"/>
+                <a:r>
+                  <a:rPr lang="en-US" sz="1200" dirty="0">
+                    <a:solidFill>
+                      <a:schemeClr val="accent2"/>
+                    </a:solidFill>
+                    <a:cs typeface="Tahoma"/>
+                  </a:rPr>
+                  <a:t>Deployment</a:t>
+                </a:r>
+                <a:endParaRPr lang="en-BE" sz="1200" dirty="0" err="1">
+                  <a:solidFill>
+                    <a:schemeClr val="accent2"/>
+                  </a:solidFill>
+                  <a:cs typeface="Tahoma"/>
+                </a:endParaRPr>
+              </a:p>
+            </p:txBody>
+          </p:sp>
+          <p:pic>
+            <p:nvPicPr>
+              <p:cNvPr id="25" name="Picture 8" descr="GitHub - json-api-dotnet/JsonApiDotNetCore: JSON:API Framework for ...">
+                <a:extLst>
+                  <a:ext uri="{FF2B5EF4-FFF2-40B4-BE49-F238E27FC236}">
+                    <a16:creationId xmlns:a16="http://schemas.microsoft.com/office/drawing/2014/main" id="{8AC17890-ED61-4840-9841-305B773E49B4}"/>
+                  </a:ext>
+                </a:extLst>
+              </p:cNvPr>
+              <p:cNvPicPr>
+                <a:picLocks noChangeAspect="1" noChangeArrowheads="1"/>
+              </p:cNvPicPr>
+              <p:nvPr/>
+            </p:nvPicPr>
+            <p:blipFill rotWithShape="1">
+              <a:blip r:embed="rId6" cstate="print">
+                <a:extLst>
+                  <a:ext uri="{BEBA8EAE-BF5A-486C-A8C5-ECC9F3942E4B}">
+                    <a14:imgProps xmlns:a14="http://schemas.microsoft.com/office/drawing/2010/main">
+                      <a14:imgLayer r:embed="rId7">
+                        <a14:imgEffect>
+                          <a14:backgroundRemoval t="30556" b="87963" l="19907" r="76852">
+                            <a14:foregroundMark x1="24537" y1="48148" x2="25000" y2="71296"/>
+                            <a14:foregroundMark x1="25000" y1="71296" x2="43056" y2="86574"/>
+                            <a14:foregroundMark x1="43056" y1="86574" x2="66204" y2="80556"/>
+                            <a14:foregroundMark x1="66204" y1="80556" x2="77315" y2="59259"/>
+                            <a14:foregroundMark x1="77315" y1="59259" x2="67130" y2="37963"/>
+                            <a14:foregroundMark x1="67130" y1="37963" x2="44907" y2="31019"/>
+                            <a14:foregroundMark x1="44907" y1="31019" x2="24074" y2="43519"/>
+                            <a14:foregroundMark x1="24074" y1="43519" x2="22685" y2="50000"/>
+                            <a14:foregroundMark x1="35185" y1="48611" x2="61574" y2="50463"/>
+                            <a14:foregroundMark x1="61574" y1="50463" x2="75000" y2="69444"/>
+                            <a14:foregroundMark x1="75000" y1="69444" x2="56944" y2="84722"/>
+                            <a14:foregroundMark x1="56944" y1="84722" x2="40278" y2="86111"/>
+                            <a14:foregroundMark x1="47222" y1="47685" x2="31944" y2="64352"/>
+                            <a14:foregroundMark x1="33333" y1="48148" x2="33333" y2="48148"/>
+                            <a14:foregroundMark x1="31944" y1="52315" x2="31944" y2="52315"/>
+                            <a14:foregroundMark x1="43519" y1="61111" x2="43519" y2="61111"/>
+                            <a14:foregroundMark x1="50926" y1="55093" x2="50926" y2="55093"/>
+                            <a14:foregroundMark x1="66204" y1="48611" x2="66204" y2="48611"/>
+                            <a14:foregroundMark x1="50000" y1="60648" x2="50000" y2="60648"/>
+                            <a14:foregroundMark x1="49074" y1="30556" x2="49074" y2="30556"/>
+                            <a14:foregroundMark x1="76852" y1="54167" x2="76852" y2="54167"/>
+                            <a14:foregroundMark x1="50926" y1="87963" x2="50926" y2="87963"/>
+                            <a14:foregroundMark x1="19907" y1="59259" x2="19907" y2="59259"/>
+                          </a14:backgroundRemoval>
+                        </a14:imgEffect>
+                      </a14:imgLayer>
+                    </a14:imgProps>
+                  </a:ext>
+                  <a:ext uri="{28A0092B-C50C-407E-A947-70E740481C1C}">
+                    <a14:useLocalDpi xmlns:a14="http://schemas.microsoft.com/office/drawing/2010/main" val="0"/>
+                  </a:ext>
+                </a:extLst>
+              </a:blip>
+              <a:srcRect l="18508" t="28341" r="19779" b="8891"/>
+              <a:stretch/>
+            </p:blipFill>
+            <p:spPr bwMode="auto">
+              <a:xfrm>
+                <a:off x="7837383" y="1821380"/>
+                <a:ext cx="217692" cy="221407"/>
+              </a:xfrm>
+              <a:prstGeom prst="rect">
+                <a:avLst/>
+              </a:prstGeom>
+              <a:noFill/>
+              <a:extLst>
+                <a:ext uri="{909E8E84-426E-40DD-AFC4-6F175D3DCCD1}">
+                  <a14:hiddenFill xmlns:a14="http://schemas.microsoft.com/office/drawing/2010/main">
+                    <a:solidFill>
+                      <a:srgbClr val="FFFFFF"/>
+                    </a:solidFill>
+                  </a14:hiddenFill>
+                </a:ext>
+              </a:extLst>
+            </p:spPr>
+          </p:pic>
+        </p:grpSp>
+        <p:sp>
+          <p:nvSpPr>
+            <p:cNvPr id="15" name="Rectangle 14">
+              <a:extLst>
+                <a:ext uri="{FF2B5EF4-FFF2-40B4-BE49-F238E27FC236}">
+                  <a16:creationId xmlns:a16="http://schemas.microsoft.com/office/drawing/2014/main" id="{88BE7B74-C161-46E3-8558-40A56E711772}"/>
+                </a:ext>
+              </a:extLst>
+            </p:cNvPr>
+            <p:cNvSpPr/>
+            <p:nvPr/>
+          </p:nvSpPr>
+          <p:spPr>
+            <a:xfrm rot="5400000">
+              <a:off x="9263659" y="1032087"/>
+              <a:ext cx="504169" cy="1799991"/>
+            </a:xfrm>
+            <a:prstGeom prst="rect">
+              <a:avLst/>
+            </a:prstGeom>
+            <a:ln w="19050">
+              <a:solidFill>
+                <a:schemeClr val="accent2"/>
+              </a:solidFill>
+            </a:ln>
+          </p:spPr>
+          <p:style>
+            <a:lnRef idx="2">
+              <a:schemeClr val="accent2"/>
+            </a:lnRef>
+            <a:fillRef idx="1">
+              <a:schemeClr val="lt1"/>
+            </a:fillRef>
+            <a:effectRef idx="0">
+              <a:schemeClr val="accent2"/>
+            </a:effectRef>
+            <a:fontRef idx="minor">
+              <a:schemeClr val="dk1"/>
+            </a:fontRef>
+          </p:style>
+          <p:txBody>
+            <a:bodyPr vert="vert270" rtlCol="0" anchor="ctr"/>
+            <a:lstStyle/>
+            <a:p>
+              <a:pPr algn="ctr"/>
+              <a:r>
+                <a:rPr lang="en-US" sz="1200" dirty="0">
+                  <a:solidFill>
+                    <a:schemeClr val="accent2"/>
+                  </a:solidFill>
+                  <a:cs typeface="Tahoma"/>
+                </a:rPr>
+                <a:t>Service Account</a:t>
+              </a:r>
+              <a:endParaRPr lang="en-BE" sz="1200" dirty="0" err="1">
+                <a:solidFill>
+                  <a:schemeClr val="accent2"/>
+                </a:solidFill>
+                <a:cs typeface="Tahoma"/>
+              </a:endParaRPr>
+            </a:p>
+          </p:txBody>
+        </p:sp>
+        <p:sp>
+          <p:nvSpPr>
+            <p:cNvPr id="35" name="Rectangle 34">
+              <a:extLst>
+                <a:ext uri="{FF2B5EF4-FFF2-40B4-BE49-F238E27FC236}">
+                  <a16:creationId xmlns:a16="http://schemas.microsoft.com/office/drawing/2014/main" id="{75D55F4F-E05F-406E-AD7B-16DDA2BDB444}"/>
+                </a:ext>
+              </a:extLst>
+            </p:cNvPr>
+            <p:cNvSpPr/>
+            <p:nvPr/>
+          </p:nvSpPr>
+          <p:spPr>
+            <a:xfrm rot="5400000">
+              <a:off x="7261817" y="1723363"/>
+              <a:ext cx="504169" cy="1799991"/>
+            </a:xfrm>
+            <a:prstGeom prst="rect">
+              <a:avLst/>
+            </a:prstGeom>
+            <a:ln w="19050">
+              <a:solidFill>
+                <a:schemeClr val="accent2"/>
+              </a:solidFill>
+            </a:ln>
+          </p:spPr>
+          <p:style>
+            <a:lnRef idx="2">
+              <a:schemeClr val="accent2"/>
+            </a:lnRef>
+            <a:fillRef idx="1">
+              <a:schemeClr val="lt1"/>
+            </a:fillRef>
+            <a:effectRef idx="0">
+              <a:schemeClr val="accent2"/>
+            </a:effectRef>
+            <a:fontRef idx="minor">
+              <a:schemeClr val="dk1"/>
+            </a:fontRef>
+          </p:style>
+          <p:txBody>
+            <a:bodyPr vert="vert270" rtlCol="0" anchor="ctr"/>
+            <a:lstStyle/>
+            <a:p>
+              <a:pPr algn="ctr"/>
+              <a:r>
+                <a:rPr lang="en-US" sz="1200" dirty="0">
+                  <a:solidFill>
+                    <a:schemeClr val="accent2"/>
+                  </a:solidFill>
+                  <a:cs typeface="Tahoma"/>
+                </a:rPr>
+                <a:t>ScaledObject</a:t>
+              </a:r>
+              <a:endParaRPr lang="en-BE" sz="1200" dirty="0" err="1">
+                <a:solidFill>
+                  <a:schemeClr val="accent2"/>
+                </a:solidFill>
+                <a:cs typeface="Tahoma"/>
+              </a:endParaRPr>
+            </a:p>
+          </p:txBody>
+        </p:sp>
+        <p:cxnSp>
+          <p:nvCxnSpPr>
+            <p:cNvPr id="56" name="Straight Arrow Connector 52">
+              <a:extLst>
+                <a:ext uri="{FF2B5EF4-FFF2-40B4-BE49-F238E27FC236}">
+                  <a16:creationId xmlns:a16="http://schemas.microsoft.com/office/drawing/2014/main" id="{4BBAD611-E25A-4421-A9F1-EF89D5DA9F8A}"/>
+                </a:ext>
+              </a:extLst>
+            </p:cNvPr>
+            <p:cNvCxnSpPr>
+              <a:cxnSpLocks/>
+              <a:stCxn id="15" idx="2"/>
+              <a:endCxn id="28" idx="0"/>
+            </p:cNvCxnSpPr>
+            <p:nvPr/>
+          </p:nvCxnSpPr>
+          <p:spPr>
+            <a:xfrm rot="10800000" flipV="1">
+              <a:off x="8414490" y="1932083"/>
+              <a:ext cx="201259" cy="820"/>
+            </a:xfrm>
+            <a:prstGeom prst="bentConnector3">
+              <a:avLst>
+                <a:gd name="adj1" fmla="val 50000"/>
+              </a:avLst>
+            </a:prstGeom>
+            <a:ln w="9525">
+              <a:tailEnd type="triangle"/>
+            </a:ln>
+          </p:spPr>
+          <p:style>
+            <a:lnRef idx="1">
+              <a:schemeClr val="accent3"/>
+            </a:lnRef>
+            <a:fillRef idx="0">
+              <a:schemeClr val="accent3"/>
+            </a:fillRef>
+            <a:effectRef idx="0">
+              <a:schemeClr val="accent3"/>
+            </a:effectRef>
+            <a:fontRef idx="minor">
+              <a:schemeClr val="tx1"/>
+            </a:fontRef>
+          </p:style>
+        </p:cxnSp>
+        <p:cxnSp>
+          <p:nvCxnSpPr>
+            <p:cNvPr id="71" name="Straight Arrow Connector 52">
+              <a:extLst>
+                <a:ext uri="{FF2B5EF4-FFF2-40B4-BE49-F238E27FC236}">
+                  <a16:creationId xmlns:a16="http://schemas.microsoft.com/office/drawing/2014/main" id="{36E791DE-8A22-4C82-84D7-59593AE2A51A}"/>
+                </a:ext>
+              </a:extLst>
+            </p:cNvPr>
+            <p:cNvCxnSpPr>
+              <a:cxnSpLocks/>
+              <a:stCxn id="35" idx="1"/>
+              <a:endCxn id="28" idx="3"/>
+            </p:cNvCxnSpPr>
+            <p:nvPr/>
+          </p:nvCxnSpPr>
+          <p:spPr>
+            <a:xfrm flipV="1">
+              <a:off x="7513901" y="2184987"/>
+              <a:ext cx="592" cy="186287"/>
+            </a:xfrm>
+            <a:prstGeom prst="straightConnector1">
+              <a:avLst/>
+            </a:prstGeom>
+            <a:ln w="9525">
+              <a:tailEnd type="triangle"/>
+            </a:ln>
+          </p:spPr>
+          <p:style>
+            <a:lnRef idx="1">
+              <a:schemeClr val="accent3"/>
+            </a:lnRef>
+            <a:fillRef idx="0">
+              <a:schemeClr val="accent3"/>
+            </a:fillRef>
+            <a:effectRef idx="0">
+              <a:schemeClr val="accent3"/>
+            </a:effectRef>
+            <a:fontRef idx="minor">
+              <a:schemeClr val="tx1"/>
+            </a:fontRef>
+          </p:style>
+        </p:cxnSp>
+      </p:grpSp>
+      <p:grpSp>
+        <p:nvGrpSpPr>
+          <p:cNvPr id="1040" name="Group 1039">
+            <a:extLst>
+              <a:ext uri="{FF2B5EF4-FFF2-40B4-BE49-F238E27FC236}">
+                <a16:creationId xmlns:a16="http://schemas.microsoft.com/office/drawing/2014/main" id="{400953ED-CBB1-4DEC-8462-22432940CC70}"/>
+              </a:ext>
+            </a:extLst>
+          </p:cNvPr>
+          <p:cNvGrpSpPr/>
+          <p:nvPr/>
+        </p:nvGrpSpPr>
+        <p:grpSpPr>
+          <a:xfrm>
+            <a:off x="1326636" y="1805346"/>
+            <a:ext cx="4692730" cy="1445166"/>
+            <a:chOff x="1403270" y="1805346"/>
+            <a:chExt cx="4692730" cy="1445166"/>
+          </a:xfrm>
+        </p:grpSpPr>
+        <p:sp>
+          <p:nvSpPr>
+            <p:cNvPr id="12" name="Rectangle 11">
+              <a:extLst>
+                <a:ext uri="{FF2B5EF4-FFF2-40B4-BE49-F238E27FC236}">
+                  <a16:creationId xmlns:a16="http://schemas.microsoft.com/office/drawing/2014/main" id="{BE514519-6863-4E67-BD5E-863ADFC76B13}"/>
+                </a:ext>
+              </a:extLst>
+            </p:cNvPr>
+            <p:cNvSpPr/>
+            <p:nvPr/>
+          </p:nvSpPr>
+          <p:spPr>
+            <a:xfrm>
+              <a:off x="1403270" y="1805346"/>
+              <a:ext cx="4692730" cy="1445166"/>
+            </a:xfrm>
+            <a:prstGeom prst="rect">
+              <a:avLst/>
+            </a:prstGeom>
+            <a:solidFill>
+              <a:schemeClr val="bg1">
+                <a:lumMod val="95000"/>
+              </a:schemeClr>
+            </a:solidFill>
+            <a:ln w="19050">
+              <a:solidFill>
+                <a:srgbClr val="0070C0"/>
+              </a:solidFill>
+            </a:ln>
+          </p:spPr>
+          <p:style>
+            <a:lnRef idx="2">
+              <a:schemeClr val="accent3"/>
+            </a:lnRef>
+            <a:fillRef idx="1">
+              <a:schemeClr val="lt1"/>
+            </a:fillRef>
+            <a:effectRef idx="0">
+              <a:schemeClr val="accent3"/>
+            </a:effectRef>
+            <a:fontRef idx="minor">
+              <a:schemeClr val="dk1"/>
+            </a:fontRef>
+          </p:style>
+          <p:txBody>
+            <a:bodyPr rtlCol="0" anchor="ctr"/>
+            <a:lstStyle/>
+            <a:p>
+              <a:pPr algn="ctr"/>
+              <a:endParaRPr lang="en-BE" sz="1600" dirty="0" err="1">
+                <a:solidFill>
+                  <a:schemeClr val="tx2"/>
+                </a:solidFill>
+                <a:cs typeface="Tahoma"/>
+              </a:endParaRPr>
+            </a:p>
+          </p:txBody>
+        </p:sp>
+        <p:sp>
+          <p:nvSpPr>
+            <p:cNvPr id="13" name="TextBox 12">
+              <a:extLst>
+                <a:ext uri="{FF2B5EF4-FFF2-40B4-BE49-F238E27FC236}">
+                  <a16:creationId xmlns:a16="http://schemas.microsoft.com/office/drawing/2014/main" id="{FA012573-CE86-471D-BB3D-564AA6A582B7}"/>
+                </a:ext>
+              </a:extLst>
+            </p:cNvPr>
+            <p:cNvSpPr txBox="1"/>
+            <p:nvPr/>
+          </p:nvSpPr>
+          <p:spPr>
+            <a:xfrm>
+              <a:off x="2059238" y="1877930"/>
+              <a:ext cx="2021822" cy="1087912"/>
+            </a:xfrm>
+            <a:prstGeom prst="rect">
+              <a:avLst/>
+            </a:prstGeom>
+            <a:noFill/>
+            <a:ln w="12700">
+              <a:noFill/>
+            </a:ln>
+          </p:spPr>
+          <p:style>
+            <a:lnRef idx="2">
+              <a:schemeClr val="accent3"/>
+            </a:lnRef>
+            <a:fillRef idx="1">
+              <a:schemeClr val="lt1"/>
+            </a:fillRef>
+            <a:effectRef idx="0">
+              <a:schemeClr val="accent3"/>
+            </a:effectRef>
+            <a:fontRef idx="minor">
+              <a:schemeClr val="dk1"/>
+            </a:fontRef>
+          </p:style>
+          <p:txBody>
+            <a:bodyPr rot="0" spcFirstLastPara="0" vertOverflow="overflow" horzOverflow="overflow" vert="horz" wrap="square" lIns="91440" tIns="45720" rIns="91440" bIns="45720" numCol="1" spcCol="0" rtlCol="0" fromWordArt="0" anchor="ctr" anchorCtr="0" forceAA="0" compatLnSpc="1">
+              <a:prstTxWarp prst="textNoShape">
+                <a:avLst/>
+              </a:prstTxWarp>
+              <a:noAutofit/>
+            </a:bodyPr>
+            <a:lstStyle>
+              <a:defPPr>
+                <a:defRPr lang="en-BE"/>
+              </a:defPPr>
+              <a:lvl1pPr algn="ctr">
+                <a:defRPr sz="1400">
+                  <a:solidFill>
+                    <a:schemeClr val="tx2"/>
+                  </a:solidFill>
+                  <a:cs typeface="Tahoma"/>
+                </a:defRPr>
+              </a:lvl1pPr>
+              <a:lvl2pPr>
+                <a:defRPr>
+                  <a:solidFill>
+                    <a:schemeClr val="dk1"/>
+                  </a:solidFill>
+                </a:defRPr>
+              </a:lvl2pPr>
+              <a:lvl3pPr>
+                <a:defRPr>
+                  <a:solidFill>
+                    <a:schemeClr val="dk1"/>
+                  </a:solidFill>
+                </a:defRPr>
+              </a:lvl3pPr>
+              <a:lvl4pPr>
+                <a:defRPr>
+                  <a:solidFill>
+                    <a:schemeClr val="dk1"/>
+                  </a:solidFill>
+                </a:defRPr>
+              </a:lvl4pPr>
+              <a:lvl5pPr>
+                <a:defRPr>
+                  <a:solidFill>
+                    <a:schemeClr val="dk1"/>
+                  </a:solidFill>
+                </a:defRPr>
+              </a:lvl5pPr>
+              <a:lvl6pPr>
+                <a:defRPr>
+                  <a:solidFill>
+                    <a:schemeClr val="dk1"/>
+                  </a:solidFill>
+                </a:defRPr>
+              </a:lvl6pPr>
+              <a:lvl7pPr>
+                <a:defRPr>
+                  <a:solidFill>
+                    <a:schemeClr val="dk1"/>
+                  </a:solidFill>
+                </a:defRPr>
+              </a:lvl7pPr>
+              <a:lvl8pPr>
+                <a:defRPr>
+                  <a:solidFill>
+                    <a:schemeClr val="dk1"/>
+                  </a:solidFill>
+                </a:defRPr>
+              </a:lvl8pPr>
+              <a:lvl9pPr>
+                <a:defRPr>
+                  <a:solidFill>
+                    <a:schemeClr val="dk1"/>
+                  </a:solidFill>
+                </a:defRPr>
+              </a:lvl9pPr>
+            </a:lstStyle>
+            <a:p>
+              <a:pPr algn="l"/>
+              <a:r>
+                <a:rPr lang="en-US" sz="1000" b="1" dirty="0">
+                  <a:solidFill>
+                    <a:srgbClr val="0070C0"/>
+                  </a:solidFill>
+                </a:rPr>
+                <a:t>Kubernetes Event-driven Autoscaling </a:t>
+              </a:r>
+              <a:r>
+                <a:rPr lang="en-US" sz="1000" dirty="0">
+                  <a:solidFill>
+                    <a:srgbClr val="0070C0"/>
+                  </a:solidFill>
+                </a:rPr>
+                <a:t>provides application autoscaling on a variety of metric sources such as Azure Event Hubs &amp; Azure Service Bus.</a:t>
+              </a:r>
+              <a:endParaRPr lang="en-BE" sz="1000" dirty="0">
+                <a:solidFill>
+                  <a:srgbClr val="0070C0"/>
+                </a:solidFill>
+              </a:endParaRPr>
+            </a:p>
+          </p:txBody>
+        </p:sp>
+        <p:pic>
+          <p:nvPicPr>
+            <p:cNvPr id="14" name="Picture 6" descr="KEDA | KEDA Concepts">
+              <a:extLst>
+                <a:ext uri="{FF2B5EF4-FFF2-40B4-BE49-F238E27FC236}">
+                  <a16:creationId xmlns:a16="http://schemas.microsoft.com/office/drawing/2014/main" id="{25FEB9E1-1168-4338-8335-A6CB11CAE4D5}"/>
+                </a:ext>
+              </a:extLst>
+            </p:cNvPr>
+            <p:cNvPicPr>
+              <a:picLocks noChangeAspect="1" noChangeArrowheads="1"/>
+            </p:cNvPicPr>
+            <p:nvPr/>
+          </p:nvPicPr>
+          <p:blipFill>
+            <a:blip r:embed="rId8" cstate="print">
+              <a:extLst>
+                <a:ext uri="{28A0092B-C50C-407E-A947-70E740481C1C}">
+                  <a14:useLocalDpi xmlns:a14="http://schemas.microsoft.com/office/drawing/2010/main" val="0"/>
+                </a:ext>
+              </a:extLst>
+            </a:blip>
+            <a:srcRect/>
+            <a:stretch>
+              <a:fillRect/>
+            </a:stretch>
+          </p:blipFill>
+          <p:spPr bwMode="auto">
+            <a:xfrm>
+              <a:off x="1490998" y="1877930"/>
+              <a:ext cx="555582" cy="555968"/>
+            </a:xfrm>
+            <a:prstGeom prst="rect">
+              <a:avLst/>
+            </a:prstGeom>
+            <a:noFill/>
+            <a:extLst>
+              <a:ext uri="{909E8E84-426E-40DD-AFC4-6F175D3DCCD1}">
+                <a14:hiddenFill xmlns:a14="http://schemas.microsoft.com/office/drawing/2010/main">
+                  <a:solidFill>
+                    <a:srgbClr val="FFFFFF"/>
+                  </a:solidFill>
+                </a14:hiddenFill>
+              </a:ext>
+            </a:extLst>
+          </p:spPr>
+        </p:pic>
+        <p:sp>
+          <p:nvSpPr>
+            <p:cNvPr id="1034" name="Rectangle 1033">
+              <a:extLst>
+                <a:ext uri="{FF2B5EF4-FFF2-40B4-BE49-F238E27FC236}">
+                  <a16:creationId xmlns:a16="http://schemas.microsoft.com/office/drawing/2014/main" id="{0688F378-9B93-49C7-9149-83B3AF726470}"/>
+                </a:ext>
+              </a:extLst>
+            </p:cNvPr>
+            <p:cNvSpPr/>
+            <p:nvPr/>
+          </p:nvSpPr>
+          <p:spPr>
+            <a:xfrm rot="5400000">
+              <a:off x="4803025" y="1284171"/>
+              <a:ext cx="504169" cy="1799991"/>
+            </a:xfrm>
+            <a:prstGeom prst="rect">
+              <a:avLst/>
+            </a:prstGeom>
+            <a:ln w="19050">
+              <a:solidFill>
+                <a:schemeClr val="accent1"/>
+              </a:solidFill>
+            </a:ln>
+          </p:spPr>
+          <p:style>
+            <a:lnRef idx="2">
+              <a:schemeClr val="accent2"/>
+            </a:lnRef>
+            <a:fillRef idx="1">
+              <a:schemeClr val="lt1"/>
+            </a:fillRef>
+            <a:effectRef idx="0">
+              <a:schemeClr val="accent2"/>
+            </a:effectRef>
+            <a:fontRef idx="minor">
+              <a:schemeClr val="dk1"/>
+            </a:fontRef>
+          </p:style>
+          <p:txBody>
+            <a:bodyPr vert="vert270" rtlCol="0" anchor="ctr"/>
+            <a:lstStyle/>
+            <a:p>
+              <a:pPr algn="ctr"/>
+              <a:r>
+                <a:rPr lang="en-US" sz="1200" dirty="0">
+                  <a:solidFill>
+                    <a:srgbClr val="0070C0"/>
+                  </a:solidFill>
+                  <a:cs typeface="Tahoma"/>
+                </a:rPr>
+                <a:t>Service Account</a:t>
+              </a:r>
+            </a:p>
+          </p:txBody>
+        </p:sp>
+      </p:grpSp>
+      <p:cxnSp>
+        <p:nvCxnSpPr>
+          <p:cNvPr id="81" name="Straight Arrow Connector 52">
+            <a:extLst>
+              <a:ext uri="{FF2B5EF4-FFF2-40B4-BE49-F238E27FC236}">
+                <a16:creationId xmlns:a16="http://schemas.microsoft.com/office/drawing/2014/main" id="{B202ABEF-F168-4B1E-8ED9-254EDC324B3B}"/>
+              </a:ext>
+            </a:extLst>
+          </p:cNvPr>
+          <p:cNvCxnSpPr>
+            <a:cxnSpLocks/>
+          </p:cNvCxnSpPr>
+          <p:nvPr/>
+        </p:nvCxnSpPr>
+        <p:spPr>
+          <a:xfrm>
+            <a:off x="4955342" y="2441713"/>
+            <a:ext cx="19477" cy="2628815"/>
+          </a:xfrm>
+          <a:prstGeom prst="straightConnector1">
+            <a:avLst/>
+          </a:prstGeom>
+          <a:ln w="9525">
+            <a:tailEnd type="triangle"/>
+          </a:ln>
+        </p:spPr>
+        <p:style>
+          <a:lnRef idx="1">
+            <a:schemeClr val="accent3"/>
+          </a:lnRef>
+          <a:fillRef idx="0">
+            <a:schemeClr val="accent3"/>
+          </a:fillRef>
+          <a:effectRef idx="0">
+            <a:schemeClr val="accent3"/>
+          </a:effectRef>
+          <a:fontRef idx="minor">
+            <a:schemeClr val="tx1"/>
+          </a:fontRef>
+        </p:style>
+      </p:cxnSp>
+      <p:cxnSp>
+        <p:nvCxnSpPr>
+          <p:cNvPr id="92" name="Straight Arrow Connector 52">
+            <a:extLst>
+              <a:ext uri="{FF2B5EF4-FFF2-40B4-BE49-F238E27FC236}">
+                <a16:creationId xmlns:a16="http://schemas.microsoft.com/office/drawing/2014/main" id="{B3BC6902-CD33-449C-A8C8-73AB1D17760F}"/>
+              </a:ext>
+            </a:extLst>
+          </p:cNvPr>
+          <p:cNvCxnSpPr>
+            <a:cxnSpLocks/>
+            <a:stCxn id="1034" idx="0"/>
+            <a:endCxn id="8" idx="0"/>
+          </p:cNvCxnSpPr>
+          <p:nvPr/>
+        </p:nvCxnSpPr>
+        <p:spPr>
+          <a:xfrm>
+            <a:off x="5878471" y="2184167"/>
+            <a:ext cx="572869" cy="2893458"/>
+          </a:xfrm>
+          <a:prstGeom prst="bentConnector2">
+            <a:avLst/>
+          </a:prstGeom>
+          <a:ln w="9525">
+            <a:tailEnd type="triangle"/>
+          </a:ln>
+        </p:spPr>
+        <p:style>
+          <a:lnRef idx="1">
+            <a:schemeClr val="accent3"/>
+          </a:lnRef>
+          <a:fillRef idx="0">
+            <a:schemeClr val="accent3"/>
+          </a:fillRef>
+          <a:effectRef idx="0">
+            <a:schemeClr val="accent3"/>
+          </a:effectRef>
+          <a:fontRef idx="minor">
+            <a:schemeClr val="tx1"/>
+          </a:fontRef>
+        </p:style>
+      </p:cxnSp>
+      <p:cxnSp>
+        <p:nvCxnSpPr>
+          <p:cNvPr id="45" name="Straight Arrow Connector 52">
+            <a:extLst>
+              <a:ext uri="{FF2B5EF4-FFF2-40B4-BE49-F238E27FC236}">
+                <a16:creationId xmlns:a16="http://schemas.microsoft.com/office/drawing/2014/main" id="{02BD691F-56AD-404A-B206-449763758380}"/>
+              </a:ext>
+            </a:extLst>
+          </p:cNvPr>
+          <p:cNvCxnSpPr>
+            <a:cxnSpLocks/>
+            <a:stCxn id="28" idx="2"/>
+            <a:endCxn id="8" idx="0"/>
+          </p:cNvCxnSpPr>
+          <p:nvPr/>
+        </p:nvCxnSpPr>
+        <p:spPr>
+          <a:xfrm rot="10800000" flipV="1">
+            <a:off x="6451341" y="2181239"/>
+            <a:ext cx="482915" cy="2896386"/>
+          </a:xfrm>
+          <a:prstGeom prst="bentConnector2">
+            <a:avLst/>
+          </a:prstGeom>
+          <a:ln w="9525">
+            <a:tailEnd type="triangle"/>
+          </a:ln>
+        </p:spPr>
+        <p:style>
+          <a:lnRef idx="1">
+            <a:schemeClr val="accent3"/>
+          </a:lnRef>
+          <a:fillRef idx="0">
+            <a:schemeClr val="accent3"/>
+          </a:fillRef>
+          <a:effectRef idx="0">
+            <a:schemeClr val="accent3"/>
+          </a:effectRef>
+          <a:fontRef idx="minor">
+            <a:schemeClr val="tx1"/>
+          </a:fontRef>
+        </p:style>
+      </p:cxnSp>
+      <p:pic>
+        <p:nvPicPr>
+          <p:cNvPr id="11" name="Picture 10" descr="Shape&#10;&#10;Description automatically generated with low confidence">
+            <a:extLst>
+              <a:ext uri="{FF2B5EF4-FFF2-40B4-BE49-F238E27FC236}">
+                <a16:creationId xmlns:a16="http://schemas.microsoft.com/office/drawing/2014/main" id="{2968CA16-8428-0899-DDB3-D1B5DF80247C}"/>
+              </a:ext>
+            </a:extLst>
+          </p:cNvPr>
+          <p:cNvPicPr>
+            <a:picLocks noChangeAspect="1"/>
+          </p:cNvPicPr>
+          <p:nvPr/>
+        </p:nvPicPr>
+        <p:blipFill>
+          <a:blip r:embed="rId9">
+            <a:extLst>
+              <a:ext uri="{28A0092B-C50C-407E-A947-70E740481C1C}">
+                <a14:useLocalDpi xmlns:a14="http://schemas.microsoft.com/office/drawing/2010/main" val="0"/>
+              </a:ext>
+            </a:extLst>
+          </a:blip>
+          <a:stretch>
+            <a:fillRect/>
+          </a:stretch>
+        </p:blipFill>
+        <p:spPr>
+          <a:xfrm>
+            <a:off x="4720210" y="5100181"/>
+            <a:ext cx="529706" cy="529706"/>
+          </a:xfrm>
+          <a:prstGeom prst="rect">
+            <a:avLst/>
+          </a:prstGeom>
+        </p:spPr>
+      </p:pic>
+      <p:pic>
+        <p:nvPicPr>
+          <p:cNvPr id="17" name="Picture 16" descr="Shape&#10;&#10;Description automatically generated with low confidence">
+            <a:extLst>
+              <a:ext uri="{FF2B5EF4-FFF2-40B4-BE49-F238E27FC236}">
+                <a16:creationId xmlns:a16="http://schemas.microsoft.com/office/drawing/2014/main" id="{DA8CCEE8-4987-E21C-CF08-2848DB6FD755}"/>
+              </a:ext>
+            </a:extLst>
+          </p:cNvPr>
+          <p:cNvPicPr>
+            <a:picLocks noChangeAspect="1"/>
+          </p:cNvPicPr>
+          <p:nvPr/>
+        </p:nvPicPr>
+        <p:blipFill>
+          <a:blip r:embed="rId9">
+            <a:extLst>
+              <a:ext uri="{28A0092B-C50C-407E-A947-70E740481C1C}">
+                <a14:useLocalDpi xmlns:a14="http://schemas.microsoft.com/office/drawing/2010/main" val="0"/>
+              </a:ext>
+            </a:extLst>
+          </a:blip>
+          <a:stretch>
+            <a:fillRect/>
+          </a:stretch>
+        </p:blipFill>
+        <p:spPr>
+          <a:xfrm>
+            <a:off x="9576998" y="5100181"/>
+            <a:ext cx="529706" cy="529706"/>
+          </a:xfrm>
+          <a:prstGeom prst="rect">
+            <a:avLst/>
+          </a:prstGeom>
+        </p:spPr>
+      </p:pic>
+      <p:cxnSp>
+        <p:nvCxnSpPr>
+          <p:cNvPr id="53" name="Straight Arrow Connector 52">
+            <a:extLst>
+              <a:ext uri="{FF2B5EF4-FFF2-40B4-BE49-F238E27FC236}">
+                <a16:creationId xmlns:a16="http://schemas.microsoft.com/office/drawing/2014/main" id="{3242B989-43FA-4ACE-A27E-058D5A7DF25C}"/>
+              </a:ext>
+            </a:extLst>
+          </p:cNvPr>
+          <p:cNvCxnSpPr>
+            <a:cxnSpLocks/>
+            <a:stCxn id="15" idx="3"/>
+          </p:cNvCxnSpPr>
+          <p:nvPr/>
+        </p:nvCxnSpPr>
+        <p:spPr>
+          <a:xfrm rot="16200000" flipH="1">
+            <a:off x="8519124" y="3748879"/>
+            <a:ext cx="2638024" cy="5272"/>
+          </a:xfrm>
+          <a:prstGeom prst="bentConnector3">
+            <a:avLst>
+              <a:gd name="adj1" fmla="val 50000"/>
+            </a:avLst>
+          </a:prstGeom>
+          <a:ln w="9525">
+            <a:tailEnd type="triangle"/>
+          </a:ln>
+        </p:spPr>
+        <p:style>
+          <a:lnRef idx="1">
+            <a:schemeClr val="accent3"/>
+          </a:lnRef>
+          <a:fillRef idx="0">
+            <a:schemeClr val="accent3"/>
+          </a:fillRef>
+          <a:effectRef idx="0">
+            <a:schemeClr val="accent3"/>
+          </a:effectRef>
+          <a:fontRef idx="minor">
+            <a:schemeClr val="tx1"/>
+          </a:fontRef>
+        </p:style>
+      </p:cxnSp>
+      <p:sp>
+        <p:nvSpPr>
+          <p:cNvPr id="31" name="TextBox 30">
+            <a:extLst>
+              <a:ext uri="{FF2B5EF4-FFF2-40B4-BE49-F238E27FC236}">
+                <a16:creationId xmlns:a16="http://schemas.microsoft.com/office/drawing/2014/main" id="{5DDEA6D1-89BC-34CA-4B7D-2BEAABEF1F63}"/>
+              </a:ext>
+            </a:extLst>
+          </p:cNvPr>
+          <p:cNvSpPr txBox="1"/>
+          <p:nvPr/>
+        </p:nvSpPr>
+        <p:spPr>
+          <a:xfrm>
+            <a:off x="4974819" y="3638679"/>
+            <a:ext cx="930938" cy="430887"/>
+          </a:xfrm>
+          <a:prstGeom prst="rect">
+            <a:avLst/>
+          </a:prstGeom>
+          <a:noFill/>
+        </p:spPr>
+        <p:txBody>
+          <a:bodyPr wrap="square" rtlCol="0">
+            <a:spAutoFit/>
+          </a:bodyPr>
+          <a:lstStyle/>
+          <a:p>
+            <a:r>
+              <a:rPr lang="en-US" sz="1100" dirty="0">
+                <a:solidFill>
+                  <a:schemeClr val="accent1">
+                    <a:lumMod val="75000"/>
+                  </a:schemeClr>
+                </a:solidFill>
+              </a:rPr>
+              <a:t>Federated Credentials</a:t>
+            </a:r>
+          </a:p>
+        </p:txBody>
+      </p:sp>
+      <p:sp>
+        <p:nvSpPr>
+          <p:cNvPr id="32" name="TextBox 31">
+            <a:extLst>
+              <a:ext uri="{FF2B5EF4-FFF2-40B4-BE49-F238E27FC236}">
+                <a16:creationId xmlns:a16="http://schemas.microsoft.com/office/drawing/2014/main" id="{4F150F1C-1CAB-DD70-68C5-948E54077279}"/>
+              </a:ext>
+            </a:extLst>
+          </p:cNvPr>
+          <p:cNvSpPr txBox="1"/>
+          <p:nvPr/>
+        </p:nvSpPr>
+        <p:spPr>
+          <a:xfrm>
+            <a:off x="9865671" y="3638679"/>
+            <a:ext cx="884875" cy="430887"/>
+          </a:xfrm>
+          <a:prstGeom prst="rect">
+            <a:avLst/>
+          </a:prstGeom>
+          <a:noFill/>
+        </p:spPr>
+        <p:txBody>
+          <a:bodyPr wrap="square" rtlCol="0">
+            <a:spAutoFit/>
+          </a:bodyPr>
+          <a:lstStyle/>
+          <a:p>
+            <a:r>
+              <a:rPr lang="en-US" sz="1100" dirty="0">
+                <a:solidFill>
+                  <a:schemeClr val="accent1">
+                    <a:lumMod val="75000"/>
+                  </a:schemeClr>
+                </a:solidFill>
+              </a:rPr>
+              <a:t>Federated Credentials</a:t>
+            </a:r>
+          </a:p>
+        </p:txBody>
+      </p:sp>
+    </p:spTree>
+    <p:extLst>
+      <p:ext uri="{BB962C8B-B14F-4D97-AF65-F5344CB8AC3E}">
+        <p14:creationId xmlns:p14="http://schemas.microsoft.com/office/powerpoint/2010/main" val="2245483744"/>
       </p:ext>
     </p:extLst>
   </p:cSld>

</xml_diff>